<commit_message>
toevoeging titel + index + power management aan ppt
</commit_message>
<xml_diff>
--- a/presentatie/tussentijdsepresentatie.pptx
+++ b/presentatie/tussentijdsepresentatie.pptx
@@ -5,10 +5,14 @@
     <p:sldMasterId id="2147483648" r:id="rId1"/>
   </p:sldMasterIdLst>
   <p:sldIdLst>
-    <p:sldId id="265" r:id="rId2"/>
-    <p:sldId id="263" r:id="rId3"/>
-    <p:sldId id="266" r:id="rId4"/>
-    <p:sldId id="262" r:id="rId5"/>
+    <p:sldId id="268" r:id="rId2"/>
+    <p:sldId id="269" r:id="rId3"/>
+    <p:sldId id="265" r:id="rId4"/>
+    <p:sldId id="263" r:id="rId5"/>
+    <p:sldId id="270" r:id="rId6"/>
+    <p:sldId id="271" r:id="rId7"/>
+    <p:sldId id="266" r:id="rId8"/>
+    <p:sldId id="262" r:id="rId9"/>
   </p:sldIdLst>
   <p:sldSz cx="12192000" cy="6858000"/>
   <p:notesSz cx="6858000" cy="9144000"/>
@@ -107,6 +111,11 @@
       </a:defRPr>
     </a:lvl9pPr>
   </p:defaultTextStyle>
+  <p:extLst>
+    <p:ext uri="{EFAFB233-063F-42B5-8137-9DF3F51BA10A}">
+      <p15:sldGuideLst xmlns:p15="http://schemas.microsoft.com/office/powerpoint/2012/main"/>
+    </p:ext>
+  </p:extLst>
 </p:presentation>
 </file>
 
@@ -1678,7 +1687,1182 @@
 </dgm:colorsDef>
 </file>
 
+<file path=ppt/diagrams/colors3.xml><?xml version="1.0" encoding="utf-8"?>
+<dgm:colorsDef xmlns:dgm="http://schemas.openxmlformats.org/drawingml/2006/diagram" xmlns:a="http://schemas.openxmlformats.org/drawingml/2006/main" uniqueId="urn:microsoft.com/office/officeart/2018/5/colors/Iconchunking_neutralbg_colorful5">
+  <dgm:title val=""/>
+  <dgm:desc val=""/>
+  <dgm:catLst>
+    <dgm:cat type="colorful" pri="10500"/>
+  </dgm:catLst>
+  <dgm:styleLbl name="node0">
+    <dgm:fillClrLst meth="repeat">
+      <a:schemeClr val="accent4"/>
+    </dgm:fillClrLst>
+    <dgm:linClrLst meth="repeat">
+      <a:schemeClr val="lt1"/>
+    </dgm:linClrLst>
+    <dgm:effectClrLst/>
+    <dgm:txLinClrLst/>
+    <dgm:txFillClrLst/>
+    <dgm:txEffectClrLst/>
+  </dgm:styleLbl>
+  <dgm:styleLbl name="node1">
+    <dgm:fillClrLst>
+      <a:schemeClr val="accent5"/>
+      <a:schemeClr val="accent6"/>
+    </dgm:fillClrLst>
+    <dgm:linClrLst meth="repeat">
+      <a:schemeClr val="lt1">
+        <a:alpha val="0"/>
+      </a:schemeClr>
+    </dgm:linClrLst>
+    <dgm:effectClrLst/>
+    <dgm:txLinClrLst/>
+    <dgm:txFillClrLst/>
+    <dgm:txEffectClrLst/>
+  </dgm:styleLbl>
+  <dgm:styleLbl name="alignNode1">
+    <dgm:fillClrLst>
+      <a:schemeClr val="accent5"/>
+      <a:schemeClr val="accent6"/>
+    </dgm:fillClrLst>
+    <dgm:linClrLst>
+      <a:schemeClr val="accent5"/>
+      <a:schemeClr val="accent6"/>
+    </dgm:linClrLst>
+    <dgm:effectClrLst/>
+    <dgm:txLinClrLst/>
+    <dgm:txFillClrLst/>
+    <dgm:txEffectClrLst/>
+  </dgm:styleLbl>
+  <dgm:styleLbl name="lnNode1">
+    <dgm:fillClrLst>
+      <a:schemeClr val="accent5"/>
+      <a:schemeClr val="accent6"/>
+    </dgm:fillClrLst>
+    <dgm:linClrLst meth="repeat">
+      <a:schemeClr val="lt1"/>
+    </dgm:linClrLst>
+    <dgm:effectClrLst/>
+    <dgm:txLinClrLst/>
+    <dgm:txFillClrLst/>
+    <dgm:txEffectClrLst/>
+  </dgm:styleLbl>
+  <dgm:styleLbl name="vennNode1">
+    <dgm:fillClrLst>
+      <a:schemeClr val="accent5">
+        <a:alpha val="50000"/>
+      </a:schemeClr>
+      <a:schemeClr val="accent6">
+        <a:alpha val="50000"/>
+      </a:schemeClr>
+    </dgm:fillClrLst>
+    <dgm:linClrLst meth="repeat">
+      <a:schemeClr val="lt1"/>
+    </dgm:linClrLst>
+    <dgm:effectClrLst/>
+    <dgm:txLinClrLst/>
+    <dgm:txFillClrLst/>
+    <dgm:txEffectClrLst/>
+  </dgm:styleLbl>
+  <dgm:styleLbl name="node2">
+    <dgm:fillClrLst>
+      <a:schemeClr val="accent6"/>
+    </dgm:fillClrLst>
+    <dgm:linClrLst meth="repeat">
+      <a:schemeClr val="lt1"/>
+    </dgm:linClrLst>
+    <dgm:effectClrLst/>
+    <dgm:txLinClrLst/>
+    <dgm:txFillClrLst/>
+    <dgm:txEffectClrLst/>
+  </dgm:styleLbl>
+  <dgm:styleLbl name="node3">
+    <dgm:fillClrLst>
+      <a:schemeClr val="accent1"/>
+    </dgm:fillClrLst>
+    <dgm:linClrLst meth="repeat">
+      <a:schemeClr val="lt1"/>
+    </dgm:linClrLst>
+    <dgm:effectClrLst/>
+    <dgm:txLinClrLst/>
+    <dgm:txFillClrLst/>
+    <dgm:txEffectClrLst/>
+  </dgm:styleLbl>
+  <dgm:styleLbl name="node4">
+    <dgm:fillClrLst>
+      <a:schemeClr val="accent2"/>
+    </dgm:fillClrLst>
+    <dgm:linClrLst meth="repeat">
+      <a:schemeClr val="lt1"/>
+    </dgm:linClrLst>
+    <dgm:effectClrLst/>
+    <dgm:txLinClrLst/>
+    <dgm:txFillClrLst/>
+    <dgm:txEffectClrLst/>
+  </dgm:styleLbl>
+  <dgm:styleLbl name="fgImgPlace1">
+    <dgm:fillClrLst>
+      <a:schemeClr val="accent5">
+        <a:tint val="50000"/>
+      </a:schemeClr>
+      <a:schemeClr val="accent6">
+        <a:tint val="50000"/>
+      </a:schemeClr>
+    </dgm:fillClrLst>
+    <dgm:linClrLst meth="repeat">
+      <a:schemeClr val="lt1"/>
+    </dgm:linClrLst>
+    <dgm:effectClrLst/>
+    <dgm:txLinClrLst/>
+    <dgm:txFillClrLst meth="repeat">
+      <a:schemeClr val="lt1"/>
+    </dgm:txFillClrLst>
+    <dgm:txEffectClrLst/>
+  </dgm:styleLbl>
+  <dgm:styleLbl name="alignImgPlace1">
+    <dgm:fillClrLst>
+      <a:schemeClr val="accent5">
+        <a:tint val="50000"/>
+      </a:schemeClr>
+      <a:schemeClr val="accent6">
+        <a:tint val="20000"/>
+      </a:schemeClr>
+    </dgm:fillClrLst>
+    <dgm:linClrLst meth="repeat">
+      <a:schemeClr val="lt1"/>
+    </dgm:linClrLst>
+    <dgm:effectClrLst/>
+    <dgm:txLinClrLst/>
+    <dgm:txFillClrLst meth="repeat">
+      <a:schemeClr val="lt1"/>
+    </dgm:txFillClrLst>
+    <dgm:txEffectClrLst/>
+  </dgm:styleLbl>
+  <dgm:styleLbl name="bgImgPlace1">
+    <dgm:fillClrLst>
+      <a:schemeClr val="accent5">
+        <a:tint val="50000"/>
+      </a:schemeClr>
+      <a:schemeClr val="accent6">
+        <a:tint val="20000"/>
+      </a:schemeClr>
+    </dgm:fillClrLst>
+    <dgm:linClrLst meth="repeat">
+      <a:schemeClr val="lt1"/>
+    </dgm:linClrLst>
+    <dgm:effectClrLst/>
+    <dgm:txLinClrLst/>
+    <dgm:txFillClrLst meth="repeat">
+      <a:schemeClr val="lt1"/>
+    </dgm:txFillClrLst>
+    <dgm:txEffectClrLst/>
+  </dgm:styleLbl>
+  <dgm:styleLbl name="sibTrans2D1">
+    <dgm:fillClrLst>
+      <a:schemeClr val="accent5"/>
+      <a:schemeClr val="accent6"/>
+    </dgm:fillClrLst>
+    <dgm:linClrLst meth="repeat">
+      <a:schemeClr val="lt1"/>
+    </dgm:linClrLst>
+    <dgm:effectClrLst/>
+    <dgm:txLinClrLst/>
+    <dgm:txFillClrLst/>
+    <dgm:txEffectClrLst/>
+  </dgm:styleLbl>
+  <dgm:styleLbl name="fgSibTrans2D1">
+    <dgm:fillClrLst>
+      <a:schemeClr val="accent5"/>
+      <a:schemeClr val="accent6"/>
+    </dgm:fillClrLst>
+    <dgm:linClrLst meth="repeat">
+      <a:schemeClr val="lt1"/>
+    </dgm:linClrLst>
+    <dgm:effectClrLst/>
+    <dgm:txLinClrLst/>
+    <dgm:txFillClrLst meth="repeat">
+      <a:schemeClr val="lt1"/>
+    </dgm:txFillClrLst>
+    <dgm:txEffectClrLst/>
+  </dgm:styleLbl>
+  <dgm:styleLbl name="bgSibTrans2D1">
+    <dgm:fillClrLst>
+      <a:schemeClr val="accent5"/>
+      <a:schemeClr val="accent6"/>
+    </dgm:fillClrLst>
+    <dgm:linClrLst meth="repeat">
+      <a:schemeClr val="lt1"/>
+    </dgm:linClrLst>
+    <dgm:effectClrLst/>
+    <dgm:txLinClrLst/>
+    <dgm:txFillClrLst meth="repeat">
+      <a:schemeClr val="lt1"/>
+    </dgm:txFillClrLst>
+    <dgm:txEffectClrLst/>
+  </dgm:styleLbl>
+  <dgm:styleLbl name="sibTrans1D1">
+    <dgm:fillClrLst/>
+    <dgm:linClrLst>
+      <a:schemeClr val="accent5"/>
+      <a:schemeClr val="accent6"/>
+    </dgm:linClrLst>
+    <dgm:effectClrLst/>
+    <dgm:txLinClrLst/>
+    <dgm:txFillClrLst meth="repeat">
+      <a:schemeClr val="tx1"/>
+    </dgm:txFillClrLst>
+    <dgm:txEffectClrLst/>
+  </dgm:styleLbl>
+  <dgm:styleLbl name="callout">
+    <dgm:fillClrLst meth="repeat">
+      <a:schemeClr val="accent5"/>
+    </dgm:fillClrLst>
+    <dgm:linClrLst meth="repeat">
+      <a:schemeClr val="accent5">
+        <a:tint val="50000"/>
+      </a:schemeClr>
+    </dgm:linClrLst>
+    <dgm:effectClrLst/>
+    <dgm:txLinClrLst/>
+    <dgm:txFillClrLst meth="repeat">
+      <a:schemeClr val="tx1"/>
+    </dgm:txFillClrLst>
+    <dgm:txEffectClrLst/>
+  </dgm:styleLbl>
+  <dgm:styleLbl name="asst0">
+    <dgm:fillClrLst meth="repeat">
+      <a:schemeClr val="accent5"/>
+    </dgm:fillClrLst>
+    <dgm:linClrLst meth="repeat">
+      <a:schemeClr val="lt1">
+        <a:shade val="80000"/>
+      </a:schemeClr>
+    </dgm:linClrLst>
+    <dgm:effectClrLst/>
+    <dgm:txLinClrLst/>
+    <dgm:txFillClrLst/>
+    <dgm:txEffectClrLst/>
+  </dgm:styleLbl>
+  <dgm:styleLbl name="asst1">
+    <dgm:fillClrLst meth="repeat">
+      <a:schemeClr val="accent6"/>
+    </dgm:fillClrLst>
+    <dgm:linClrLst meth="repeat">
+      <a:schemeClr val="lt1">
+        <a:shade val="80000"/>
+      </a:schemeClr>
+    </dgm:linClrLst>
+    <dgm:effectClrLst/>
+    <dgm:txLinClrLst/>
+    <dgm:txFillClrLst/>
+    <dgm:txEffectClrLst/>
+  </dgm:styleLbl>
+  <dgm:styleLbl name="asst2">
+    <dgm:fillClrLst>
+      <a:schemeClr val="accent1"/>
+    </dgm:fillClrLst>
+    <dgm:linClrLst meth="repeat">
+      <a:schemeClr val="lt1"/>
+    </dgm:linClrLst>
+    <dgm:effectClrLst/>
+    <dgm:txLinClrLst/>
+    <dgm:txFillClrLst/>
+    <dgm:txEffectClrLst/>
+  </dgm:styleLbl>
+  <dgm:styleLbl name="asst3">
+    <dgm:fillClrLst>
+      <a:schemeClr val="accent2"/>
+    </dgm:fillClrLst>
+    <dgm:linClrLst meth="repeat">
+      <a:schemeClr val="lt1"/>
+    </dgm:linClrLst>
+    <dgm:effectClrLst/>
+    <dgm:txLinClrLst/>
+    <dgm:txFillClrLst/>
+    <dgm:txEffectClrLst/>
+  </dgm:styleLbl>
+  <dgm:styleLbl name="asst4">
+    <dgm:fillClrLst>
+      <a:schemeClr val="accent3"/>
+    </dgm:fillClrLst>
+    <dgm:linClrLst meth="repeat">
+      <a:schemeClr val="lt1"/>
+    </dgm:linClrLst>
+    <dgm:effectClrLst/>
+    <dgm:txLinClrLst/>
+    <dgm:txFillClrLst/>
+    <dgm:txEffectClrLst/>
+  </dgm:styleLbl>
+  <dgm:styleLbl name="parChTrans2D1">
+    <dgm:fillClrLst meth="repeat">
+      <a:schemeClr val="accent5"/>
+    </dgm:fillClrLst>
+    <dgm:linClrLst meth="repeat">
+      <a:schemeClr val="lt1"/>
+    </dgm:linClrLst>
+    <dgm:effectClrLst/>
+    <dgm:txLinClrLst/>
+    <dgm:txFillClrLst meth="repeat">
+      <a:schemeClr val="lt1"/>
+    </dgm:txFillClrLst>
+    <dgm:txEffectClrLst/>
+  </dgm:styleLbl>
+  <dgm:styleLbl name="parChTrans2D2">
+    <dgm:fillClrLst meth="repeat">
+      <a:schemeClr val="accent6"/>
+    </dgm:fillClrLst>
+    <dgm:linClrLst meth="repeat">
+      <a:schemeClr val="lt1"/>
+    </dgm:linClrLst>
+    <dgm:effectClrLst/>
+    <dgm:txLinClrLst/>
+    <dgm:txFillClrLst/>
+    <dgm:txEffectClrLst/>
+  </dgm:styleLbl>
+  <dgm:styleLbl name="parChTrans2D3">
+    <dgm:fillClrLst meth="repeat">
+      <a:schemeClr val="accent6"/>
+    </dgm:fillClrLst>
+    <dgm:linClrLst meth="repeat">
+      <a:schemeClr val="lt1"/>
+    </dgm:linClrLst>
+    <dgm:effectClrLst/>
+    <dgm:txLinClrLst/>
+    <dgm:txFillClrLst/>
+    <dgm:txEffectClrLst/>
+  </dgm:styleLbl>
+  <dgm:styleLbl name="parChTrans2D4">
+    <dgm:fillClrLst meth="repeat">
+      <a:schemeClr val="accent1"/>
+    </dgm:fillClrLst>
+    <dgm:linClrLst meth="repeat">
+      <a:schemeClr val="lt1"/>
+    </dgm:linClrLst>
+    <dgm:effectClrLst/>
+    <dgm:txLinClrLst/>
+    <dgm:txFillClrLst meth="repeat">
+      <a:schemeClr val="lt1"/>
+    </dgm:txFillClrLst>
+    <dgm:txEffectClrLst/>
+  </dgm:styleLbl>
+  <dgm:styleLbl name="parChTrans1D1">
+    <dgm:fillClrLst meth="repeat">
+      <a:schemeClr val="accent5"/>
+    </dgm:fillClrLst>
+    <dgm:linClrLst meth="repeat">
+      <a:schemeClr val="accent5"/>
+    </dgm:linClrLst>
+    <dgm:effectClrLst/>
+    <dgm:txLinClrLst/>
+    <dgm:txFillClrLst meth="repeat">
+      <a:schemeClr val="tx1"/>
+    </dgm:txFillClrLst>
+    <dgm:txEffectClrLst/>
+  </dgm:styleLbl>
+  <dgm:styleLbl name="parChTrans1D2">
+    <dgm:fillClrLst meth="repeat">
+      <a:schemeClr val="accent6">
+        <a:tint val="90000"/>
+      </a:schemeClr>
+    </dgm:fillClrLst>
+    <dgm:linClrLst meth="repeat">
+      <a:schemeClr val="accent6"/>
+    </dgm:linClrLst>
+    <dgm:effectClrLst/>
+    <dgm:txLinClrLst/>
+    <dgm:txFillClrLst meth="repeat">
+      <a:schemeClr val="tx1"/>
+    </dgm:txFillClrLst>
+    <dgm:txEffectClrLst/>
+  </dgm:styleLbl>
+  <dgm:styleLbl name="parChTrans1D3">
+    <dgm:fillClrLst meth="repeat">
+      <a:schemeClr val="accent6">
+        <a:tint val="70000"/>
+      </a:schemeClr>
+    </dgm:fillClrLst>
+    <dgm:linClrLst meth="repeat">
+      <a:schemeClr val="accent1"/>
+    </dgm:linClrLst>
+    <dgm:effectClrLst/>
+    <dgm:txLinClrLst/>
+    <dgm:txFillClrLst meth="repeat">
+      <a:schemeClr val="tx1"/>
+    </dgm:txFillClrLst>
+    <dgm:txEffectClrLst/>
+  </dgm:styleLbl>
+  <dgm:styleLbl name="parChTrans1D4">
+    <dgm:fillClrLst meth="repeat">
+      <a:schemeClr val="accent6">
+        <a:tint val="50000"/>
+      </a:schemeClr>
+    </dgm:fillClrLst>
+    <dgm:linClrLst meth="repeat">
+      <a:schemeClr val="accent2"/>
+    </dgm:linClrLst>
+    <dgm:effectClrLst/>
+    <dgm:txLinClrLst/>
+    <dgm:txFillClrLst meth="repeat">
+      <a:schemeClr val="tx1"/>
+    </dgm:txFillClrLst>
+    <dgm:txEffectClrLst/>
+  </dgm:styleLbl>
+  <dgm:styleLbl name="fgAcc1">
+    <dgm:fillClrLst meth="repeat">
+      <a:schemeClr val="lt1">
+        <a:alpha val="90000"/>
+      </a:schemeClr>
+    </dgm:fillClrLst>
+    <dgm:linClrLst>
+      <a:schemeClr val="accent5"/>
+      <a:schemeClr val="accent6"/>
+    </dgm:linClrLst>
+    <dgm:effectClrLst/>
+    <dgm:txLinClrLst/>
+    <dgm:txFillClrLst meth="repeat">
+      <a:schemeClr val="dk1"/>
+    </dgm:txFillClrLst>
+    <dgm:txEffectClrLst/>
+  </dgm:styleLbl>
+  <dgm:styleLbl name="conFgAcc1">
+    <dgm:fillClrLst meth="repeat">
+      <a:schemeClr val="lt1">
+        <a:alpha val="90000"/>
+      </a:schemeClr>
+    </dgm:fillClrLst>
+    <dgm:linClrLst>
+      <a:schemeClr val="accent5"/>
+      <a:schemeClr val="accent6"/>
+    </dgm:linClrLst>
+    <dgm:effectClrLst/>
+    <dgm:txLinClrLst/>
+    <dgm:txFillClrLst meth="repeat">
+      <a:schemeClr val="dk1"/>
+    </dgm:txFillClrLst>
+    <dgm:txEffectClrLst/>
+  </dgm:styleLbl>
+  <dgm:styleLbl name="alignAcc1">
+    <dgm:fillClrLst meth="repeat">
+      <a:schemeClr val="lt1">
+        <a:alpha val="90000"/>
+      </a:schemeClr>
+    </dgm:fillClrLst>
+    <dgm:linClrLst>
+      <a:schemeClr val="accent5"/>
+      <a:schemeClr val="accent6"/>
+    </dgm:linClrLst>
+    <dgm:effectClrLst/>
+    <dgm:txLinClrLst/>
+    <dgm:txFillClrLst meth="repeat">
+      <a:schemeClr val="dk1"/>
+    </dgm:txFillClrLst>
+    <dgm:txEffectClrLst/>
+  </dgm:styleLbl>
+  <dgm:styleLbl name="trAlignAcc1">
+    <dgm:fillClrLst meth="repeat">
+      <a:schemeClr val="lt1">
+        <a:alpha val="40000"/>
+      </a:schemeClr>
+    </dgm:fillClrLst>
+    <dgm:linClrLst meth="repeat">
+      <a:schemeClr val="accent5"/>
+    </dgm:linClrLst>
+    <dgm:effectClrLst/>
+    <dgm:txLinClrLst/>
+    <dgm:txFillClrLst meth="repeat">
+      <a:schemeClr val="dk1"/>
+    </dgm:txFillClrLst>
+    <dgm:txEffectClrLst/>
+  </dgm:styleLbl>
+  <dgm:styleLbl name="bgAcc1">
+    <dgm:fillClrLst meth="repeat">
+      <a:schemeClr val="lt1">
+        <a:alpha val="90000"/>
+      </a:schemeClr>
+    </dgm:fillClrLst>
+    <dgm:linClrLst>
+      <a:schemeClr val="accent5"/>
+      <a:schemeClr val="accent6"/>
+    </dgm:linClrLst>
+    <dgm:effectClrLst/>
+    <dgm:txLinClrLst/>
+    <dgm:txFillClrLst meth="repeat">
+      <a:schemeClr val="dk1"/>
+    </dgm:txFillClrLst>
+    <dgm:txEffectClrLst/>
+  </dgm:styleLbl>
+  <dgm:styleLbl name="solidFgAcc1">
+    <dgm:fillClrLst meth="repeat">
+      <a:schemeClr val="lt1"/>
+    </dgm:fillClrLst>
+    <dgm:linClrLst>
+      <a:schemeClr val="accent5"/>
+      <a:schemeClr val="accent6"/>
+    </dgm:linClrLst>
+    <dgm:effectClrLst/>
+    <dgm:txLinClrLst/>
+    <dgm:txFillClrLst meth="repeat">
+      <a:schemeClr val="dk1"/>
+    </dgm:txFillClrLst>
+    <dgm:txEffectClrLst/>
+  </dgm:styleLbl>
+  <dgm:styleLbl name="solidAlignAcc1">
+    <dgm:fillClrLst meth="repeat">
+      <a:schemeClr val="lt1"/>
+    </dgm:fillClrLst>
+    <dgm:linClrLst>
+      <a:schemeClr val="accent5"/>
+      <a:schemeClr val="accent6"/>
+    </dgm:linClrLst>
+    <dgm:effectClrLst/>
+    <dgm:txLinClrLst/>
+    <dgm:txFillClrLst meth="repeat">
+      <a:schemeClr val="dk1"/>
+    </dgm:txFillClrLst>
+    <dgm:txEffectClrLst/>
+  </dgm:styleLbl>
+  <dgm:styleLbl name="solidBgAcc1">
+    <dgm:fillClrLst meth="repeat">
+      <a:schemeClr val="lt1"/>
+    </dgm:fillClrLst>
+    <dgm:linClrLst>
+      <a:schemeClr val="accent5"/>
+      <a:schemeClr val="accent6"/>
+    </dgm:linClrLst>
+    <dgm:effectClrLst/>
+    <dgm:txLinClrLst/>
+    <dgm:txFillClrLst meth="repeat">
+      <a:schemeClr val="dk1"/>
+    </dgm:txFillClrLst>
+    <dgm:txEffectClrLst/>
+  </dgm:styleLbl>
+  <dgm:styleLbl name="fgAccFollowNode1">
+    <dgm:fillClrLst>
+      <a:schemeClr val="accent5">
+        <a:tint val="40000"/>
+        <a:alpha val="90000"/>
+      </a:schemeClr>
+      <a:schemeClr val="accent6">
+        <a:tint val="40000"/>
+        <a:alpha val="90000"/>
+      </a:schemeClr>
+    </dgm:fillClrLst>
+    <dgm:linClrLst>
+      <a:schemeClr val="accent5">
+        <a:tint val="40000"/>
+        <a:alpha val="90000"/>
+      </a:schemeClr>
+      <a:schemeClr val="accent5">
+        <a:tint val="40000"/>
+        <a:alpha val="90000"/>
+      </a:schemeClr>
+    </dgm:linClrLst>
+    <dgm:effectClrLst/>
+    <dgm:txLinClrLst/>
+    <dgm:txFillClrLst meth="repeat">
+      <a:schemeClr val="dk1"/>
+    </dgm:txFillClrLst>
+    <dgm:txEffectClrLst/>
+  </dgm:styleLbl>
+  <dgm:styleLbl name="alignAccFollowNode1">
+    <dgm:fillClrLst>
+      <a:schemeClr val="accent5">
+        <a:tint val="40000"/>
+        <a:alpha val="90000"/>
+      </a:schemeClr>
+      <a:schemeClr val="accent6">
+        <a:tint val="40000"/>
+        <a:alpha val="90000"/>
+      </a:schemeClr>
+    </dgm:fillClrLst>
+    <dgm:linClrLst>
+      <a:schemeClr val="accent5">
+        <a:tint val="40000"/>
+        <a:alpha val="90000"/>
+      </a:schemeClr>
+      <a:schemeClr val="accent6">
+        <a:tint val="40000"/>
+        <a:alpha val="90000"/>
+      </a:schemeClr>
+    </dgm:linClrLst>
+    <dgm:effectClrLst/>
+    <dgm:txLinClrLst/>
+    <dgm:txFillClrLst meth="repeat">
+      <a:schemeClr val="dk1"/>
+    </dgm:txFillClrLst>
+    <dgm:txEffectClrLst/>
+  </dgm:styleLbl>
+  <dgm:styleLbl name="bgAccFollowNode1">
+    <dgm:fillClrLst>
+      <a:schemeClr val="accent5">
+        <a:tint val="40000"/>
+        <a:alpha val="90000"/>
+      </a:schemeClr>
+      <a:schemeClr val="accent6">
+        <a:tint val="40000"/>
+        <a:alpha val="90000"/>
+      </a:schemeClr>
+    </dgm:fillClrLst>
+    <dgm:linClrLst>
+      <a:schemeClr val="accent5">
+        <a:tint val="40000"/>
+        <a:alpha val="90000"/>
+      </a:schemeClr>
+      <a:schemeClr val="accent6">
+        <a:tint val="40000"/>
+        <a:alpha val="90000"/>
+      </a:schemeClr>
+    </dgm:linClrLst>
+    <dgm:effectClrLst/>
+    <dgm:txLinClrLst/>
+    <dgm:txFillClrLst meth="repeat">
+      <a:schemeClr val="dk1"/>
+    </dgm:txFillClrLst>
+    <dgm:txEffectClrLst/>
+  </dgm:styleLbl>
+  <dgm:styleLbl name="fgAcc0">
+    <dgm:fillClrLst meth="repeat">
+      <a:schemeClr val="lt1">
+        <a:alpha val="90000"/>
+      </a:schemeClr>
+    </dgm:fillClrLst>
+    <dgm:linClrLst>
+      <a:schemeClr val="accent4"/>
+    </dgm:linClrLst>
+    <dgm:effectClrLst/>
+    <dgm:txLinClrLst/>
+    <dgm:txFillClrLst meth="repeat">
+      <a:schemeClr val="dk1"/>
+    </dgm:txFillClrLst>
+    <dgm:txEffectClrLst/>
+  </dgm:styleLbl>
+  <dgm:styleLbl name="fgAcc2">
+    <dgm:fillClrLst meth="repeat">
+      <a:schemeClr val="lt1">
+        <a:alpha val="90000"/>
+      </a:schemeClr>
+    </dgm:fillClrLst>
+    <dgm:linClrLst>
+      <a:schemeClr val="accent6"/>
+    </dgm:linClrLst>
+    <dgm:effectClrLst/>
+    <dgm:txLinClrLst/>
+    <dgm:txFillClrLst meth="repeat">
+      <a:schemeClr val="dk1"/>
+    </dgm:txFillClrLst>
+    <dgm:txEffectClrLst/>
+  </dgm:styleLbl>
+  <dgm:styleLbl name="fgAcc3">
+    <dgm:fillClrLst meth="repeat">
+      <a:schemeClr val="lt1">
+        <a:alpha val="90000"/>
+      </a:schemeClr>
+    </dgm:fillClrLst>
+    <dgm:linClrLst>
+      <a:schemeClr val="accent1"/>
+    </dgm:linClrLst>
+    <dgm:effectClrLst/>
+    <dgm:txLinClrLst/>
+    <dgm:txFillClrLst meth="repeat">
+      <a:schemeClr val="dk1"/>
+    </dgm:txFillClrLst>
+    <dgm:txEffectClrLst/>
+  </dgm:styleLbl>
+  <dgm:styleLbl name="fgAcc4">
+    <dgm:fillClrLst meth="repeat">
+      <a:schemeClr val="lt1">
+        <a:alpha val="90000"/>
+      </a:schemeClr>
+    </dgm:fillClrLst>
+    <dgm:linClrLst>
+      <a:schemeClr val="accent2"/>
+    </dgm:linClrLst>
+    <dgm:effectClrLst/>
+    <dgm:txLinClrLst/>
+    <dgm:txFillClrLst meth="repeat">
+      <a:schemeClr val="dk1"/>
+    </dgm:txFillClrLst>
+    <dgm:txEffectClrLst/>
+  </dgm:styleLbl>
+  <dgm:styleLbl name="bgShp">
+    <dgm:fillClrLst meth="repeat">
+      <a:schemeClr val="bg1">
+        <a:lumMod val="95000"/>
+      </a:schemeClr>
+    </dgm:fillClrLst>
+    <dgm:linClrLst meth="repeat">
+      <a:schemeClr val="dk1"/>
+    </dgm:linClrLst>
+    <dgm:effectClrLst/>
+    <dgm:txLinClrLst/>
+    <dgm:txFillClrLst meth="repeat">
+      <a:schemeClr val="dk1"/>
+    </dgm:txFillClrLst>
+    <dgm:txEffectClrLst/>
+  </dgm:styleLbl>
+  <dgm:styleLbl name="dkBgShp">
+    <dgm:fillClrLst meth="repeat">
+      <a:schemeClr val="accent5">
+        <a:shade val="90000"/>
+      </a:schemeClr>
+    </dgm:fillClrLst>
+    <dgm:linClrLst meth="repeat">
+      <a:schemeClr val="dk1"/>
+    </dgm:linClrLst>
+    <dgm:effectClrLst/>
+    <dgm:txLinClrLst/>
+    <dgm:txFillClrLst meth="repeat">
+      <a:schemeClr val="lt1"/>
+    </dgm:txFillClrLst>
+    <dgm:txEffectClrLst/>
+  </dgm:styleLbl>
+  <dgm:styleLbl name="trBgShp">
+    <dgm:fillClrLst meth="repeat">
+      <a:schemeClr val="accent5">
+        <a:tint val="50000"/>
+        <a:alpha val="40000"/>
+      </a:schemeClr>
+    </dgm:fillClrLst>
+    <dgm:linClrLst meth="repeat">
+      <a:schemeClr val="accent5"/>
+    </dgm:linClrLst>
+    <dgm:effectClrLst/>
+    <dgm:txLinClrLst/>
+    <dgm:txFillClrLst meth="repeat">
+      <a:schemeClr val="lt1"/>
+    </dgm:txFillClrLst>
+    <dgm:txEffectClrLst/>
+  </dgm:styleLbl>
+  <dgm:styleLbl name="fgShp">
+    <dgm:fillClrLst meth="repeat">
+      <a:schemeClr val="accent5">
+        <a:tint val="40000"/>
+      </a:schemeClr>
+    </dgm:fillClrLst>
+    <dgm:linClrLst meth="repeat">
+      <a:schemeClr val="lt1"/>
+    </dgm:linClrLst>
+    <dgm:effectClrLst/>
+    <dgm:txLinClrLst/>
+    <dgm:txFillClrLst meth="repeat">
+      <a:schemeClr val="dk1"/>
+    </dgm:txFillClrLst>
+    <dgm:txEffectClrLst/>
+  </dgm:styleLbl>
+  <dgm:styleLbl name="revTx">
+    <dgm:fillClrLst meth="repeat">
+      <a:schemeClr val="lt1">
+        <a:alpha val="0"/>
+      </a:schemeClr>
+    </dgm:fillClrLst>
+    <dgm:linClrLst meth="repeat">
+      <a:schemeClr val="dk1">
+        <a:alpha val="0"/>
+      </a:schemeClr>
+    </dgm:linClrLst>
+    <dgm:effectClrLst/>
+    <dgm:txLinClrLst/>
+    <dgm:txFillClrLst meth="repeat">
+      <a:schemeClr val="tx1"/>
+    </dgm:txFillClrLst>
+    <dgm:txEffectClrLst/>
+  </dgm:styleLbl>
+</dgm:colorsDef>
+</file>
+
 <file path=ppt/diagrams/data1.xml><?xml version="1.0" encoding="utf-8"?>
+<dgm:dataModel xmlns:dgm="http://schemas.openxmlformats.org/drawingml/2006/diagram" xmlns:a="http://schemas.openxmlformats.org/drawingml/2006/main">
+  <dgm:ptLst>
+    <dgm:pt modelId="{C1B36B67-7423-455F-80B4-16ABA14C54A9}" type="doc">
+      <dgm:prSet loTypeId="urn:microsoft.com/office/officeart/2018/2/layout/IconVerticalSolidList" loCatId="icon" qsTypeId="urn:microsoft.com/office/officeart/2005/8/quickstyle/simple1" qsCatId="simple" csTypeId="urn:microsoft.com/office/officeart/2018/5/colors/Iconchunking_neutralbg_colorful5" csCatId="colorful" phldr="1"/>
+      <dgm:spPr/>
+      <dgm:t>
+        <a:bodyPr/>
+        <a:lstStyle/>
+        <a:p>
+          <a:endParaRPr lang="en-US"/>
+        </a:p>
+      </dgm:t>
+    </dgm:pt>
+    <dgm:pt modelId="{095200FE-AFA1-489F-9E9C-D4451205554B}">
+      <dgm:prSet/>
+      <dgm:spPr/>
+      <dgm:t>
+        <a:bodyPr/>
+        <a:lstStyle/>
+        <a:p>
+          <a:pPr>
+            <a:lnSpc>
+              <a:spcPct val="100000"/>
+            </a:lnSpc>
+          </a:pPr>
+          <a:r>
+            <a:rPr lang="nl-BE" dirty="0"/>
+            <a:t>Delay </a:t>
+          </a:r>
+          <a:r>
+            <a:rPr lang="nl-BE" dirty="0" err="1"/>
+            <a:t>times</a:t>
+          </a:r>
+          <a:r>
+            <a:rPr lang="nl-BE" dirty="0"/>
+            <a:t> </a:t>
+          </a:r>
+          <a:r>
+            <a:rPr lang="nl-BE" dirty="0" err="1"/>
+            <a:t>for</a:t>
+          </a:r>
+          <a:r>
+            <a:rPr lang="nl-BE" dirty="0"/>
+            <a:t> </a:t>
+          </a:r>
+          <a:r>
+            <a:rPr lang="nl-BE" dirty="0" err="1"/>
+            <a:t>deliveries</a:t>
+          </a:r>
+          <a:r>
+            <a:rPr lang="nl-BE" dirty="0"/>
+            <a:t> </a:t>
+          </a:r>
+          <a:r>
+            <a:rPr lang="nl-BE" dirty="0" err="1"/>
+            <a:t>due</a:t>
+          </a:r>
+          <a:r>
+            <a:rPr lang="nl-BE" dirty="0"/>
+            <a:t> corona </a:t>
+          </a:r>
+          <a:r>
+            <a:rPr lang="nl-BE" dirty="0" err="1"/>
+            <a:t>measures</a:t>
+          </a:r>
+          <a:r>
+            <a:rPr lang="nl-BE" dirty="0"/>
+            <a:t> </a:t>
+          </a:r>
+          <a:endParaRPr lang="en-US" dirty="0"/>
+        </a:p>
+      </dgm:t>
+    </dgm:pt>
+    <dgm:pt modelId="{2CA00AC6-D504-483B-BD4C-8C77599D54F5}" type="parTrans" cxnId="{3AA513BB-297E-42F5-878E-89EE4D28425F}">
+      <dgm:prSet/>
+      <dgm:spPr/>
+      <dgm:t>
+        <a:bodyPr/>
+        <a:lstStyle/>
+        <a:p>
+          <a:endParaRPr lang="en-US"/>
+        </a:p>
+      </dgm:t>
+    </dgm:pt>
+    <dgm:pt modelId="{0F51401E-1296-4C23-954E-3630A94D5233}" type="sibTrans" cxnId="{3AA513BB-297E-42F5-878E-89EE4D28425F}">
+      <dgm:prSet/>
+      <dgm:spPr/>
+      <dgm:t>
+        <a:bodyPr/>
+        <a:lstStyle/>
+        <a:p>
+          <a:endParaRPr lang="en-US"/>
+        </a:p>
+      </dgm:t>
+    </dgm:pt>
+    <dgm:pt modelId="{21E912EE-226E-4349-9060-86B9BB5A71BE}">
+      <dgm:prSet/>
+      <dgm:spPr/>
+      <dgm:t>
+        <a:bodyPr/>
+        <a:lstStyle/>
+        <a:p>
+          <a:pPr>
+            <a:lnSpc>
+              <a:spcPct val="100000"/>
+            </a:lnSpc>
+          </a:pPr>
+          <a:r>
+            <a:rPr lang="en-US" dirty="0"/>
+            <a:t>Lack of tools/instruments to solder and for testing:</a:t>
+          </a:r>
+        </a:p>
+        <a:p>
+          <a:pPr>
+            <a:lnSpc>
+              <a:spcPct val="100000"/>
+            </a:lnSpc>
+          </a:pPr>
+          <a:r>
+            <a:rPr lang="en-US" dirty="0"/>
+            <a:t>  - Most power management IC’s have an exposed pad which needs a solder oven to solder properly</a:t>
+          </a:r>
+        </a:p>
+        <a:p>
+          <a:pPr>
+            <a:lnSpc>
+              <a:spcPct val="100000"/>
+            </a:lnSpc>
+          </a:pPr>
+          <a:r>
+            <a:rPr lang="en-US" dirty="0"/>
+            <a:t>  - Lack of oscilloscope etc.</a:t>
+          </a:r>
+        </a:p>
+      </dgm:t>
+    </dgm:pt>
+    <dgm:pt modelId="{C97EE9BD-37EC-4227-BB7C-211D09E41834}" type="parTrans" cxnId="{AC4FB2C4-1F0E-47A4-B67A-1D33A25A4641}">
+      <dgm:prSet/>
+      <dgm:spPr/>
+      <dgm:t>
+        <a:bodyPr/>
+        <a:lstStyle/>
+        <a:p>
+          <a:endParaRPr lang="en-US"/>
+        </a:p>
+      </dgm:t>
+    </dgm:pt>
+    <dgm:pt modelId="{C7BF5290-2D4F-4987-90E4-68B2503DCB9C}" type="sibTrans" cxnId="{AC4FB2C4-1F0E-47A4-B67A-1D33A25A4641}">
+      <dgm:prSet/>
+      <dgm:spPr/>
+      <dgm:t>
+        <a:bodyPr/>
+        <a:lstStyle/>
+        <a:p>
+          <a:endParaRPr lang="en-US"/>
+        </a:p>
+      </dgm:t>
+    </dgm:pt>
+    <dgm:pt modelId="{89D3B37B-5B13-4E54-B1CD-747F5B798EAB}">
+      <dgm:prSet/>
+      <dgm:spPr/>
+      <dgm:t>
+        <a:bodyPr/>
+        <a:lstStyle/>
+        <a:p>
+          <a:pPr>
+            <a:lnSpc>
+              <a:spcPct val="100000"/>
+            </a:lnSpc>
+          </a:pPr>
+          <a:endParaRPr lang="en-US" dirty="0"/>
+        </a:p>
+      </dgm:t>
+    </dgm:pt>
+    <dgm:pt modelId="{4E6C6D3D-F600-4D7E-9471-AF09CB96472D}" type="parTrans" cxnId="{C3E1C314-E9F7-42F5-BD6F-0056F8779FDD}">
+      <dgm:prSet/>
+      <dgm:spPr/>
+      <dgm:t>
+        <a:bodyPr/>
+        <a:lstStyle/>
+        <a:p>
+          <a:endParaRPr lang="en-US"/>
+        </a:p>
+      </dgm:t>
+    </dgm:pt>
+    <dgm:pt modelId="{CED27530-607F-490D-B608-7EF984C3FF00}" type="sibTrans" cxnId="{C3E1C314-E9F7-42F5-BD6F-0056F8779FDD}">
+      <dgm:prSet/>
+      <dgm:spPr/>
+      <dgm:t>
+        <a:bodyPr/>
+        <a:lstStyle/>
+        <a:p>
+          <a:endParaRPr lang="en-US"/>
+        </a:p>
+      </dgm:t>
+    </dgm:pt>
+    <dgm:pt modelId="{0A02097D-025A-44E0-84CC-8A07112E1C11}" type="pres">
+      <dgm:prSet presAssocID="{C1B36B67-7423-455F-80B4-16ABA14C54A9}" presName="root" presStyleCnt="0">
+        <dgm:presLayoutVars>
+          <dgm:dir/>
+          <dgm:resizeHandles val="exact"/>
+        </dgm:presLayoutVars>
+      </dgm:prSet>
+      <dgm:spPr/>
+    </dgm:pt>
+    <dgm:pt modelId="{B1AE832F-122C-4F79-B7D0-6AD91B4B1693}" type="pres">
+      <dgm:prSet presAssocID="{095200FE-AFA1-489F-9E9C-D4451205554B}" presName="compNode" presStyleCnt="0"/>
+      <dgm:spPr/>
+    </dgm:pt>
+    <dgm:pt modelId="{1CF0038E-E85A-486E-97DA-56B502AA6753}" type="pres">
+      <dgm:prSet presAssocID="{095200FE-AFA1-489F-9E9C-D4451205554B}" presName="bgRect" presStyleLbl="bgShp" presStyleIdx="0" presStyleCnt="3"/>
+      <dgm:spPr/>
+    </dgm:pt>
+    <dgm:pt modelId="{B41A1DCA-1248-4C07-90F2-686FB3C652D9}" type="pres">
+      <dgm:prSet presAssocID="{095200FE-AFA1-489F-9E9C-D4451205554B}" presName="iconRect" presStyleLbl="node1" presStyleIdx="0" presStyleCnt="3"/>
+      <dgm:spPr>
+        <a:blipFill>
+          <a:blip xmlns:r="http://schemas.openxmlformats.org/officeDocument/2006/relationships" r:embed="rId1">
+            <a:extLst>
+              <a:ext uri="{28A0092B-C50C-407E-A947-70E740481C1C}">
+                <a14:useLocalDpi xmlns:a14="http://schemas.microsoft.com/office/drawing/2010/main" val="0"/>
+              </a:ext>
+              <a:ext uri="{96DAC541-7B7A-43D3-8B79-37D633B846F1}">
+                <asvg:svgBlip xmlns:asvg="http://schemas.microsoft.com/office/drawing/2016/SVG/main" r:embed="rId2"/>
+              </a:ext>
+            </a:extLst>
+          </a:blip>
+          <a:stretch>
+            <a:fillRect/>
+          </a:stretch>
+        </a:blipFill>
+        <a:ln>
+          <a:noFill/>
+        </a:ln>
+      </dgm:spPr>
+      <dgm:extLst>
+        <a:ext uri="{E40237B7-FDA0-4F09-8148-C483321AD2D9}">
+          <dgm14:cNvPr xmlns:dgm14="http://schemas.microsoft.com/office/drawing/2010/diagram" id="0" name="" descr="Forbidden"/>
+        </a:ext>
+      </dgm:extLst>
+    </dgm:pt>
+    <dgm:pt modelId="{05F4F4EB-E14F-4DBF-AE10-DD16447E0681}" type="pres">
+      <dgm:prSet presAssocID="{095200FE-AFA1-489F-9E9C-D4451205554B}" presName="spaceRect" presStyleCnt="0"/>
+      <dgm:spPr/>
+    </dgm:pt>
+    <dgm:pt modelId="{280C2505-5A26-4E5D-8FF7-75A5D63A45AC}" type="pres">
+      <dgm:prSet presAssocID="{095200FE-AFA1-489F-9E9C-D4451205554B}" presName="parTx" presStyleLbl="revTx" presStyleIdx="0" presStyleCnt="3">
+        <dgm:presLayoutVars>
+          <dgm:chMax val="0"/>
+          <dgm:chPref val="0"/>
+        </dgm:presLayoutVars>
+      </dgm:prSet>
+      <dgm:spPr/>
+    </dgm:pt>
+    <dgm:pt modelId="{64FBE8BC-38C7-4489-B3FD-A7F8242F793D}" type="pres">
+      <dgm:prSet presAssocID="{0F51401E-1296-4C23-954E-3630A94D5233}" presName="sibTrans" presStyleCnt="0"/>
+      <dgm:spPr/>
+    </dgm:pt>
+    <dgm:pt modelId="{5A3D8491-6619-45A5-B801-E96533C3E5E5}" type="pres">
+      <dgm:prSet presAssocID="{21E912EE-226E-4349-9060-86B9BB5A71BE}" presName="compNode" presStyleCnt="0"/>
+      <dgm:spPr/>
+    </dgm:pt>
+    <dgm:pt modelId="{E8E2175B-D0BE-4533-B2EB-00C0BE910F0A}" type="pres">
+      <dgm:prSet presAssocID="{21E912EE-226E-4349-9060-86B9BB5A71BE}" presName="bgRect" presStyleLbl="bgShp" presStyleIdx="1" presStyleCnt="3" custLinFactNeighborX="-47486" custLinFactNeighborY="9596"/>
+      <dgm:spPr>
+        <a:solidFill>
+          <a:schemeClr val="bg1"/>
+        </a:solidFill>
+      </dgm:spPr>
+    </dgm:pt>
+    <dgm:pt modelId="{15A2BC8A-DEDE-4B02-8AC0-AFBEE9D62A7D}" type="pres">
+      <dgm:prSet presAssocID="{21E912EE-226E-4349-9060-86B9BB5A71BE}" presName="iconRect" presStyleLbl="node1" presStyleIdx="1" presStyleCnt="3" custLinFactNeighborX="-3489"/>
+      <dgm:spPr>
+        <a:blipFill rotWithShape="1">
+          <a:blip xmlns:r="http://schemas.openxmlformats.org/officeDocument/2006/relationships" r:embed="rId3">
+            <a:extLst>
+              <a:ext uri="{28A0092B-C50C-407E-A947-70E740481C1C}">
+                <a14:useLocalDpi xmlns:a14="http://schemas.microsoft.com/office/drawing/2010/main" val="0"/>
+              </a:ext>
+              <a:ext uri="{96DAC541-7B7A-43D3-8B79-37D633B846F1}">
+                <asvg:svgBlip xmlns:asvg="http://schemas.microsoft.com/office/drawing/2016/SVG/main" r:embed="rId4"/>
+              </a:ext>
+            </a:extLst>
+          </a:blip>
+          <a:srcRect/>
+          <a:stretch>
+            <a:fillRect/>
+          </a:stretch>
+        </a:blipFill>
+        <a:ln>
+          <a:noFill/>
+        </a:ln>
+      </dgm:spPr>
+      <dgm:extLst>
+        <a:ext uri="{E40237B7-FDA0-4F09-8148-C483321AD2D9}">
+          <dgm14:cNvPr xmlns:dgm14="http://schemas.microsoft.com/office/drawing/2010/diagram" id="0" name="" descr="Windmill"/>
+        </a:ext>
+      </dgm:extLst>
+    </dgm:pt>
+    <dgm:pt modelId="{DBA14614-20C2-4E4A-B2CC-D554207F0C9A}" type="pres">
+      <dgm:prSet presAssocID="{21E912EE-226E-4349-9060-86B9BB5A71BE}" presName="spaceRect" presStyleCnt="0"/>
+      <dgm:spPr/>
+    </dgm:pt>
+    <dgm:pt modelId="{B6239110-8497-4C7B-AB23-09163A799831}" type="pres">
+      <dgm:prSet presAssocID="{21E912EE-226E-4349-9060-86B9BB5A71BE}" presName="parTx" presStyleLbl="revTx" presStyleIdx="1" presStyleCnt="3">
+        <dgm:presLayoutVars>
+          <dgm:chMax val="0"/>
+          <dgm:chPref val="0"/>
+        </dgm:presLayoutVars>
+      </dgm:prSet>
+      <dgm:spPr/>
+    </dgm:pt>
+    <dgm:pt modelId="{29C292E5-3547-4369-8F86-EAC3D8D4FA9D}" type="pres">
+      <dgm:prSet presAssocID="{C7BF5290-2D4F-4987-90E4-68B2503DCB9C}" presName="sibTrans" presStyleCnt="0"/>
+      <dgm:spPr/>
+    </dgm:pt>
+    <dgm:pt modelId="{B068D6C2-FC2E-42D1-BE79-2088783CC987}" type="pres">
+      <dgm:prSet presAssocID="{89D3B37B-5B13-4E54-B1CD-747F5B798EAB}" presName="compNode" presStyleCnt="0"/>
+      <dgm:spPr/>
+    </dgm:pt>
+    <dgm:pt modelId="{3147CF68-3E84-4515-8543-A173DE3B027E}" type="pres">
+      <dgm:prSet presAssocID="{89D3B37B-5B13-4E54-B1CD-747F5B798EAB}" presName="bgRect" presStyleLbl="bgShp" presStyleIdx="2" presStyleCnt="3"/>
+      <dgm:spPr>
+        <a:noFill/>
+      </dgm:spPr>
+    </dgm:pt>
+    <dgm:pt modelId="{0272383D-EA2F-49BC-A891-DF028F40C6F6}" type="pres">
+      <dgm:prSet presAssocID="{89D3B37B-5B13-4E54-B1CD-747F5B798EAB}" presName="iconRect" presStyleLbl="node1" presStyleIdx="2" presStyleCnt="3"/>
+      <dgm:spPr>
+        <a:noFill/>
+        <a:ln>
+          <a:noFill/>
+        </a:ln>
+      </dgm:spPr>
+      <dgm:extLst>
+        <a:ext uri="{E40237B7-FDA0-4F09-8148-C483321AD2D9}">
+          <dgm14:cNvPr xmlns:dgm14="http://schemas.microsoft.com/office/drawing/2010/diagram" id="0" name="" descr="Scientist"/>
+        </a:ext>
+      </dgm:extLst>
+    </dgm:pt>
+    <dgm:pt modelId="{04AE60CE-D08B-45B1-A69C-F47F910B534C}" type="pres">
+      <dgm:prSet presAssocID="{89D3B37B-5B13-4E54-B1CD-747F5B798EAB}" presName="spaceRect" presStyleCnt="0"/>
+      <dgm:spPr/>
+    </dgm:pt>
+    <dgm:pt modelId="{AA06599F-BD5E-4CAA-AC1A-9AB7C7477DC5}" type="pres">
+      <dgm:prSet presAssocID="{89D3B37B-5B13-4E54-B1CD-747F5B798EAB}" presName="parTx" presStyleLbl="revTx" presStyleIdx="2" presStyleCnt="3">
+        <dgm:presLayoutVars>
+          <dgm:chMax val="0"/>
+          <dgm:chPref val="0"/>
+        </dgm:presLayoutVars>
+      </dgm:prSet>
+      <dgm:spPr/>
+    </dgm:pt>
+  </dgm:ptLst>
+  <dgm:cxnLst>
+    <dgm:cxn modelId="{C3E1C314-E9F7-42F5-BD6F-0056F8779FDD}" srcId="{C1B36B67-7423-455F-80B4-16ABA14C54A9}" destId="{89D3B37B-5B13-4E54-B1CD-747F5B798EAB}" srcOrd="2" destOrd="0" parTransId="{4E6C6D3D-F600-4D7E-9471-AF09CB96472D}" sibTransId="{CED27530-607F-490D-B608-7EF984C3FF00}"/>
+    <dgm:cxn modelId="{E38BCC8B-E529-4532-BF65-83A261B45862}" type="presOf" srcId="{21E912EE-226E-4349-9060-86B9BB5A71BE}" destId="{B6239110-8497-4C7B-AB23-09163A799831}" srcOrd="0" destOrd="0" presId="urn:microsoft.com/office/officeart/2018/2/layout/IconVerticalSolidList"/>
+    <dgm:cxn modelId="{541C7694-CEB1-4BF6-B258-84398112CC2E}" type="presOf" srcId="{095200FE-AFA1-489F-9E9C-D4451205554B}" destId="{280C2505-5A26-4E5D-8FF7-75A5D63A45AC}" srcOrd="0" destOrd="0" presId="urn:microsoft.com/office/officeart/2018/2/layout/IconVerticalSolidList"/>
+    <dgm:cxn modelId="{DE3D84A6-DF14-4F2B-8632-01D3F8768ED1}" type="presOf" srcId="{89D3B37B-5B13-4E54-B1CD-747F5B798EAB}" destId="{AA06599F-BD5E-4CAA-AC1A-9AB7C7477DC5}" srcOrd="0" destOrd="0" presId="urn:microsoft.com/office/officeart/2018/2/layout/IconVerticalSolidList"/>
+    <dgm:cxn modelId="{3AA513BB-297E-42F5-878E-89EE4D28425F}" srcId="{C1B36B67-7423-455F-80B4-16ABA14C54A9}" destId="{095200FE-AFA1-489F-9E9C-D4451205554B}" srcOrd="0" destOrd="0" parTransId="{2CA00AC6-D504-483B-BD4C-8C77599D54F5}" sibTransId="{0F51401E-1296-4C23-954E-3630A94D5233}"/>
+    <dgm:cxn modelId="{AC4FB2C4-1F0E-47A4-B67A-1D33A25A4641}" srcId="{C1B36B67-7423-455F-80B4-16ABA14C54A9}" destId="{21E912EE-226E-4349-9060-86B9BB5A71BE}" srcOrd="1" destOrd="0" parTransId="{C97EE9BD-37EC-4227-BB7C-211D09E41834}" sibTransId="{C7BF5290-2D4F-4987-90E4-68B2503DCB9C}"/>
+    <dgm:cxn modelId="{C6C85EE4-3D7F-4293-BD4C-D9747A9A37C5}" type="presOf" srcId="{C1B36B67-7423-455F-80B4-16ABA14C54A9}" destId="{0A02097D-025A-44E0-84CC-8A07112E1C11}" srcOrd="0" destOrd="0" presId="urn:microsoft.com/office/officeart/2018/2/layout/IconVerticalSolidList"/>
+    <dgm:cxn modelId="{AA4B8B57-3CB4-47A4-A267-63686C95C2F9}" type="presParOf" srcId="{0A02097D-025A-44E0-84CC-8A07112E1C11}" destId="{B1AE832F-122C-4F79-B7D0-6AD91B4B1693}" srcOrd="0" destOrd="0" presId="urn:microsoft.com/office/officeart/2018/2/layout/IconVerticalSolidList"/>
+    <dgm:cxn modelId="{57FEEEE9-6AE1-4119-9F35-9F1B8BB8911A}" type="presParOf" srcId="{B1AE832F-122C-4F79-B7D0-6AD91B4B1693}" destId="{1CF0038E-E85A-486E-97DA-56B502AA6753}" srcOrd="0" destOrd="0" presId="urn:microsoft.com/office/officeart/2018/2/layout/IconVerticalSolidList"/>
+    <dgm:cxn modelId="{66F5972C-BE25-4873-B378-CFE1FED9025F}" type="presParOf" srcId="{B1AE832F-122C-4F79-B7D0-6AD91B4B1693}" destId="{B41A1DCA-1248-4C07-90F2-686FB3C652D9}" srcOrd="1" destOrd="0" presId="urn:microsoft.com/office/officeart/2018/2/layout/IconVerticalSolidList"/>
+    <dgm:cxn modelId="{834F6D8C-7274-47BE-BCD5-3C2E3BE86FC1}" type="presParOf" srcId="{B1AE832F-122C-4F79-B7D0-6AD91B4B1693}" destId="{05F4F4EB-E14F-4DBF-AE10-DD16447E0681}" srcOrd="2" destOrd="0" presId="urn:microsoft.com/office/officeart/2018/2/layout/IconVerticalSolidList"/>
+    <dgm:cxn modelId="{F97D43E2-4C7F-4A08-A733-A29CCF96378A}" type="presParOf" srcId="{B1AE832F-122C-4F79-B7D0-6AD91B4B1693}" destId="{280C2505-5A26-4E5D-8FF7-75A5D63A45AC}" srcOrd="3" destOrd="0" presId="urn:microsoft.com/office/officeart/2018/2/layout/IconVerticalSolidList"/>
+    <dgm:cxn modelId="{216EDB89-3F19-4212-A3D2-1DC8025D1AFE}" type="presParOf" srcId="{0A02097D-025A-44E0-84CC-8A07112E1C11}" destId="{64FBE8BC-38C7-4489-B3FD-A7F8242F793D}" srcOrd="1" destOrd="0" presId="urn:microsoft.com/office/officeart/2018/2/layout/IconVerticalSolidList"/>
+    <dgm:cxn modelId="{03048699-2205-4DC6-AB2F-22DB1A27D13C}" type="presParOf" srcId="{0A02097D-025A-44E0-84CC-8A07112E1C11}" destId="{5A3D8491-6619-45A5-B801-E96533C3E5E5}" srcOrd="2" destOrd="0" presId="urn:microsoft.com/office/officeart/2018/2/layout/IconVerticalSolidList"/>
+    <dgm:cxn modelId="{69A41A33-7037-46F3-8355-D4262284006B}" type="presParOf" srcId="{5A3D8491-6619-45A5-B801-E96533C3E5E5}" destId="{E8E2175B-D0BE-4533-B2EB-00C0BE910F0A}" srcOrd="0" destOrd="0" presId="urn:microsoft.com/office/officeart/2018/2/layout/IconVerticalSolidList"/>
+    <dgm:cxn modelId="{4F0BF993-BB21-4F91-A34C-B6E45A8179B9}" type="presParOf" srcId="{5A3D8491-6619-45A5-B801-E96533C3E5E5}" destId="{15A2BC8A-DEDE-4B02-8AC0-AFBEE9D62A7D}" srcOrd="1" destOrd="0" presId="urn:microsoft.com/office/officeart/2018/2/layout/IconVerticalSolidList"/>
+    <dgm:cxn modelId="{A70EEAF3-DF03-46DB-A97F-580F1BE1BE69}" type="presParOf" srcId="{5A3D8491-6619-45A5-B801-E96533C3E5E5}" destId="{DBA14614-20C2-4E4A-B2CC-D554207F0C9A}" srcOrd="2" destOrd="0" presId="urn:microsoft.com/office/officeart/2018/2/layout/IconVerticalSolidList"/>
+    <dgm:cxn modelId="{73F2323B-0AE5-4D5B-8E5E-3C8FB2C8C981}" type="presParOf" srcId="{5A3D8491-6619-45A5-B801-E96533C3E5E5}" destId="{B6239110-8497-4C7B-AB23-09163A799831}" srcOrd="3" destOrd="0" presId="urn:microsoft.com/office/officeart/2018/2/layout/IconVerticalSolidList"/>
+    <dgm:cxn modelId="{974F82AA-1A04-4914-9AC4-6E12818FC48C}" type="presParOf" srcId="{0A02097D-025A-44E0-84CC-8A07112E1C11}" destId="{29C292E5-3547-4369-8F86-EAC3D8D4FA9D}" srcOrd="3" destOrd="0" presId="urn:microsoft.com/office/officeart/2018/2/layout/IconVerticalSolidList"/>
+    <dgm:cxn modelId="{F10ABA6C-8C2B-4D0E-86D3-D10BC825DC8D}" type="presParOf" srcId="{0A02097D-025A-44E0-84CC-8A07112E1C11}" destId="{B068D6C2-FC2E-42D1-BE79-2088783CC987}" srcOrd="4" destOrd="0" presId="urn:microsoft.com/office/officeart/2018/2/layout/IconVerticalSolidList"/>
+    <dgm:cxn modelId="{20B807E1-B220-45D0-B84B-D219034D983E}" type="presParOf" srcId="{B068D6C2-FC2E-42D1-BE79-2088783CC987}" destId="{3147CF68-3E84-4515-8543-A173DE3B027E}" srcOrd="0" destOrd="0" presId="urn:microsoft.com/office/officeart/2018/2/layout/IconVerticalSolidList"/>
+    <dgm:cxn modelId="{A4423845-6256-4774-8146-763D77238161}" type="presParOf" srcId="{B068D6C2-FC2E-42D1-BE79-2088783CC987}" destId="{0272383D-EA2F-49BC-A891-DF028F40C6F6}" srcOrd="1" destOrd="0" presId="urn:microsoft.com/office/officeart/2018/2/layout/IconVerticalSolidList"/>
+    <dgm:cxn modelId="{63E41B56-F22E-4DE3-964D-506284F5CCC2}" type="presParOf" srcId="{B068D6C2-FC2E-42D1-BE79-2088783CC987}" destId="{04AE60CE-D08B-45B1-A69C-F47F910B534C}" srcOrd="2" destOrd="0" presId="urn:microsoft.com/office/officeart/2018/2/layout/IconVerticalSolidList"/>
+    <dgm:cxn modelId="{E3509B03-72C3-4361-91F2-9743193C9FCD}" type="presParOf" srcId="{B068D6C2-FC2E-42D1-BE79-2088783CC987}" destId="{AA06599F-BD5E-4CAA-AC1A-9AB7C7477DC5}" srcOrd="3" destOrd="0" presId="urn:microsoft.com/office/officeart/2018/2/layout/IconVerticalSolidList"/>
+  </dgm:cxnLst>
+  <dgm:bg/>
+  <dgm:whole/>
+  <dgm:extLst>
+    <a:ext uri="http://schemas.microsoft.com/office/drawing/2008/diagram">
+      <dsp:dataModelExt xmlns:dsp="http://schemas.microsoft.com/office/drawing/2008/diagram" relId="rId6" minVer="http://schemas.openxmlformats.org/drawingml/2006/diagram"/>
+    </a:ext>
+  </dgm:extLst>
+</dgm:dataModel>
+</file>
+
+<file path=ppt/diagrams/data2.xml><?xml version="1.0" encoding="utf-8"?>
 <dgm:dataModel xmlns:dgm="http://schemas.openxmlformats.org/drawingml/2006/diagram" xmlns:a="http://schemas.openxmlformats.org/drawingml/2006/main">
   <dgm:ptLst>
     <dgm:pt modelId="{C1B36B67-7423-455F-80B4-16ABA14C54A9}" type="doc">
@@ -1989,7 +3173,7 @@
 </dgm:dataModel>
 </file>
 
-<file path=ppt/diagrams/data2.xml><?xml version="1.0" encoding="utf-8"?>
+<file path=ppt/diagrams/data3.xml><?xml version="1.0" encoding="utf-8"?>
 <dgm:dataModel xmlns:dgm="http://schemas.openxmlformats.org/drawingml/2006/diagram" xmlns:a="http://schemas.openxmlformats.org/drawingml/2006/main">
   <dgm:ptLst>
     <dgm:pt modelId="{C1B36B67-7423-455F-80B4-16ABA14C54A9}" type="doc">
@@ -2467,6 +3651,521 @@
         </a:bodyPr>
         <a:lstStyle/>
         <a:p>
+          <a:pPr marL="0" lvl="0" indent="0" algn="l" defTabSz="755650">
+            <a:lnSpc>
+              <a:spcPct val="100000"/>
+            </a:lnSpc>
+            <a:spcBef>
+              <a:spcPct val="0"/>
+            </a:spcBef>
+            <a:spcAft>
+              <a:spcPct val="35000"/>
+            </a:spcAft>
+            <a:buNone/>
+          </a:pPr>
+          <a:r>
+            <a:rPr lang="nl-BE" sz="1700" kern="1200" dirty="0"/>
+            <a:t>Delay </a:t>
+          </a:r>
+          <a:r>
+            <a:rPr lang="nl-BE" sz="1700" kern="1200" dirty="0" err="1"/>
+            <a:t>times</a:t>
+          </a:r>
+          <a:r>
+            <a:rPr lang="nl-BE" sz="1700" kern="1200" dirty="0"/>
+            <a:t> </a:t>
+          </a:r>
+          <a:r>
+            <a:rPr lang="nl-BE" sz="1700" kern="1200" dirty="0" err="1"/>
+            <a:t>for</a:t>
+          </a:r>
+          <a:r>
+            <a:rPr lang="nl-BE" sz="1700" kern="1200" dirty="0"/>
+            <a:t> </a:t>
+          </a:r>
+          <a:r>
+            <a:rPr lang="nl-BE" sz="1700" kern="1200" dirty="0" err="1"/>
+            <a:t>deliveries</a:t>
+          </a:r>
+          <a:r>
+            <a:rPr lang="nl-BE" sz="1700" kern="1200" dirty="0"/>
+            <a:t> </a:t>
+          </a:r>
+          <a:r>
+            <a:rPr lang="nl-BE" sz="1700" kern="1200" dirty="0" err="1"/>
+            <a:t>due</a:t>
+          </a:r>
+          <a:r>
+            <a:rPr lang="nl-BE" sz="1700" kern="1200" dirty="0"/>
+            <a:t> corona </a:t>
+          </a:r>
+          <a:r>
+            <a:rPr lang="nl-BE" sz="1700" kern="1200" dirty="0" err="1"/>
+            <a:t>measures</a:t>
+          </a:r>
+          <a:r>
+            <a:rPr lang="nl-BE" sz="1700" kern="1200" dirty="0"/>
+            <a:t> </a:t>
+          </a:r>
+          <a:endParaRPr lang="en-US" sz="1700" kern="1200" dirty="0"/>
+        </a:p>
+      </dsp:txBody>
+      <dsp:txXfrm>
+        <a:off x="1435590" y="531"/>
+        <a:ext cx="9080009" cy="1242935"/>
+      </dsp:txXfrm>
+    </dsp:sp>
+    <dsp:sp modelId="{E8E2175B-D0BE-4533-B2EB-00C0BE910F0A}">
+      <dsp:nvSpPr>
+        <dsp:cNvPr id="0" name=""/>
+        <dsp:cNvSpPr/>
+      </dsp:nvSpPr>
+      <dsp:spPr>
+        <a:xfrm>
+          <a:off x="0" y="1673473"/>
+          <a:ext cx="10515600" cy="1242935"/>
+        </a:xfrm>
+        <a:prstGeom prst="roundRect">
+          <a:avLst>
+            <a:gd name="adj" fmla="val 10000"/>
+          </a:avLst>
+        </a:prstGeom>
+        <a:solidFill>
+          <a:schemeClr val="bg1"/>
+        </a:solidFill>
+        <a:ln>
+          <a:noFill/>
+        </a:ln>
+        <a:effectLst/>
+      </dsp:spPr>
+      <dsp:style>
+        <a:lnRef idx="0">
+          <a:scrgbClr r="0" g="0" b="0"/>
+        </a:lnRef>
+        <a:fillRef idx="1">
+          <a:scrgbClr r="0" g="0" b="0"/>
+        </a:fillRef>
+        <a:effectRef idx="0">
+          <a:scrgbClr r="0" g="0" b="0"/>
+        </a:effectRef>
+        <a:fontRef idx="minor"/>
+      </dsp:style>
+    </dsp:sp>
+    <dsp:sp modelId="{15A2BC8A-DEDE-4B02-8AC0-AFBEE9D62A7D}">
+      <dsp:nvSpPr>
+        <dsp:cNvPr id="0" name=""/>
+        <dsp:cNvSpPr/>
+      </dsp:nvSpPr>
+      <dsp:spPr>
+        <a:xfrm>
+          <a:off x="352136" y="1833861"/>
+          <a:ext cx="683614" cy="683614"/>
+        </a:xfrm>
+        <a:prstGeom prst="rect">
+          <a:avLst/>
+        </a:prstGeom>
+        <a:blipFill rotWithShape="1">
+          <a:blip xmlns:r="http://schemas.openxmlformats.org/officeDocument/2006/relationships" r:embed="rId3">
+            <a:extLst>
+              <a:ext uri="{28A0092B-C50C-407E-A947-70E740481C1C}">
+                <a14:useLocalDpi xmlns:a14="http://schemas.microsoft.com/office/drawing/2010/main" val="0"/>
+              </a:ext>
+              <a:ext uri="{96DAC541-7B7A-43D3-8B79-37D633B846F1}">
+                <asvg:svgBlip xmlns:asvg="http://schemas.microsoft.com/office/drawing/2016/SVG/main" r:embed="rId4"/>
+              </a:ext>
+            </a:extLst>
+          </a:blip>
+          <a:srcRect/>
+          <a:stretch>
+            <a:fillRect/>
+          </a:stretch>
+        </a:blipFill>
+        <a:ln w="12700" cap="flat" cmpd="sng" algn="ctr">
+          <a:noFill/>
+          <a:prstDash val="solid"/>
+          <a:miter lim="800000"/>
+        </a:ln>
+        <a:effectLst/>
+      </dsp:spPr>
+      <dsp:style>
+        <a:lnRef idx="2">
+          <a:scrgbClr r="0" g="0" b="0"/>
+        </a:lnRef>
+        <a:fillRef idx="1">
+          <a:scrgbClr r="0" g="0" b="0"/>
+        </a:fillRef>
+        <a:effectRef idx="0">
+          <a:scrgbClr r="0" g="0" b="0"/>
+        </a:effectRef>
+        <a:fontRef idx="minor">
+          <a:schemeClr val="lt1"/>
+        </a:fontRef>
+      </dsp:style>
+    </dsp:sp>
+    <dsp:sp modelId="{B6239110-8497-4C7B-AB23-09163A799831}">
+      <dsp:nvSpPr>
+        <dsp:cNvPr id="0" name=""/>
+        <dsp:cNvSpPr/>
+      </dsp:nvSpPr>
+      <dsp:spPr>
+        <a:xfrm>
+          <a:off x="1435590" y="1554201"/>
+          <a:ext cx="9080009" cy="1242935"/>
+        </a:xfrm>
+        <a:prstGeom prst="rect">
+          <a:avLst/>
+        </a:prstGeom>
+        <a:noFill/>
+        <a:ln>
+          <a:noFill/>
+        </a:ln>
+        <a:effectLst/>
+      </dsp:spPr>
+      <dsp:style>
+        <a:lnRef idx="0">
+          <a:scrgbClr r="0" g="0" b="0"/>
+        </a:lnRef>
+        <a:fillRef idx="0">
+          <a:scrgbClr r="0" g="0" b="0"/>
+        </a:fillRef>
+        <a:effectRef idx="0">
+          <a:scrgbClr r="0" g="0" b="0"/>
+        </a:effectRef>
+        <a:fontRef idx="minor"/>
+      </dsp:style>
+      <dsp:txBody>
+        <a:bodyPr spcFirstLastPara="0" vert="horz" wrap="square" lIns="131544" tIns="131544" rIns="131544" bIns="131544" numCol="1" spcCol="1270" anchor="ctr" anchorCtr="0">
+          <a:noAutofit/>
+        </a:bodyPr>
+        <a:lstStyle/>
+        <a:p>
+          <a:pPr marL="0" lvl="0" indent="0" algn="l" defTabSz="755650">
+            <a:lnSpc>
+              <a:spcPct val="100000"/>
+            </a:lnSpc>
+            <a:spcBef>
+              <a:spcPct val="0"/>
+            </a:spcBef>
+            <a:spcAft>
+              <a:spcPct val="35000"/>
+            </a:spcAft>
+            <a:buNone/>
+          </a:pPr>
+          <a:r>
+            <a:rPr lang="en-US" sz="1700" kern="1200" dirty="0"/>
+            <a:t>Lack of tools/instruments to solder and for testing:</a:t>
+          </a:r>
+        </a:p>
+        <a:p>
+          <a:pPr marL="0" lvl="0" indent="0" algn="l" defTabSz="755650">
+            <a:lnSpc>
+              <a:spcPct val="100000"/>
+            </a:lnSpc>
+            <a:spcBef>
+              <a:spcPct val="0"/>
+            </a:spcBef>
+            <a:spcAft>
+              <a:spcPct val="35000"/>
+            </a:spcAft>
+            <a:buNone/>
+          </a:pPr>
+          <a:r>
+            <a:rPr lang="en-US" sz="1700" kern="1200" dirty="0"/>
+            <a:t>  - Most power management IC’s have an exposed pad which needs a solder oven to solder properly</a:t>
+          </a:r>
+        </a:p>
+        <a:p>
+          <a:pPr marL="0" lvl="0" indent="0" algn="l" defTabSz="755650">
+            <a:lnSpc>
+              <a:spcPct val="100000"/>
+            </a:lnSpc>
+            <a:spcBef>
+              <a:spcPct val="0"/>
+            </a:spcBef>
+            <a:spcAft>
+              <a:spcPct val="35000"/>
+            </a:spcAft>
+            <a:buNone/>
+          </a:pPr>
+          <a:r>
+            <a:rPr lang="en-US" sz="1700" kern="1200" dirty="0"/>
+            <a:t>  - Lack of oscilloscope etc.</a:t>
+          </a:r>
+        </a:p>
+      </dsp:txBody>
+      <dsp:txXfrm>
+        <a:off x="1435590" y="1554201"/>
+        <a:ext cx="9080009" cy="1242935"/>
+      </dsp:txXfrm>
+    </dsp:sp>
+    <dsp:sp modelId="{3147CF68-3E84-4515-8543-A173DE3B027E}">
+      <dsp:nvSpPr>
+        <dsp:cNvPr id="0" name=""/>
+        <dsp:cNvSpPr/>
+      </dsp:nvSpPr>
+      <dsp:spPr>
+        <a:xfrm>
+          <a:off x="0" y="3107870"/>
+          <a:ext cx="10515600" cy="1242935"/>
+        </a:xfrm>
+        <a:prstGeom prst="roundRect">
+          <a:avLst>
+            <a:gd name="adj" fmla="val 10000"/>
+          </a:avLst>
+        </a:prstGeom>
+        <a:noFill/>
+        <a:ln>
+          <a:noFill/>
+        </a:ln>
+        <a:effectLst/>
+      </dsp:spPr>
+      <dsp:style>
+        <a:lnRef idx="0">
+          <a:scrgbClr r="0" g="0" b="0"/>
+        </a:lnRef>
+        <a:fillRef idx="1">
+          <a:scrgbClr r="0" g="0" b="0"/>
+        </a:fillRef>
+        <a:effectRef idx="0">
+          <a:scrgbClr r="0" g="0" b="0"/>
+        </a:effectRef>
+        <a:fontRef idx="minor"/>
+      </dsp:style>
+    </dsp:sp>
+    <dsp:sp modelId="{0272383D-EA2F-49BC-A891-DF028F40C6F6}">
+      <dsp:nvSpPr>
+        <dsp:cNvPr id="0" name=""/>
+        <dsp:cNvSpPr/>
+      </dsp:nvSpPr>
+      <dsp:spPr>
+        <a:xfrm>
+          <a:off x="375988" y="3387531"/>
+          <a:ext cx="683614" cy="683614"/>
+        </a:xfrm>
+        <a:prstGeom prst="rect">
+          <a:avLst/>
+        </a:prstGeom>
+        <a:noFill/>
+        <a:ln w="12700" cap="flat" cmpd="sng" algn="ctr">
+          <a:noFill/>
+          <a:prstDash val="solid"/>
+          <a:miter lim="800000"/>
+        </a:ln>
+        <a:effectLst/>
+      </dsp:spPr>
+      <dsp:style>
+        <a:lnRef idx="2">
+          <a:scrgbClr r="0" g="0" b="0"/>
+        </a:lnRef>
+        <a:fillRef idx="1">
+          <a:scrgbClr r="0" g="0" b="0"/>
+        </a:fillRef>
+        <a:effectRef idx="0">
+          <a:scrgbClr r="0" g="0" b="0"/>
+        </a:effectRef>
+        <a:fontRef idx="minor">
+          <a:schemeClr val="lt1"/>
+        </a:fontRef>
+      </dsp:style>
+    </dsp:sp>
+    <dsp:sp modelId="{AA06599F-BD5E-4CAA-AC1A-9AB7C7477DC5}">
+      <dsp:nvSpPr>
+        <dsp:cNvPr id="0" name=""/>
+        <dsp:cNvSpPr/>
+      </dsp:nvSpPr>
+      <dsp:spPr>
+        <a:xfrm>
+          <a:off x="1435590" y="3107870"/>
+          <a:ext cx="9080009" cy="1242935"/>
+        </a:xfrm>
+        <a:prstGeom prst="rect">
+          <a:avLst/>
+        </a:prstGeom>
+        <a:noFill/>
+        <a:ln>
+          <a:noFill/>
+        </a:ln>
+        <a:effectLst/>
+      </dsp:spPr>
+      <dsp:style>
+        <a:lnRef idx="0">
+          <a:scrgbClr r="0" g="0" b="0"/>
+        </a:lnRef>
+        <a:fillRef idx="0">
+          <a:scrgbClr r="0" g="0" b="0"/>
+        </a:fillRef>
+        <a:effectRef idx="0">
+          <a:scrgbClr r="0" g="0" b="0"/>
+        </a:effectRef>
+        <a:fontRef idx="minor"/>
+      </dsp:style>
+      <dsp:txBody>
+        <a:bodyPr spcFirstLastPara="0" vert="horz" wrap="square" lIns="131544" tIns="131544" rIns="131544" bIns="131544" numCol="1" spcCol="1270" anchor="ctr" anchorCtr="0">
+          <a:noAutofit/>
+        </a:bodyPr>
+        <a:lstStyle/>
+        <a:p>
+          <a:pPr marL="0" lvl="0" indent="0" algn="l" defTabSz="755650">
+            <a:lnSpc>
+              <a:spcPct val="100000"/>
+            </a:lnSpc>
+            <a:spcBef>
+              <a:spcPct val="0"/>
+            </a:spcBef>
+            <a:spcAft>
+              <a:spcPct val="35000"/>
+            </a:spcAft>
+            <a:buNone/>
+          </a:pPr>
+          <a:endParaRPr lang="en-US" sz="1700" kern="1200" dirty="0"/>
+        </a:p>
+      </dsp:txBody>
+      <dsp:txXfrm>
+        <a:off x="1435590" y="3107870"/>
+        <a:ext cx="9080009" cy="1242935"/>
+      </dsp:txXfrm>
+    </dsp:sp>
+  </dsp:spTree>
+</dsp:drawing>
+</file>
+
+<file path=ppt/diagrams/drawing2.xml><?xml version="1.0" encoding="utf-8"?>
+<dsp:drawing xmlns:dgm="http://schemas.openxmlformats.org/drawingml/2006/diagram" xmlns:dsp="http://schemas.microsoft.com/office/drawing/2008/diagram" xmlns:a="http://schemas.openxmlformats.org/drawingml/2006/main">
+  <dsp:spTree>
+    <dsp:nvGrpSpPr>
+      <dsp:cNvPr id="0" name=""/>
+      <dsp:cNvGrpSpPr/>
+    </dsp:nvGrpSpPr>
+    <dsp:grpSpPr/>
+    <dsp:sp modelId="{1CF0038E-E85A-486E-97DA-56B502AA6753}">
+      <dsp:nvSpPr>
+        <dsp:cNvPr id="0" name=""/>
+        <dsp:cNvSpPr/>
+      </dsp:nvSpPr>
+      <dsp:spPr>
+        <a:xfrm>
+          <a:off x="0" y="531"/>
+          <a:ext cx="10515600" cy="1242935"/>
+        </a:xfrm>
+        <a:prstGeom prst="roundRect">
+          <a:avLst>
+            <a:gd name="adj" fmla="val 10000"/>
+          </a:avLst>
+        </a:prstGeom>
+        <a:solidFill>
+          <a:schemeClr val="bg1">
+            <a:lumMod val="95000"/>
+            <a:hueOff val="0"/>
+            <a:satOff val="0"/>
+            <a:lumOff val="0"/>
+            <a:alphaOff val="0"/>
+          </a:schemeClr>
+        </a:solidFill>
+        <a:ln>
+          <a:noFill/>
+        </a:ln>
+        <a:effectLst/>
+      </dsp:spPr>
+      <dsp:style>
+        <a:lnRef idx="0">
+          <a:scrgbClr r="0" g="0" b="0"/>
+        </a:lnRef>
+        <a:fillRef idx="1">
+          <a:scrgbClr r="0" g="0" b="0"/>
+        </a:fillRef>
+        <a:effectRef idx="0">
+          <a:scrgbClr r="0" g="0" b="0"/>
+        </a:effectRef>
+        <a:fontRef idx="minor"/>
+      </dsp:style>
+    </dsp:sp>
+    <dsp:sp modelId="{B41A1DCA-1248-4C07-90F2-686FB3C652D9}">
+      <dsp:nvSpPr>
+        <dsp:cNvPr id="0" name=""/>
+        <dsp:cNvSpPr/>
+      </dsp:nvSpPr>
+      <dsp:spPr>
+        <a:xfrm>
+          <a:off x="375988" y="280191"/>
+          <a:ext cx="683614" cy="683614"/>
+        </a:xfrm>
+        <a:prstGeom prst="rect">
+          <a:avLst/>
+        </a:prstGeom>
+        <a:blipFill>
+          <a:blip xmlns:r="http://schemas.openxmlformats.org/officeDocument/2006/relationships" r:embed="rId1">
+            <a:extLst>
+              <a:ext uri="{28A0092B-C50C-407E-A947-70E740481C1C}">
+                <a14:useLocalDpi xmlns:a14="http://schemas.microsoft.com/office/drawing/2010/main" val="0"/>
+              </a:ext>
+              <a:ext uri="{96DAC541-7B7A-43D3-8B79-37D633B846F1}">
+                <asvg:svgBlip xmlns:asvg="http://schemas.microsoft.com/office/drawing/2016/SVG/main" r:embed="rId2"/>
+              </a:ext>
+            </a:extLst>
+          </a:blip>
+          <a:stretch>
+            <a:fillRect/>
+          </a:stretch>
+        </a:blipFill>
+        <a:ln w="12700" cap="flat" cmpd="sng" algn="ctr">
+          <a:noFill/>
+          <a:prstDash val="solid"/>
+          <a:miter lim="800000"/>
+        </a:ln>
+        <a:effectLst/>
+      </dsp:spPr>
+      <dsp:style>
+        <a:lnRef idx="2">
+          <a:scrgbClr r="0" g="0" b="0"/>
+        </a:lnRef>
+        <a:fillRef idx="1">
+          <a:scrgbClr r="0" g="0" b="0"/>
+        </a:fillRef>
+        <a:effectRef idx="0">
+          <a:scrgbClr r="0" g="0" b="0"/>
+        </a:effectRef>
+        <a:fontRef idx="minor">
+          <a:schemeClr val="lt1"/>
+        </a:fontRef>
+      </dsp:style>
+    </dsp:sp>
+    <dsp:sp modelId="{280C2505-5A26-4E5D-8FF7-75A5D63A45AC}">
+      <dsp:nvSpPr>
+        <dsp:cNvPr id="0" name=""/>
+        <dsp:cNvSpPr/>
+      </dsp:nvSpPr>
+      <dsp:spPr>
+        <a:xfrm>
+          <a:off x="1435590" y="531"/>
+          <a:ext cx="9080009" cy="1242935"/>
+        </a:xfrm>
+        <a:prstGeom prst="rect">
+          <a:avLst/>
+        </a:prstGeom>
+        <a:noFill/>
+        <a:ln>
+          <a:noFill/>
+        </a:ln>
+        <a:effectLst/>
+      </dsp:spPr>
+      <dsp:style>
+        <a:lnRef idx="0">
+          <a:scrgbClr r="0" g="0" b="0"/>
+        </a:lnRef>
+        <a:fillRef idx="0">
+          <a:scrgbClr r="0" g="0" b="0"/>
+        </a:fillRef>
+        <a:effectRef idx="0">
+          <a:scrgbClr r="0" g="0" b="0"/>
+        </a:effectRef>
+        <a:fontRef idx="minor"/>
+      </dsp:style>
+      <dsp:txBody>
+        <a:bodyPr spcFirstLastPara="0" vert="horz" wrap="square" lIns="131544" tIns="131544" rIns="131544" bIns="131544" numCol="1" spcCol="1270" anchor="ctr" anchorCtr="0">
+          <a:noAutofit/>
+        </a:bodyPr>
+        <a:lstStyle/>
+        <a:p>
           <a:pPr marL="0" lvl="0" indent="0" algn="l" defTabSz="1111250">
             <a:lnSpc>
               <a:spcPct val="100000"/>
@@ -2751,7 +4450,7 @@
 </dsp:drawing>
 </file>
 
-<file path=ppt/diagrams/drawing2.xml><?xml version="1.0" encoding="utf-8"?>
+<file path=ppt/diagrams/drawing3.xml><?xml version="1.0" encoding="utf-8"?>
 <dsp:drawing xmlns:dgm="http://schemas.openxmlformats.org/drawingml/2006/diagram" xmlns:dsp="http://schemas.microsoft.com/office/drawing/2008/diagram" xmlns:a="http://schemas.openxmlformats.org/drawingml/2006/main">
   <dsp:spTree>
     <dsp:nvGrpSpPr>
@@ -3810,6 +5509,300 @@
 </dgm:layoutDef>
 </file>
 
+<file path=ppt/diagrams/layout3.xml><?xml version="1.0" encoding="utf-8"?>
+<dgm:layoutDef xmlns:dgm="http://schemas.openxmlformats.org/drawingml/2006/diagram" xmlns:a="http://schemas.openxmlformats.org/drawingml/2006/main" uniqueId="urn:microsoft.com/office/officeart/2018/2/layout/IconVerticalSolidList">
+  <dgm:title val="Icon Vertical Solid List"/>
+  <dgm:desc val="Use to show a series of visuals from top to bottom with Level 1 or Level 1 and Level 2 text grouped in a shape. Works best with icons or small pictures with lengthier descriptions."/>
+  <dgm:catLst>
+    <dgm:cat type="icon" pri="500"/>
+  </dgm:catLst>
+  <dgm:sampData useDef="1">
+    <dgm:dataModel>
+      <dgm:ptLst/>
+      <dgm:bg/>
+      <dgm:whole/>
+    </dgm:dataModel>
+  </dgm:sampData>
+  <dgm:styleData useDef="1">
+    <dgm:dataModel>
+      <dgm:ptLst/>
+      <dgm:bg/>
+      <dgm:whole/>
+    </dgm:dataModel>
+  </dgm:styleData>
+  <dgm:clrData useDef="1">
+    <dgm:dataModel>
+      <dgm:ptLst/>
+      <dgm:bg/>
+      <dgm:whole/>
+    </dgm:dataModel>
+  </dgm:clrData>
+  <dgm:layoutNode name="root">
+    <dgm:varLst>
+      <dgm:dir/>
+      <dgm:resizeHandles val="exact"/>
+    </dgm:varLst>
+    <dgm:choose name="Name0">
+      <dgm:if name="Name1" axis="self" func="var" arg="dir" op="equ" val="norm">
+        <dgm:alg type="lin">
+          <dgm:param type="linDir" val="fromT"/>
+          <dgm:param type="nodeHorzAlign" val="l"/>
+        </dgm:alg>
+      </dgm:if>
+      <dgm:else name="Name2">
+        <dgm:alg type="lin">
+          <dgm:param type="linDir" val="fromT"/>
+          <dgm:param type="nodeHorzAlign" val="r"/>
+        </dgm:alg>
+      </dgm:else>
+    </dgm:choose>
+    <dgm:shape xmlns:r="http://schemas.openxmlformats.org/officeDocument/2006/relationships" r:blip="">
+      <dgm:adjLst/>
+    </dgm:shape>
+    <dgm:presOf/>
+    <dgm:choose name="Name3">
+      <dgm:if name="Name4" axis="ch" ptType="node" func="cnt" op="lte" val="3">
+        <dgm:constrLst>
+          <dgm:constr type="h" for="ch" forName="compNode" refType="h" fact="0.3"/>
+          <dgm:constr type="w" for="ch" forName="compNode" refType="w"/>
+          <dgm:constr type="h" for="ch" forName="sibTrans" refType="h" refFor="ch" refForName="compNode" fact="0.25"/>
+          <dgm:constr type="primFontSz" for="des" forName="parTx" val="25"/>
+          <dgm:constr type="primFontSz" for="des" forName="desTx" refType="primFontSz" refFor="des" refForName="parTx" op="lte" fact="0.75"/>
+          <dgm:constr type="h" for="des" forName="compNode" op="equ"/>
+          <dgm:constr type="h" for="des" forName="bgRect" op="equ"/>
+          <dgm:constr type="h" for="des" forName="iconRect" op="equ"/>
+          <dgm:constr type="w" for="des" forName="iconRect" op="equ"/>
+          <dgm:constr type="h" for="des" forName="spaceRect" op="equ"/>
+          <dgm:constr type="h" for="des" forName="parTx" op="equ"/>
+          <dgm:constr type="h" for="des" forName="desTx" op="equ"/>
+        </dgm:constrLst>
+      </dgm:if>
+      <dgm:if name="Name5" axis="ch" ptType="node" func="cnt" op="lte" val="4">
+        <dgm:constrLst>
+          <dgm:constr type="h" for="ch" forName="compNode" refType="h" fact="0.3"/>
+          <dgm:constr type="w" for="ch" forName="compNode" refType="w"/>
+          <dgm:constr type="h" for="ch" forName="sibTrans" refType="h" refFor="ch" refForName="compNode" fact="0.25"/>
+          <dgm:constr type="primFontSz" for="des" forName="parTx" val="22"/>
+          <dgm:constr type="primFontSz" for="des" forName="desTx" refType="primFontSz" refFor="des" refForName="parTx" op="lte" fact="0.75"/>
+          <dgm:constr type="h" for="des" forName="compNode" op="equ"/>
+          <dgm:constr type="h" for="des" forName="bgRect" op="equ"/>
+          <dgm:constr type="h" for="des" forName="iconRect" op="equ"/>
+          <dgm:constr type="w" for="des" forName="iconRect" op="equ"/>
+          <dgm:constr type="h" for="des" forName="spaceRect" op="equ"/>
+          <dgm:constr type="h" for="des" forName="parTx" op="equ"/>
+          <dgm:constr type="h" for="des" forName="desTx" op="equ"/>
+        </dgm:constrLst>
+      </dgm:if>
+      <dgm:if name="Name6" axis="ch" ptType="node" func="cnt" op="lte" val="6">
+        <dgm:constrLst>
+          <dgm:constr type="h" for="ch" forName="compNode" refType="h" fact="0.3"/>
+          <dgm:constr type="w" for="ch" forName="compNode" refType="w"/>
+          <dgm:constr type="h" for="ch" forName="sibTrans" refType="h" refFor="ch" refForName="compNode" fact="0.25"/>
+          <dgm:constr type="primFontSz" for="des" forName="parTx" val="19"/>
+          <dgm:constr type="primFontSz" for="des" forName="desTx" refType="primFontSz" refFor="des" refForName="parTx" op="lte" fact="0.75"/>
+          <dgm:constr type="h" for="des" forName="compNode" op="equ"/>
+          <dgm:constr type="h" for="des" forName="bgRect" op="equ"/>
+          <dgm:constr type="h" for="des" forName="iconRect" op="equ"/>
+          <dgm:constr type="w" for="des" forName="iconRect" op="equ"/>
+          <dgm:constr type="h" for="des" forName="spaceRect" op="equ"/>
+          <dgm:constr type="h" for="des" forName="parTx" op="equ"/>
+          <dgm:constr type="h" for="des" forName="desTx" op="equ"/>
+        </dgm:constrLst>
+      </dgm:if>
+      <dgm:else name="Name7">
+        <dgm:constrLst>
+          <dgm:constr type="h" for="ch" forName="compNode" refType="h" fact="0.3"/>
+          <dgm:constr type="w" for="ch" forName="compNode" refType="w"/>
+          <dgm:constr type="h" for="ch" forName="sibTrans" refType="h" refFor="ch" refForName="compNode" fact="0.25"/>
+          <dgm:constr type="primFontSz" for="des" forName="parTx" val="16"/>
+          <dgm:constr type="primFontSz" for="des" forName="desTx" refType="primFontSz" refFor="des" refForName="parTx" op="lte" fact="0.75"/>
+          <dgm:constr type="h" for="des" forName="compNode" op="equ"/>
+          <dgm:constr type="h" for="des" forName="bgRect" op="equ"/>
+          <dgm:constr type="h" for="des" forName="iconRect" op="equ"/>
+          <dgm:constr type="w" for="des" forName="iconRect" op="equ"/>
+          <dgm:constr type="h" for="des" forName="spaceRect" op="equ"/>
+          <dgm:constr type="h" for="des" forName="parTx" op="equ"/>
+          <dgm:constr type="h" for="des" forName="desTx" op="equ"/>
+        </dgm:constrLst>
+      </dgm:else>
+    </dgm:choose>
+    <dgm:ruleLst>
+      <dgm:rule type="h" for="ch" forName="compNode" val="0" fact="NaN" max="NaN"/>
+    </dgm:ruleLst>
+    <dgm:forEach name="Name8" axis="ch" ptType="node">
+      <dgm:layoutNode name="compNode">
+        <dgm:alg type="composite"/>
+        <dgm:shape xmlns:r="http://schemas.openxmlformats.org/officeDocument/2006/relationships" r:blip="">
+          <dgm:adjLst/>
+        </dgm:shape>
+        <dgm:presOf axis="self"/>
+        <dgm:choose name="Name9">
+          <dgm:if name="Name10" axis="ch" ptType="node" func="cnt" op="gte" val="1">
+            <dgm:constrLst>
+              <dgm:constr type="w" for="ch" forName="bgRect" refType="w"/>
+              <dgm:constr type="h" for="ch" forName="bgRect" refType="h"/>
+              <dgm:constr type="l" for="ch" forName="bgRect"/>
+              <dgm:constr type="t" for="ch" forName="bgRect"/>
+              <dgm:constr type="h" for="ch" forName="iconRect" refType="h" fact="0.55"/>
+              <dgm:constr type="w" for="ch" forName="iconRect" refType="h" refFor="ch" refForName="iconRect"/>
+              <dgm:constr type="l" for="ch" forName="iconRect" refType="h" refFor="ch" refForName="iconRect" fact="0.55"/>
+              <dgm:constr type="ctrY" for="ch" forName="iconRect" refType="ctrY" refFor="ch" refForName="bgRect"/>
+              <dgm:constr type="w" for="ch" forName="spaceRect" refType="l" refFor="ch" refForName="iconRect"/>
+              <dgm:constr type="h" for="ch" forName="spaceRect" refType="h"/>
+              <dgm:constr type="l" for="ch" forName="spaceRect" refType="r" refFor="ch" refForName="iconRect"/>
+              <dgm:constr type="t" for="ch" forName="spaceRect"/>
+              <dgm:constr type="w" for="ch" forName="parTx" refType="w" fact="0.45"/>
+              <dgm:constr type="h" for="ch" forName="parTx" refType="h"/>
+              <dgm:constr type="l" for="ch" forName="parTx" refType="r" refFor="ch" refForName="spaceRect"/>
+              <dgm:constr type="t" for="ch" forName="parTx"/>
+              <dgm:constr type="h" for="ch" forName="desTx" refType="h"/>
+              <dgm:constr type="l" for="ch" forName="desTx" refType="r" refFor="ch" refForName="parTx"/>
+              <dgm:constr type="t" for="ch" forName="desTx"/>
+            </dgm:constrLst>
+          </dgm:if>
+          <dgm:else name="Name11">
+            <dgm:constrLst>
+              <dgm:constr type="w" for="ch" forName="bgRect" refType="w"/>
+              <dgm:constr type="h" for="ch" forName="bgRect" refType="h"/>
+              <dgm:constr type="l" for="ch" forName="bgRect"/>
+              <dgm:constr type="t" for="ch" forName="bgRect"/>
+              <dgm:constr type="h" for="ch" forName="iconRect" refType="h" fact="0.55"/>
+              <dgm:constr type="w" for="ch" forName="iconRect" refType="h" refFor="ch" refForName="iconRect"/>
+              <dgm:constr type="l" for="ch" forName="iconRect" refType="h" refFor="ch" refForName="iconRect" fact="0.55"/>
+              <dgm:constr type="ctrY" for="ch" forName="iconRect" refType="ctrY" refFor="ch" refForName="bgRect"/>
+              <dgm:constr type="w" for="ch" forName="spaceRect" refType="l" refFor="ch" refForName="iconRect"/>
+              <dgm:constr type="h" for="ch" forName="spaceRect" refType="h"/>
+              <dgm:constr type="l" for="ch" forName="spaceRect" refType="r" refFor="ch" refForName="iconRect"/>
+              <dgm:constr type="t" for="ch" forName="spaceRect"/>
+              <dgm:constr type="h" for="ch" forName="parTx" refType="h"/>
+              <dgm:constr type="l" for="ch" forName="parTx" refType="r" refFor="ch" refForName="spaceRect"/>
+              <dgm:constr type="t" for="ch" forName="parTx"/>
+            </dgm:constrLst>
+          </dgm:else>
+        </dgm:choose>
+        <dgm:ruleLst>
+          <dgm:rule type="h" val="INF" fact="NaN" max="NaN"/>
+        </dgm:ruleLst>
+        <dgm:layoutNode name="bgRect" styleLbl="bgShp">
+          <dgm:alg type="sp"/>
+          <dgm:shape xmlns:r="http://schemas.openxmlformats.org/officeDocument/2006/relationships" type="roundRect" r:blip="">
+            <dgm:adjLst>
+              <dgm:adj idx="1" val="0.1"/>
+            </dgm:adjLst>
+          </dgm:shape>
+          <dgm:presOf/>
+          <dgm:constrLst/>
+          <dgm:ruleLst/>
+        </dgm:layoutNode>
+        <dgm:layoutNode name="iconRect" styleLbl="node1">
+          <dgm:alg type="sp"/>
+          <dgm:shape xmlns:r="http://schemas.openxmlformats.org/officeDocument/2006/relationships" type="rect" r:blip="" blipPhldr="1">
+            <dgm:adjLst/>
+          </dgm:shape>
+          <dgm:presOf/>
+          <dgm:constrLst/>
+          <dgm:ruleLst/>
+        </dgm:layoutNode>
+        <dgm:layoutNode name="spaceRect">
+          <dgm:alg type="sp"/>
+          <dgm:shape xmlns:r="http://schemas.openxmlformats.org/officeDocument/2006/relationships" r:blip="">
+            <dgm:adjLst/>
+          </dgm:shape>
+          <dgm:presOf/>
+          <dgm:constrLst/>
+          <dgm:ruleLst/>
+        </dgm:layoutNode>
+        <dgm:layoutNode name="parTx" styleLbl="revTx">
+          <dgm:varLst>
+            <dgm:chMax val="0"/>
+            <dgm:chPref val="0"/>
+          </dgm:varLst>
+          <dgm:alg type="tx">
+            <dgm:param type="txAnchorVert" val="mid"/>
+            <dgm:param type="parTxLTRAlign" val="l"/>
+            <dgm:param type="shpTxLTRAlignCh" val="l"/>
+            <dgm:param type="parTxRTLAlign" val="r"/>
+            <dgm:param type="shpTxRTLAlignCh" val="r"/>
+          </dgm:alg>
+          <dgm:shape xmlns:r="http://schemas.openxmlformats.org/officeDocument/2006/relationships" type="rect" r:blip="">
+            <dgm:adjLst/>
+          </dgm:shape>
+          <dgm:presOf axis="self" ptType="node"/>
+          <dgm:constrLst>
+            <dgm:constr type="lMarg" refType="h" fact="0.3"/>
+            <dgm:constr type="rMarg" refType="h" fact="0.3"/>
+            <dgm:constr type="tMarg" refType="h" fact="0.3"/>
+            <dgm:constr type="bMarg" refType="h" fact="0.3"/>
+          </dgm:constrLst>
+          <dgm:ruleLst>
+            <dgm:rule type="primFontSz" val="14" fact="NaN" max="NaN"/>
+            <dgm:rule type="h" val="INF" fact="NaN" max="NaN"/>
+          </dgm:ruleLst>
+        </dgm:layoutNode>
+        <dgm:choose name="Name12">
+          <dgm:if name="Name13" axis="ch" ptType="node" func="cnt" op="gte" val="1">
+            <dgm:layoutNode name="desTx" styleLbl="revTx">
+              <dgm:varLst/>
+              <dgm:alg type="tx">
+                <dgm:param type="txAnchorVertCh" val="mid"/>
+                <dgm:param type="parTxLTRAlign" val="l"/>
+                <dgm:param type="shpTxLTRAlignCh" val="l"/>
+                <dgm:param type="parTxRTLAlign" val="r"/>
+                <dgm:param type="shpTxRTLAlignCh" val="r"/>
+                <dgm:param type="stBulletLvl" val="0"/>
+              </dgm:alg>
+              <dgm:shape xmlns:r="http://schemas.openxmlformats.org/officeDocument/2006/relationships" type="rect" r:blip="">
+                <dgm:adjLst/>
+              </dgm:shape>
+              <dgm:presOf axis="des" ptType="node"/>
+              <dgm:constrLst>
+                <dgm:constr type="primFontSz" val="18"/>
+                <dgm:constr type="secFontSz" refType="primFontSz"/>
+                <dgm:constr type="lMarg" refType="h" fact="0.3"/>
+                <dgm:constr type="rMarg" refType="h" fact="0.3"/>
+                <dgm:constr type="tMarg" refType="h" fact="0.3"/>
+                <dgm:constr type="bMarg" refType="h" fact="0.3"/>
+              </dgm:constrLst>
+              <dgm:ruleLst>
+                <dgm:rule type="primFontSz" val="11" fact="NaN" max="NaN"/>
+              </dgm:ruleLst>
+            </dgm:layoutNode>
+          </dgm:if>
+          <dgm:else name="Name14"/>
+        </dgm:choose>
+      </dgm:layoutNode>
+      <dgm:forEach name="Name15" axis="followSib" ptType="sibTrans" cnt="1">
+        <dgm:layoutNode name="sibTrans">
+          <dgm:alg type="sp"/>
+          <dgm:shape xmlns:r="http://schemas.openxmlformats.org/officeDocument/2006/relationships" r:blip="">
+            <dgm:adjLst/>
+          </dgm:shape>
+          <dgm:presOf axis="self"/>
+          <dgm:constrLst/>
+          <dgm:ruleLst/>
+        </dgm:layoutNode>
+      </dgm:forEach>
+    </dgm:forEach>
+  </dgm:layoutNode>
+  <dgm:extLst>
+    <a:ext uri="{68A01E43-0DF5-4B5B-8FA6-DAF915123BFB}">
+      <dgm1612:lstStyle xmlns:dgm1612="http://schemas.microsoft.com/office/drawing/2016/12/diagram">
+        <a:lvl1pPr>
+          <a:lnSpc>
+            <a:spcPct val="100000"/>
+          </a:lnSpc>
+        </a:lvl1pPr>
+        <a:lvl2pPr>
+          <a:lnSpc>
+            <a:spcPct val="100000"/>
+          </a:lnSpc>
+        </a:lvl2pPr>
+      </dgm1612:lstStyle>
+    </a:ext>
+  </dgm:extLst>
+</dgm:layoutDef>
+</file>
+
 <file path=ppt/diagrams/quickStyle1.xml><?xml version="1.0" encoding="utf-8"?>
 <dgm:styleDef xmlns:dgm="http://schemas.openxmlformats.org/drawingml/2006/diagram" xmlns:a="http://schemas.openxmlformats.org/drawingml/2006/main" uniqueId="urn:microsoft.com/office/officeart/2005/8/quickstyle/simple1">
   <dgm:title val=""/>
@@ -4845,6 +6838,1040 @@
 </file>
 
 <file path=ppt/diagrams/quickStyle2.xml><?xml version="1.0" encoding="utf-8"?>
+<dgm:styleDef xmlns:dgm="http://schemas.openxmlformats.org/drawingml/2006/diagram" xmlns:a="http://schemas.openxmlformats.org/drawingml/2006/main" uniqueId="urn:microsoft.com/office/officeart/2005/8/quickstyle/simple1">
+  <dgm:title val=""/>
+  <dgm:desc val=""/>
+  <dgm:catLst>
+    <dgm:cat type="simple" pri="10100"/>
+  </dgm:catLst>
+  <dgm:scene3d>
+    <a:camera prst="orthographicFront"/>
+    <a:lightRig rig="threePt" dir="t"/>
+  </dgm:scene3d>
+  <dgm:styleLbl name="node0">
+    <dgm:scene3d>
+      <a:camera prst="orthographicFront"/>
+      <a:lightRig rig="threePt" dir="t"/>
+    </dgm:scene3d>
+    <dgm:sp3d/>
+    <dgm:txPr/>
+    <dgm:style>
+      <a:lnRef idx="2">
+        <a:scrgbClr r="0" g="0" b="0"/>
+      </a:lnRef>
+      <a:fillRef idx="1">
+        <a:scrgbClr r="0" g="0" b="0"/>
+      </a:fillRef>
+      <a:effectRef idx="0">
+        <a:scrgbClr r="0" g="0" b="0"/>
+      </a:effectRef>
+      <a:fontRef idx="minor">
+        <a:schemeClr val="lt1"/>
+      </a:fontRef>
+    </dgm:style>
+  </dgm:styleLbl>
+  <dgm:styleLbl name="lnNode1">
+    <dgm:scene3d>
+      <a:camera prst="orthographicFront"/>
+      <a:lightRig rig="threePt" dir="t"/>
+    </dgm:scene3d>
+    <dgm:sp3d/>
+    <dgm:txPr/>
+    <dgm:style>
+      <a:lnRef idx="2">
+        <a:scrgbClr r="0" g="0" b="0"/>
+      </a:lnRef>
+      <a:fillRef idx="1">
+        <a:scrgbClr r="0" g="0" b="0"/>
+      </a:fillRef>
+      <a:effectRef idx="0">
+        <a:scrgbClr r="0" g="0" b="0"/>
+      </a:effectRef>
+      <a:fontRef idx="minor">
+        <a:schemeClr val="lt1"/>
+      </a:fontRef>
+    </dgm:style>
+  </dgm:styleLbl>
+  <dgm:styleLbl name="vennNode1">
+    <dgm:scene3d>
+      <a:camera prst="orthographicFront"/>
+      <a:lightRig rig="threePt" dir="t"/>
+    </dgm:scene3d>
+    <dgm:sp3d/>
+    <dgm:txPr/>
+    <dgm:style>
+      <a:lnRef idx="2">
+        <a:scrgbClr r="0" g="0" b="0"/>
+      </a:lnRef>
+      <a:fillRef idx="1">
+        <a:scrgbClr r="0" g="0" b="0"/>
+      </a:fillRef>
+      <a:effectRef idx="0">
+        <a:scrgbClr r="0" g="0" b="0"/>
+      </a:effectRef>
+      <a:fontRef idx="minor">
+        <a:schemeClr val="tx1"/>
+      </a:fontRef>
+    </dgm:style>
+  </dgm:styleLbl>
+  <dgm:styleLbl name="alignNode1">
+    <dgm:scene3d>
+      <a:camera prst="orthographicFront"/>
+      <a:lightRig rig="threePt" dir="t"/>
+    </dgm:scene3d>
+    <dgm:sp3d/>
+    <dgm:txPr/>
+    <dgm:style>
+      <a:lnRef idx="2">
+        <a:scrgbClr r="0" g="0" b="0"/>
+      </a:lnRef>
+      <a:fillRef idx="1">
+        <a:scrgbClr r="0" g="0" b="0"/>
+      </a:fillRef>
+      <a:effectRef idx="0">
+        <a:scrgbClr r="0" g="0" b="0"/>
+      </a:effectRef>
+      <a:fontRef idx="minor">
+        <a:schemeClr val="lt1"/>
+      </a:fontRef>
+    </dgm:style>
+  </dgm:styleLbl>
+  <dgm:styleLbl name="node1">
+    <dgm:scene3d>
+      <a:camera prst="orthographicFront"/>
+      <a:lightRig rig="threePt" dir="t"/>
+    </dgm:scene3d>
+    <dgm:sp3d/>
+    <dgm:txPr/>
+    <dgm:style>
+      <a:lnRef idx="2">
+        <a:scrgbClr r="0" g="0" b="0"/>
+      </a:lnRef>
+      <a:fillRef idx="1">
+        <a:scrgbClr r="0" g="0" b="0"/>
+      </a:fillRef>
+      <a:effectRef idx="0">
+        <a:scrgbClr r="0" g="0" b="0"/>
+      </a:effectRef>
+      <a:fontRef idx="minor">
+        <a:schemeClr val="lt1"/>
+      </a:fontRef>
+    </dgm:style>
+  </dgm:styleLbl>
+  <dgm:styleLbl name="node2">
+    <dgm:scene3d>
+      <a:camera prst="orthographicFront"/>
+      <a:lightRig rig="threePt" dir="t"/>
+    </dgm:scene3d>
+    <dgm:sp3d/>
+    <dgm:txPr/>
+    <dgm:style>
+      <a:lnRef idx="2">
+        <a:scrgbClr r="0" g="0" b="0"/>
+      </a:lnRef>
+      <a:fillRef idx="1">
+        <a:scrgbClr r="0" g="0" b="0"/>
+      </a:fillRef>
+      <a:effectRef idx="0">
+        <a:scrgbClr r="0" g="0" b="0"/>
+      </a:effectRef>
+      <a:fontRef idx="minor">
+        <a:schemeClr val="lt1"/>
+      </a:fontRef>
+    </dgm:style>
+  </dgm:styleLbl>
+  <dgm:styleLbl name="node3">
+    <dgm:scene3d>
+      <a:camera prst="orthographicFront"/>
+      <a:lightRig rig="threePt" dir="t"/>
+    </dgm:scene3d>
+    <dgm:sp3d/>
+    <dgm:txPr/>
+    <dgm:style>
+      <a:lnRef idx="2">
+        <a:scrgbClr r="0" g="0" b="0"/>
+      </a:lnRef>
+      <a:fillRef idx="1">
+        <a:scrgbClr r="0" g="0" b="0"/>
+      </a:fillRef>
+      <a:effectRef idx="0">
+        <a:scrgbClr r="0" g="0" b="0"/>
+      </a:effectRef>
+      <a:fontRef idx="minor">
+        <a:schemeClr val="lt1"/>
+      </a:fontRef>
+    </dgm:style>
+  </dgm:styleLbl>
+  <dgm:styleLbl name="node4">
+    <dgm:scene3d>
+      <a:camera prst="orthographicFront"/>
+      <a:lightRig rig="threePt" dir="t"/>
+    </dgm:scene3d>
+    <dgm:sp3d/>
+    <dgm:txPr/>
+    <dgm:style>
+      <a:lnRef idx="2">
+        <a:scrgbClr r="0" g="0" b="0"/>
+      </a:lnRef>
+      <a:fillRef idx="1">
+        <a:scrgbClr r="0" g="0" b="0"/>
+      </a:fillRef>
+      <a:effectRef idx="0">
+        <a:scrgbClr r="0" g="0" b="0"/>
+      </a:effectRef>
+      <a:fontRef idx="minor">
+        <a:schemeClr val="lt1"/>
+      </a:fontRef>
+    </dgm:style>
+  </dgm:styleLbl>
+  <dgm:styleLbl name="fgImgPlace1">
+    <dgm:scene3d>
+      <a:camera prst="orthographicFront"/>
+      <a:lightRig rig="threePt" dir="t"/>
+    </dgm:scene3d>
+    <dgm:sp3d/>
+    <dgm:txPr/>
+    <dgm:style>
+      <a:lnRef idx="2">
+        <a:scrgbClr r="0" g="0" b="0"/>
+      </a:lnRef>
+      <a:fillRef idx="1">
+        <a:scrgbClr r="0" g="0" b="0"/>
+      </a:fillRef>
+      <a:effectRef idx="0">
+        <a:scrgbClr r="0" g="0" b="0"/>
+      </a:effectRef>
+      <a:fontRef idx="minor"/>
+    </dgm:style>
+  </dgm:styleLbl>
+  <dgm:styleLbl name="alignImgPlace1">
+    <dgm:scene3d>
+      <a:camera prst="orthographicFront"/>
+      <a:lightRig rig="threePt" dir="t"/>
+    </dgm:scene3d>
+    <dgm:sp3d/>
+    <dgm:txPr/>
+    <dgm:style>
+      <a:lnRef idx="2">
+        <a:scrgbClr r="0" g="0" b="0"/>
+      </a:lnRef>
+      <a:fillRef idx="1">
+        <a:scrgbClr r="0" g="0" b="0"/>
+      </a:fillRef>
+      <a:effectRef idx="0">
+        <a:scrgbClr r="0" g="0" b="0"/>
+      </a:effectRef>
+      <a:fontRef idx="minor"/>
+    </dgm:style>
+  </dgm:styleLbl>
+  <dgm:styleLbl name="bgImgPlace1">
+    <dgm:scene3d>
+      <a:camera prst="orthographicFront"/>
+      <a:lightRig rig="threePt" dir="t"/>
+    </dgm:scene3d>
+    <dgm:sp3d/>
+    <dgm:txPr/>
+    <dgm:style>
+      <a:lnRef idx="2">
+        <a:scrgbClr r="0" g="0" b="0"/>
+      </a:lnRef>
+      <a:fillRef idx="1">
+        <a:scrgbClr r="0" g="0" b="0"/>
+      </a:fillRef>
+      <a:effectRef idx="0">
+        <a:scrgbClr r="0" g="0" b="0"/>
+      </a:effectRef>
+      <a:fontRef idx="minor"/>
+    </dgm:style>
+  </dgm:styleLbl>
+  <dgm:styleLbl name="sibTrans2D1">
+    <dgm:scene3d>
+      <a:camera prst="orthographicFront"/>
+      <a:lightRig rig="threePt" dir="t"/>
+    </dgm:scene3d>
+    <dgm:sp3d/>
+    <dgm:txPr/>
+    <dgm:style>
+      <a:lnRef idx="0">
+        <a:scrgbClr r="0" g="0" b="0"/>
+      </a:lnRef>
+      <a:fillRef idx="1">
+        <a:scrgbClr r="0" g="0" b="0"/>
+      </a:fillRef>
+      <a:effectRef idx="0">
+        <a:scrgbClr r="0" g="0" b="0"/>
+      </a:effectRef>
+      <a:fontRef idx="minor">
+        <a:schemeClr val="lt1"/>
+      </a:fontRef>
+    </dgm:style>
+  </dgm:styleLbl>
+  <dgm:styleLbl name="fgSibTrans2D1">
+    <dgm:scene3d>
+      <a:camera prst="orthographicFront"/>
+      <a:lightRig rig="threePt" dir="t"/>
+    </dgm:scene3d>
+    <dgm:sp3d/>
+    <dgm:txPr/>
+    <dgm:style>
+      <a:lnRef idx="0">
+        <a:scrgbClr r="0" g="0" b="0"/>
+      </a:lnRef>
+      <a:fillRef idx="1">
+        <a:scrgbClr r="0" g="0" b="0"/>
+      </a:fillRef>
+      <a:effectRef idx="0">
+        <a:scrgbClr r="0" g="0" b="0"/>
+      </a:effectRef>
+      <a:fontRef idx="minor">
+        <a:schemeClr val="lt1"/>
+      </a:fontRef>
+    </dgm:style>
+  </dgm:styleLbl>
+  <dgm:styleLbl name="bgSibTrans2D1">
+    <dgm:scene3d>
+      <a:camera prst="orthographicFront"/>
+      <a:lightRig rig="threePt" dir="t"/>
+    </dgm:scene3d>
+    <dgm:sp3d/>
+    <dgm:txPr/>
+    <dgm:style>
+      <a:lnRef idx="0">
+        <a:scrgbClr r="0" g="0" b="0"/>
+      </a:lnRef>
+      <a:fillRef idx="1">
+        <a:scrgbClr r="0" g="0" b="0"/>
+      </a:fillRef>
+      <a:effectRef idx="0">
+        <a:scrgbClr r="0" g="0" b="0"/>
+      </a:effectRef>
+      <a:fontRef idx="minor">
+        <a:schemeClr val="lt1"/>
+      </a:fontRef>
+    </dgm:style>
+  </dgm:styleLbl>
+  <dgm:styleLbl name="sibTrans1D1">
+    <dgm:scene3d>
+      <a:camera prst="orthographicFront"/>
+      <a:lightRig rig="threePt" dir="t"/>
+    </dgm:scene3d>
+    <dgm:sp3d/>
+    <dgm:txPr/>
+    <dgm:style>
+      <a:lnRef idx="1">
+        <a:scrgbClr r="0" g="0" b="0"/>
+      </a:lnRef>
+      <a:fillRef idx="0">
+        <a:scrgbClr r="0" g="0" b="0"/>
+      </a:fillRef>
+      <a:effectRef idx="0">
+        <a:scrgbClr r="0" g="0" b="0"/>
+      </a:effectRef>
+      <a:fontRef idx="minor"/>
+    </dgm:style>
+  </dgm:styleLbl>
+  <dgm:styleLbl name="callout">
+    <dgm:scene3d>
+      <a:camera prst="orthographicFront"/>
+      <a:lightRig rig="threePt" dir="t"/>
+    </dgm:scene3d>
+    <dgm:sp3d/>
+    <dgm:txPr/>
+    <dgm:style>
+      <a:lnRef idx="2">
+        <a:scrgbClr r="0" g="0" b="0"/>
+      </a:lnRef>
+      <a:fillRef idx="1">
+        <a:scrgbClr r="0" g="0" b="0"/>
+      </a:fillRef>
+      <a:effectRef idx="0">
+        <a:scrgbClr r="0" g="0" b="0"/>
+      </a:effectRef>
+      <a:fontRef idx="minor"/>
+    </dgm:style>
+  </dgm:styleLbl>
+  <dgm:styleLbl name="asst0">
+    <dgm:scene3d>
+      <a:camera prst="orthographicFront"/>
+      <a:lightRig rig="threePt" dir="t"/>
+    </dgm:scene3d>
+    <dgm:sp3d/>
+    <dgm:txPr/>
+    <dgm:style>
+      <a:lnRef idx="2">
+        <a:scrgbClr r="0" g="0" b="0"/>
+      </a:lnRef>
+      <a:fillRef idx="1">
+        <a:scrgbClr r="0" g="0" b="0"/>
+      </a:fillRef>
+      <a:effectRef idx="0">
+        <a:scrgbClr r="0" g="0" b="0"/>
+      </a:effectRef>
+      <a:fontRef idx="minor">
+        <a:schemeClr val="lt1"/>
+      </a:fontRef>
+    </dgm:style>
+  </dgm:styleLbl>
+  <dgm:styleLbl name="asst1">
+    <dgm:scene3d>
+      <a:camera prst="orthographicFront"/>
+      <a:lightRig rig="threePt" dir="t"/>
+    </dgm:scene3d>
+    <dgm:sp3d/>
+    <dgm:txPr/>
+    <dgm:style>
+      <a:lnRef idx="2">
+        <a:scrgbClr r="0" g="0" b="0"/>
+      </a:lnRef>
+      <a:fillRef idx="1">
+        <a:scrgbClr r="0" g="0" b="0"/>
+      </a:fillRef>
+      <a:effectRef idx="0">
+        <a:scrgbClr r="0" g="0" b="0"/>
+      </a:effectRef>
+      <a:fontRef idx="minor">
+        <a:schemeClr val="lt1"/>
+      </a:fontRef>
+    </dgm:style>
+  </dgm:styleLbl>
+  <dgm:styleLbl name="asst2">
+    <dgm:scene3d>
+      <a:camera prst="orthographicFront"/>
+      <a:lightRig rig="threePt" dir="t"/>
+    </dgm:scene3d>
+    <dgm:sp3d/>
+    <dgm:txPr/>
+    <dgm:style>
+      <a:lnRef idx="2">
+        <a:scrgbClr r="0" g="0" b="0"/>
+      </a:lnRef>
+      <a:fillRef idx="1">
+        <a:scrgbClr r="0" g="0" b="0"/>
+      </a:fillRef>
+      <a:effectRef idx="0">
+        <a:scrgbClr r="0" g="0" b="0"/>
+      </a:effectRef>
+      <a:fontRef idx="minor">
+        <a:schemeClr val="lt1"/>
+      </a:fontRef>
+    </dgm:style>
+  </dgm:styleLbl>
+  <dgm:styleLbl name="asst3">
+    <dgm:scene3d>
+      <a:camera prst="orthographicFront"/>
+      <a:lightRig rig="threePt" dir="t"/>
+    </dgm:scene3d>
+    <dgm:sp3d/>
+    <dgm:txPr/>
+    <dgm:style>
+      <a:lnRef idx="2">
+        <a:scrgbClr r="0" g="0" b="0"/>
+      </a:lnRef>
+      <a:fillRef idx="1">
+        <a:scrgbClr r="0" g="0" b="0"/>
+      </a:fillRef>
+      <a:effectRef idx="0">
+        <a:scrgbClr r="0" g="0" b="0"/>
+      </a:effectRef>
+      <a:fontRef idx="minor">
+        <a:schemeClr val="lt1"/>
+      </a:fontRef>
+    </dgm:style>
+  </dgm:styleLbl>
+  <dgm:styleLbl name="asst4">
+    <dgm:scene3d>
+      <a:camera prst="orthographicFront"/>
+      <a:lightRig rig="threePt" dir="t"/>
+    </dgm:scene3d>
+    <dgm:sp3d/>
+    <dgm:txPr/>
+    <dgm:style>
+      <a:lnRef idx="2">
+        <a:scrgbClr r="0" g="0" b="0"/>
+      </a:lnRef>
+      <a:fillRef idx="1">
+        <a:scrgbClr r="0" g="0" b="0"/>
+      </a:fillRef>
+      <a:effectRef idx="0">
+        <a:scrgbClr r="0" g="0" b="0"/>
+      </a:effectRef>
+      <a:fontRef idx="minor">
+        <a:schemeClr val="lt1"/>
+      </a:fontRef>
+    </dgm:style>
+  </dgm:styleLbl>
+  <dgm:styleLbl name="parChTrans2D1">
+    <dgm:scene3d>
+      <a:camera prst="orthographicFront"/>
+      <a:lightRig rig="threePt" dir="t"/>
+    </dgm:scene3d>
+    <dgm:sp3d/>
+    <dgm:txPr/>
+    <dgm:style>
+      <a:lnRef idx="2">
+        <a:scrgbClr r="0" g="0" b="0"/>
+      </a:lnRef>
+      <a:fillRef idx="1">
+        <a:scrgbClr r="0" g="0" b="0"/>
+      </a:fillRef>
+      <a:effectRef idx="0">
+        <a:scrgbClr r="0" g="0" b="0"/>
+      </a:effectRef>
+      <a:fontRef idx="minor">
+        <a:schemeClr val="lt1"/>
+      </a:fontRef>
+    </dgm:style>
+  </dgm:styleLbl>
+  <dgm:styleLbl name="parChTrans2D2">
+    <dgm:scene3d>
+      <a:camera prst="orthographicFront"/>
+      <a:lightRig rig="threePt" dir="t"/>
+    </dgm:scene3d>
+    <dgm:sp3d/>
+    <dgm:txPr/>
+    <dgm:style>
+      <a:lnRef idx="2">
+        <a:scrgbClr r="0" g="0" b="0"/>
+      </a:lnRef>
+      <a:fillRef idx="1">
+        <a:scrgbClr r="0" g="0" b="0"/>
+      </a:fillRef>
+      <a:effectRef idx="0">
+        <a:scrgbClr r="0" g="0" b="0"/>
+      </a:effectRef>
+      <a:fontRef idx="minor">
+        <a:schemeClr val="lt1"/>
+      </a:fontRef>
+    </dgm:style>
+  </dgm:styleLbl>
+  <dgm:styleLbl name="parChTrans2D3">
+    <dgm:scene3d>
+      <a:camera prst="orthographicFront"/>
+      <a:lightRig rig="threePt" dir="t"/>
+    </dgm:scene3d>
+    <dgm:sp3d/>
+    <dgm:txPr/>
+    <dgm:style>
+      <a:lnRef idx="2">
+        <a:scrgbClr r="0" g="0" b="0"/>
+      </a:lnRef>
+      <a:fillRef idx="1">
+        <a:scrgbClr r="0" g="0" b="0"/>
+      </a:fillRef>
+      <a:effectRef idx="0">
+        <a:scrgbClr r="0" g="0" b="0"/>
+      </a:effectRef>
+      <a:fontRef idx="minor">
+        <a:schemeClr val="lt1"/>
+      </a:fontRef>
+    </dgm:style>
+  </dgm:styleLbl>
+  <dgm:styleLbl name="parChTrans2D4">
+    <dgm:scene3d>
+      <a:camera prst="orthographicFront"/>
+      <a:lightRig rig="threePt" dir="t"/>
+    </dgm:scene3d>
+    <dgm:sp3d/>
+    <dgm:txPr/>
+    <dgm:style>
+      <a:lnRef idx="2">
+        <a:scrgbClr r="0" g="0" b="0"/>
+      </a:lnRef>
+      <a:fillRef idx="1">
+        <a:scrgbClr r="0" g="0" b="0"/>
+      </a:fillRef>
+      <a:effectRef idx="0">
+        <a:scrgbClr r="0" g="0" b="0"/>
+      </a:effectRef>
+      <a:fontRef idx="minor">
+        <a:schemeClr val="lt1"/>
+      </a:fontRef>
+    </dgm:style>
+  </dgm:styleLbl>
+  <dgm:styleLbl name="parChTrans1D1">
+    <dgm:scene3d>
+      <a:camera prst="orthographicFront"/>
+      <a:lightRig rig="threePt" dir="t"/>
+    </dgm:scene3d>
+    <dgm:sp3d/>
+    <dgm:txPr/>
+    <dgm:style>
+      <a:lnRef idx="2">
+        <a:scrgbClr r="0" g="0" b="0"/>
+      </a:lnRef>
+      <a:fillRef idx="0">
+        <a:scrgbClr r="0" g="0" b="0"/>
+      </a:fillRef>
+      <a:effectRef idx="0">
+        <a:scrgbClr r="0" g="0" b="0"/>
+      </a:effectRef>
+      <a:fontRef idx="minor"/>
+    </dgm:style>
+  </dgm:styleLbl>
+  <dgm:styleLbl name="parChTrans1D2">
+    <dgm:scene3d>
+      <a:camera prst="orthographicFront"/>
+      <a:lightRig rig="threePt" dir="t"/>
+    </dgm:scene3d>
+    <dgm:sp3d/>
+    <dgm:txPr/>
+    <dgm:style>
+      <a:lnRef idx="2">
+        <a:scrgbClr r="0" g="0" b="0"/>
+      </a:lnRef>
+      <a:fillRef idx="0">
+        <a:scrgbClr r="0" g="0" b="0"/>
+      </a:fillRef>
+      <a:effectRef idx="0">
+        <a:scrgbClr r="0" g="0" b="0"/>
+      </a:effectRef>
+      <a:fontRef idx="minor"/>
+    </dgm:style>
+  </dgm:styleLbl>
+  <dgm:styleLbl name="parChTrans1D3">
+    <dgm:scene3d>
+      <a:camera prst="orthographicFront"/>
+      <a:lightRig rig="threePt" dir="t"/>
+    </dgm:scene3d>
+    <dgm:sp3d/>
+    <dgm:txPr/>
+    <dgm:style>
+      <a:lnRef idx="2">
+        <a:scrgbClr r="0" g="0" b="0"/>
+      </a:lnRef>
+      <a:fillRef idx="0">
+        <a:scrgbClr r="0" g="0" b="0"/>
+      </a:fillRef>
+      <a:effectRef idx="0">
+        <a:scrgbClr r="0" g="0" b="0"/>
+      </a:effectRef>
+      <a:fontRef idx="minor"/>
+    </dgm:style>
+  </dgm:styleLbl>
+  <dgm:styleLbl name="parChTrans1D4">
+    <dgm:scene3d>
+      <a:camera prst="orthographicFront"/>
+      <a:lightRig rig="threePt" dir="t"/>
+    </dgm:scene3d>
+    <dgm:sp3d/>
+    <dgm:txPr/>
+    <dgm:style>
+      <a:lnRef idx="2">
+        <a:scrgbClr r="0" g="0" b="0"/>
+      </a:lnRef>
+      <a:fillRef idx="0">
+        <a:scrgbClr r="0" g="0" b="0"/>
+      </a:fillRef>
+      <a:effectRef idx="0">
+        <a:scrgbClr r="0" g="0" b="0"/>
+      </a:effectRef>
+      <a:fontRef idx="minor"/>
+    </dgm:style>
+  </dgm:styleLbl>
+  <dgm:styleLbl name="fgAcc1">
+    <dgm:scene3d>
+      <a:camera prst="orthographicFront"/>
+      <a:lightRig rig="threePt" dir="t"/>
+    </dgm:scene3d>
+    <dgm:sp3d/>
+    <dgm:txPr/>
+    <dgm:style>
+      <a:lnRef idx="2">
+        <a:scrgbClr r="0" g="0" b="0"/>
+      </a:lnRef>
+      <a:fillRef idx="1">
+        <a:scrgbClr r="0" g="0" b="0"/>
+      </a:fillRef>
+      <a:effectRef idx="0">
+        <a:scrgbClr r="0" g="0" b="0"/>
+      </a:effectRef>
+      <a:fontRef idx="minor"/>
+    </dgm:style>
+  </dgm:styleLbl>
+  <dgm:styleLbl name="conFgAcc1">
+    <dgm:scene3d>
+      <a:camera prst="orthographicFront"/>
+      <a:lightRig rig="threePt" dir="t"/>
+    </dgm:scene3d>
+    <dgm:sp3d/>
+    <dgm:txPr/>
+    <dgm:style>
+      <a:lnRef idx="2">
+        <a:scrgbClr r="0" g="0" b="0"/>
+      </a:lnRef>
+      <a:fillRef idx="1">
+        <a:scrgbClr r="0" g="0" b="0"/>
+      </a:fillRef>
+      <a:effectRef idx="0">
+        <a:scrgbClr r="0" g="0" b="0"/>
+      </a:effectRef>
+      <a:fontRef idx="minor"/>
+    </dgm:style>
+  </dgm:styleLbl>
+  <dgm:styleLbl name="alignAcc1">
+    <dgm:scene3d>
+      <a:camera prst="orthographicFront"/>
+      <a:lightRig rig="threePt" dir="t"/>
+    </dgm:scene3d>
+    <dgm:sp3d/>
+    <dgm:txPr/>
+    <dgm:style>
+      <a:lnRef idx="2">
+        <a:scrgbClr r="0" g="0" b="0"/>
+      </a:lnRef>
+      <a:fillRef idx="1">
+        <a:scrgbClr r="0" g="0" b="0"/>
+      </a:fillRef>
+      <a:effectRef idx="0">
+        <a:scrgbClr r="0" g="0" b="0"/>
+      </a:effectRef>
+      <a:fontRef idx="minor"/>
+    </dgm:style>
+  </dgm:styleLbl>
+  <dgm:styleLbl name="trAlignAcc1">
+    <dgm:scene3d>
+      <a:camera prst="orthographicFront"/>
+      <a:lightRig rig="threePt" dir="t"/>
+    </dgm:scene3d>
+    <dgm:sp3d/>
+    <dgm:txPr/>
+    <dgm:style>
+      <a:lnRef idx="1">
+        <a:scrgbClr r="0" g="0" b="0"/>
+      </a:lnRef>
+      <a:fillRef idx="1">
+        <a:scrgbClr r="0" g="0" b="0"/>
+      </a:fillRef>
+      <a:effectRef idx="0">
+        <a:scrgbClr r="0" g="0" b="0"/>
+      </a:effectRef>
+      <a:fontRef idx="minor"/>
+    </dgm:style>
+  </dgm:styleLbl>
+  <dgm:styleLbl name="bgAcc1">
+    <dgm:scene3d>
+      <a:camera prst="orthographicFront"/>
+      <a:lightRig rig="threePt" dir="t"/>
+    </dgm:scene3d>
+    <dgm:sp3d/>
+    <dgm:txPr/>
+    <dgm:style>
+      <a:lnRef idx="2">
+        <a:scrgbClr r="0" g="0" b="0"/>
+      </a:lnRef>
+      <a:fillRef idx="1">
+        <a:scrgbClr r="0" g="0" b="0"/>
+      </a:fillRef>
+      <a:effectRef idx="0">
+        <a:scrgbClr r="0" g="0" b="0"/>
+      </a:effectRef>
+      <a:fontRef idx="minor"/>
+    </dgm:style>
+  </dgm:styleLbl>
+  <dgm:styleLbl name="solidFgAcc1">
+    <dgm:scene3d>
+      <a:camera prst="orthographicFront"/>
+      <a:lightRig rig="threePt" dir="t"/>
+    </dgm:scene3d>
+    <dgm:sp3d/>
+    <dgm:txPr/>
+    <dgm:style>
+      <a:lnRef idx="2">
+        <a:scrgbClr r="0" g="0" b="0"/>
+      </a:lnRef>
+      <a:fillRef idx="1">
+        <a:scrgbClr r="0" g="0" b="0"/>
+      </a:fillRef>
+      <a:effectRef idx="0">
+        <a:scrgbClr r="0" g="0" b="0"/>
+      </a:effectRef>
+      <a:fontRef idx="minor"/>
+    </dgm:style>
+  </dgm:styleLbl>
+  <dgm:styleLbl name="solidAlignAcc1">
+    <dgm:scene3d>
+      <a:camera prst="orthographicFront"/>
+      <a:lightRig rig="threePt" dir="t"/>
+    </dgm:scene3d>
+    <dgm:sp3d/>
+    <dgm:txPr/>
+    <dgm:style>
+      <a:lnRef idx="2">
+        <a:scrgbClr r="0" g="0" b="0"/>
+      </a:lnRef>
+      <a:fillRef idx="1">
+        <a:scrgbClr r="0" g="0" b="0"/>
+      </a:fillRef>
+      <a:effectRef idx="0">
+        <a:scrgbClr r="0" g="0" b="0"/>
+      </a:effectRef>
+      <a:fontRef idx="minor"/>
+    </dgm:style>
+  </dgm:styleLbl>
+  <dgm:styleLbl name="solidBgAcc1">
+    <dgm:scene3d>
+      <a:camera prst="orthographicFront"/>
+      <a:lightRig rig="threePt" dir="t"/>
+    </dgm:scene3d>
+    <dgm:sp3d/>
+    <dgm:txPr/>
+    <dgm:style>
+      <a:lnRef idx="2">
+        <a:scrgbClr r="0" g="0" b="0"/>
+      </a:lnRef>
+      <a:fillRef idx="1">
+        <a:scrgbClr r="0" g="0" b="0"/>
+      </a:fillRef>
+      <a:effectRef idx="0">
+        <a:scrgbClr r="0" g="0" b="0"/>
+      </a:effectRef>
+      <a:fontRef idx="minor"/>
+    </dgm:style>
+  </dgm:styleLbl>
+  <dgm:styleLbl name="fgAccFollowNode1">
+    <dgm:scene3d>
+      <a:camera prst="orthographicFront"/>
+      <a:lightRig rig="threePt" dir="t"/>
+    </dgm:scene3d>
+    <dgm:sp3d/>
+    <dgm:txPr/>
+    <dgm:style>
+      <a:lnRef idx="2">
+        <a:scrgbClr r="0" g="0" b="0"/>
+      </a:lnRef>
+      <a:fillRef idx="1">
+        <a:scrgbClr r="0" g="0" b="0"/>
+      </a:fillRef>
+      <a:effectRef idx="0">
+        <a:scrgbClr r="0" g="0" b="0"/>
+      </a:effectRef>
+      <a:fontRef idx="minor"/>
+    </dgm:style>
+  </dgm:styleLbl>
+  <dgm:styleLbl name="alignAccFollowNode1">
+    <dgm:scene3d>
+      <a:camera prst="orthographicFront"/>
+      <a:lightRig rig="threePt" dir="t"/>
+    </dgm:scene3d>
+    <dgm:sp3d/>
+    <dgm:txPr/>
+    <dgm:style>
+      <a:lnRef idx="2">
+        <a:scrgbClr r="0" g="0" b="0"/>
+      </a:lnRef>
+      <a:fillRef idx="1">
+        <a:scrgbClr r="0" g="0" b="0"/>
+      </a:fillRef>
+      <a:effectRef idx="0">
+        <a:scrgbClr r="0" g="0" b="0"/>
+      </a:effectRef>
+      <a:fontRef idx="minor"/>
+    </dgm:style>
+  </dgm:styleLbl>
+  <dgm:styleLbl name="bgAccFollowNode1">
+    <dgm:scene3d>
+      <a:camera prst="orthographicFront"/>
+      <a:lightRig rig="threePt" dir="t"/>
+    </dgm:scene3d>
+    <dgm:sp3d/>
+    <dgm:txPr/>
+    <dgm:style>
+      <a:lnRef idx="2">
+        <a:scrgbClr r="0" g="0" b="0"/>
+      </a:lnRef>
+      <a:fillRef idx="1">
+        <a:scrgbClr r="0" g="0" b="0"/>
+      </a:fillRef>
+      <a:effectRef idx="0">
+        <a:scrgbClr r="0" g="0" b="0"/>
+      </a:effectRef>
+      <a:fontRef idx="minor"/>
+    </dgm:style>
+  </dgm:styleLbl>
+  <dgm:styleLbl name="fgAcc0">
+    <dgm:scene3d>
+      <a:camera prst="orthographicFront"/>
+      <a:lightRig rig="threePt" dir="t"/>
+    </dgm:scene3d>
+    <dgm:sp3d/>
+    <dgm:txPr/>
+    <dgm:style>
+      <a:lnRef idx="2">
+        <a:scrgbClr r="0" g="0" b="0"/>
+      </a:lnRef>
+      <a:fillRef idx="1">
+        <a:scrgbClr r="0" g="0" b="0"/>
+      </a:fillRef>
+      <a:effectRef idx="0">
+        <a:scrgbClr r="0" g="0" b="0"/>
+      </a:effectRef>
+      <a:fontRef idx="minor"/>
+    </dgm:style>
+  </dgm:styleLbl>
+  <dgm:styleLbl name="fgAcc2">
+    <dgm:scene3d>
+      <a:camera prst="orthographicFront"/>
+      <a:lightRig rig="threePt" dir="t"/>
+    </dgm:scene3d>
+    <dgm:sp3d/>
+    <dgm:txPr/>
+    <dgm:style>
+      <a:lnRef idx="2">
+        <a:scrgbClr r="0" g="0" b="0"/>
+      </a:lnRef>
+      <a:fillRef idx="1">
+        <a:scrgbClr r="0" g="0" b="0"/>
+      </a:fillRef>
+      <a:effectRef idx="0">
+        <a:scrgbClr r="0" g="0" b="0"/>
+      </a:effectRef>
+      <a:fontRef idx="minor"/>
+    </dgm:style>
+  </dgm:styleLbl>
+  <dgm:styleLbl name="fgAcc3">
+    <dgm:scene3d>
+      <a:camera prst="orthographicFront"/>
+      <a:lightRig rig="threePt" dir="t"/>
+    </dgm:scene3d>
+    <dgm:sp3d/>
+    <dgm:txPr/>
+    <dgm:style>
+      <a:lnRef idx="2">
+        <a:scrgbClr r="0" g="0" b="0"/>
+      </a:lnRef>
+      <a:fillRef idx="1">
+        <a:scrgbClr r="0" g="0" b="0"/>
+      </a:fillRef>
+      <a:effectRef idx="0">
+        <a:scrgbClr r="0" g="0" b="0"/>
+      </a:effectRef>
+      <a:fontRef idx="minor"/>
+    </dgm:style>
+  </dgm:styleLbl>
+  <dgm:styleLbl name="fgAcc4">
+    <dgm:scene3d>
+      <a:camera prst="orthographicFront"/>
+      <a:lightRig rig="threePt" dir="t"/>
+    </dgm:scene3d>
+    <dgm:sp3d/>
+    <dgm:txPr/>
+    <dgm:style>
+      <a:lnRef idx="2">
+        <a:scrgbClr r="0" g="0" b="0"/>
+      </a:lnRef>
+      <a:fillRef idx="1">
+        <a:scrgbClr r="0" g="0" b="0"/>
+      </a:fillRef>
+      <a:effectRef idx="0">
+        <a:scrgbClr r="0" g="0" b="0"/>
+      </a:effectRef>
+      <a:fontRef idx="minor"/>
+    </dgm:style>
+  </dgm:styleLbl>
+  <dgm:styleLbl name="bgShp">
+    <dgm:scene3d>
+      <a:camera prst="orthographicFront"/>
+      <a:lightRig rig="threePt" dir="t"/>
+    </dgm:scene3d>
+    <dgm:sp3d/>
+    <dgm:txPr/>
+    <dgm:style>
+      <a:lnRef idx="0">
+        <a:scrgbClr r="0" g="0" b="0"/>
+      </a:lnRef>
+      <a:fillRef idx="1">
+        <a:scrgbClr r="0" g="0" b="0"/>
+      </a:fillRef>
+      <a:effectRef idx="0">
+        <a:scrgbClr r="0" g="0" b="0"/>
+      </a:effectRef>
+      <a:fontRef idx="minor"/>
+    </dgm:style>
+  </dgm:styleLbl>
+  <dgm:styleLbl name="dkBgShp">
+    <dgm:scene3d>
+      <a:camera prst="orthographicFront"/>
+      <a:lightRig rig="threePt" dir="t"/>
+    </dgm:scene3d>
+    <dgm:sp3d/>
+    <dgm:txPr/>
+    <dgm:style>
+      <a:lnRef idx="0">
+        <a:scrgbClr r="0" g="0" b="0"/>
+      </a:lnRef>
+      <a:fillRef idx="1">
+        <a:scrgbClr r="0" g="0" b="0"/>
+      </a:fillRef>
+      <a:effectRef idx="0">
+        <a:scrgbClr r="0" g="0" b="0"/>
+      </a:effectRef>
+      <a:fontRef idx="minor"/>
+    </dgm:style>
+  </dgm:styleLbl>
+  <dgm:styleLbl name="trBgShp">
+    <dgm:scene3d>
+      <a:camera prst="orthographicFront"/>
+      <a:lightRig rig="threePt" dir="t"/>
+    </dgm:scene3d>
+    <dgm:sp3d/>
+    <dgm:txPr/>
+    <dgm:style>
+      <a:lnRef idx="0">
+        <a:scrgbClr r="0" g="0" b="0"/>
+      </a:lnRef>
+      <a:fillRef idx="1">
+        <a:scrgbClr r="0" g="0" b="0"/>
+      </a:fillRef>
+      <a:effectRef idx="0">
+        <a:scrgbClr r="0" g="0" b="0"/>
+      </a:effectRef>
+      <a:fontRef idx="minor"/>
+    </dgm:style>
+  </dgm:styleLbl>
+  <dgm:styleLbl name="fgShp">
+    <dgm:scene3d>
+      <a:camera prst="orthographicFront"/>
+      <a:lightRig rig="threePt" dir="t"/>
+    </dgm:scene3d>
+    <dgm:sp3d/>
+    <dgm:txPr/>
+    <dgm:style>
+      <a:lnRef idx="2">
+        <a:scrgbClr r="0" g="0" b="0"/>
+      </a:lnRef>
+      <a:fillRef idx="1">
+        <a:scrgbClr r="0" g="0" b="0"/>
+      </a:fillRef>
+      <a:effectRef idx="0">
+        <a:scrgbClr r="0" g="0" b="0"/>
+      </a:effectRef>
+      <a:fontRef idx="minor"/>
+    </dgm:style>
+  </dgm:styleLbl>
+  <dgm:styleLbl name="revTx">
+    <dgm:scene3d>
+      <a:camera prst="orthographicFront"/>
+      <a:lightRig rig="threePt" dir="t"/>
+    </dgm:scene3d>
+    <dgm:sp3d/>
+    <dgm:txPr/>
+    <dgm:style>
+      <a:lnRef idx="0">
+        <a:scrgbClr r="0" g="0" b="0"/>
+      </a:lnRef>
+      <a:fillRef idx="0">
+        <a:scrgbClr r="0" g="0" b="0"/>
+      </a:fillRef>
+      <a:effectRef idx="0">
+        <a:scrgbClr r="0" g="0" b="0"/>
+      </a:effectRef>
+      <a:fontRef idx="minor"/>
+    </dgm:style>
+  </dgm:styleLbl>
+</dgm:styleDef>
+</file>
+
+<file path=ppt/diagrams/quickStyle3.xml><?xml version="1.0" encoding="utf-8"?>
 <dgm:styleDef xmlns:dgm="http://schemas.openxmlformats.org/drawingml/2006/diagram" xmlns:a="http://schemas.openxmlformats.org/drawingml/2006/main" uniqueId="urn:microsoft.com/office/officeart/2005/8/quickstyle/simple1">
   <dgm:title val=""/>
   <dgm:desc val=""/>
@@ -9099,6 +12126,254 @@
 <file path=ppt/slides/slide1.xml><?xml version="1.0" encoding="utf-8"?>
 <p:sld xmlns:a="http://schemas.openxmlformats.org/drawingml/2006/main" xmlns:r="http://schemas.openxmlformats.org/officeDocument/2006/relationships" xmlns:p="http://schemas.openxmlformats.org/presentationml/2006/main">
   <p:cSld>
+    <p:spTree>
+      <p:nvGrpSpPr>
+        <p:cNvPr id="1" name=""/>
+        <p:cNvGrpSpPr/>
+        <p:nvPr/>
+      </p:nvGrpSpPr>
+      <p:grpSpPr>
+        <a:xfrm>
+          <a:off x="0" y="0"/>
+          <a:ext cx="0" cy="0"/>
+          <a:chOff x="0" y="0"/>
+          <a:chExt cx="0" cy="0"/>
+        </a:xfrm>
+      </p:grpSpPr>
+      <p:sp>
+        <p:nvSpPr>
+          <p:cNvPr id="2" name="Titel 1">
+            <a:extLst>
+              <a:ext uri="{FF2B5EF4-FFF2-40B4-BE49-F238E27FC236}">
+                <a16:creationId xmlns:a16="http://schemas.microsoft.com/office/drawing/2014/main" id="{BBD3F924-4EFE-49CB-9D75-A6FAB9D9F61C}"/>
+              </a:ext>
+            </a:extLst>
+          </p:cNvPr>
+          <p:cNvSpPr>
+            <a:spLocks noGrp="1"/>
+          </p:cNvSpPr>
+          <p:nvPr>
+            <p:ph type="ctrTitle"/>
+          </p:nvPr>
+        </p:nvSpPr>
+        <p:spPr/>
+        <p:txBody>
+          <a:bodyPr>
+            <a:normAutofit/>
+          </a:bodyPr>
+          <a:lstStyle/>
+          <a:p>
+            <a:r>
+              <a:rPr lang="nl-NL" dirty="0"/>
+              <a:t>Embedded system design 2 - Corona </a:t>
+            </a:r>
+            <a:r>
+              <a:rPr lang="nl-NL" dirty="0" err="1"/>
+              <a:t>presentation</a:t>
+            </a:r>
+            <a:endParaRPr lang="nl-BE" dirty="0"/>
+          </a:p>
+        </p:txBody>
+      </p:sp>
+      <p:sp>
+        <p:nvSpPr>
+          <p:cNvPr id="3" name="Ondertitel 2">
+            <a:extLst>
+              <a:ext uri="{FF2B5EF4-FFF2-40B4-BE49-F238E27FC236}">
+                <a16:creationId xmlns:a16="http://schemas.microsoft.com/office/drawing/2014/main" id="{A782081D-0F02-4059-93F2-33AA84C3F20A}"/>
+              </a:ext>
+            </a:extLst>
+          </p:cNvPr>
+          <p:cNvSpPr>
+            <a:spLocks noGrp="1"/>
+          </p:cNvSpPr>
+          <p:nvPr>
+            <p:ph type="subTitle" idx="1"/>
+          </p:nvPr>
+        </p:nvSpPr>
+        <p:spPr/>
+        <p:txBody>
+          <a:bodyPr/>
+          <a:lstStyle/>
+          <a:p>
+            <a:r>
+              <a:rPr lang="nl-NL" dirty="0" err="1"/>
+              <a:t>By</a:t>
+            </a:r>
+            <a:r>
+              <a:rPr lang="nl-NL" dirty="0"/>
+              <a:t> Tobias Cromheecke, Thomas </a:t>
+            </a:r>
+            <a:r>
+              <a:rPr lang="nl-NL" dirty="0" err="1"/>
+              <a:t>Feys</a:t>
+            </a:r>
+            <a:r>
+              <a:rPr lang="nl-NL" dirty="0"/>
+              <a:t>, </a:t>
+            </a:r>
+            <a:r>
+              <a:rPr lang="nl-BE" dirty="0"/>
+              <a:t>Robin Van de Poel, </a:t>
+            </a:r>
+            <a:r>
+              <a:rPr lang="nl-NL" dirty="0"/>
+              <a:t>Arthur Van den </a:t>
+            </a:r>
+            <a:r>
+              <a:rPr lang="nl-NL" dirty="0" err="1"/>
+              <a:t>Storme</a:t>
+            </a:r>
+            <a:endParaRPr lang="nl-NL" dirty="0"/>
+          </a:p>
+          <a:p>
+            <a:r>
+              <a:rPr lang="nl-NL" dirty="0"/>
+              <a:t>16-4-2020</a:t>
+            </a:r>
+            <a:endParaRPr lang="nl-BE" dirty="0"/>
+          </a:p>
+        </p:txBody>
+      </p:sp>
+    </p:spTree>
+    <p:extLst>
+      <p:ext uri="{BB962C8B-B14F-4D97-AF65-F5344CB8AC3E}">
+        <p14:creationId xmlns:p14="http://schemas.microsoft.com/office/powerpoint/2010/main" val="885073016"/>
+      </p:ext>
+    </p:extLst>
+  </p:cSld>
+  <p:clrMapOvr>
+    <a:masterClrMapping/>
+  </p:clrMapOvr>
+</p:sld>
+</file>
+
+<file path=ppt/slides/slide2.xml><?xml version="1.0" encoding="utf-8"?>
+<p:sld xmlns:a="http://schemas.openxmlformats.org/drawingml/2006/main" xmlns:r="http://schemas.openxmlformats.org/officeDocument/2006/relationships" xmlns:p="http://schemas.openxmlformats.org/presentationml/2006/main">
+  <p:cSld>
+    <p:spTree>
+      <p:nvGrpSpPr>
+        <p:cNvPr id="1" name=""/>
+        <p:cNvGrpSpPr/>
+        <p:nvPr/>
+      </p:nvGrpSpPr>
+      <p:grpSpPr>
+        <a:xfrm>
+          <a:off x="0" y="0"/>
+          <a:ext cx="0" cy="0"/>
+          <a:chOff x="0" y="0"/>
+          <a:chExt cx="0" cy="0"/>
+        </a:xfrm>
+      </p:grpSpPr>
+      <p:sp>
+        <p:nvSpPr>
+          <p:cNvPr id="2" name="Titel 1">
+            <a:extLst>
+              <a:ext uri="{FF2B5EF4-FFF2-40B4-BE49-F238E27FC236}">
+                <a16:creationId xmlns:a16="http://schemas.microsoft.com/office/drawing/2014/main" id="{B61D15E7-BCD3-43DB-86DC-E72D5CB20F75}"/>
+              </a:ext>
+            </a:extLst>
+          </p:cNvPr>
+          <p:cNvSpPr>
+            <a:spLocks noGrp="1"/>
+          </p:cNvSpPr>
+          <p:nvPr>
+            <p:ph type="title"/>
+          </p:nvPr>
+        </p:nvSpPr>
+        <p:spPr/>
+        <p:txBody>
+          <a:bodyPr/>
+          <a:lstStyle/>
+          <a:p>
+            <a:r>
+              <a:rPr lang="nl-NL" dirty="0"/>
+              <a:t>Index</a:t>
+            </a:r>
+            <a:endParaRPr lang="nl-BE" dirty="0"/>
+          </a:p>
+        </p:txBody>
+      </p:sp>
+      <p:sp>
+        <p:nvSpPr>
+          <p:cNvPr id="3" name="Tijdelijke aanduiding voor inhoud 2">
+            <a:extLst>
+              <a:ext uri="{FF2B5EF4-FFF2-40B4-BE49-F238E27FC236}">
+                <a16:creationId xmlns:a16="http://schemas.microsoft.com/office/drawing/2014/main" id="{02FBB88B-0BFA-4840-8674-10492DA38899}"/>
+              </a:ext>
+            </a:extLst>
+          </p:cNvPr>
+          <p:cNvSpPr>
+            <a:spLocks noGrp="1"/>
+          </p:cNvSpPr>
+          <p:nvPr>
+            <p:ph idx="1"/>
+          </p:nvPr>
+        </p:nvSpPr>
+        <p:spPr/>
+        <p:txBody>
+          <a:bodyPr/>
+          <a:lstStyle/>
+          <a:p>
+            <a:r>
+              <a:rPr lang="nl-NL" dirty="0"/>
+              <a:t>Power management</a:t>
+            </a:r>
+          </a:p>
+          <a:p>
+            <a:r>
+              <a:rPr lang="nl-NL" dirty="0"/>
+              <a:t>Microcontroller</a:t>
+            </a:r>
+          </a:p>
+          <a:p>
+            <a:r>
+              <a:rPr lang="nl-NL" dirty="0"/>
+              <a:t>Sensors</a:t>
+            </a:r>
+          </a:p>
+          <a:p>
+            <a:r>
+              <a:rPr lang="nl-NL" dirty="0"/>
+              <a:t>Code</a:t>
+            </a:r>
+          </a:p>
+          <a:p>
+            <a:r>
+              <a:rPr lang="nl-NL" dirty="0"/>
+              <a:t>Wi-Fi </a:t>
+            </a:r>
+            <a:r>
+              <a:rPr lang="nl-NL" dirty="0" err="1"/>
+              <a:t>communication</a:t>
+            </a:r>
+            <a:endParaRPr lang="nl-NL" dirty="0"/>
+          </a:p>
+          <a:p>
+            <a:r>
+              <a:rPr lang="nl-NL" dirty="0"/>
+              <a:t>Code</a:t>
+            </a:r>
+            <a:endParaRPr lang="nl-BE" dirty="0"/>
+          </a:p>
+        </p:txBody>
+      </p:sp>
+    </p:spTree>
+    <p:extLst>
+      <p:ext uri="{BB962C8B-B14F-4D97-AF65-F5344CB8AC3E}">
+        <p14:creationId xmlns:p14="http://schemas.microsoft.com/office/powerpoint/2010/main" val="4017194650"/>
+      </p:ext>
+    </p:extLst>
+  </p:cSld>
+  <p:clrMapOvr>
+    <a:masterClrMapping/>
+  </p:clrMapOvr>
+</p:sld>
+</file>
+
+<file path=ppt/slides/slide3.xml><?xml version="1.0" encoding="utf-8"?>
+<p:sld xmlns:a="http://schemas.openxmlformats.org/drawingml/2006/main" xmlns:r="http://schemas.openxmlformats.org/officeDocument/2006/relationships" xmlns:p="http://schemas.openxmlformats.org/presentationml/2006/main">
+  <p:cSld>
     <p:bg>
       <p:bgPr>
         <a:solidFill>
@@ -9150,7 +12425,7 @@
           <a:lstStyle/>
           <a:p>
             <a:r>
-              <a:rPr lang="en-US" kern="1200">
+              <a:rPr lang="en-US" kern="1200" dirty="0">
                 <a:solidFill>
                   <a:schemeClr val="tx1"/>
                 </a:solidFill>
@@ -9158,7 +12433,7 @@
                 <a:ea typeface="+mj-ea"/>
                 <a:cs typeface="+mj-cs"/>
               </a:rPr>
-              <a:t>Wi-Fi communication </a:t>
+              <a:t>Power management</a:t>
             </a:r>
           </a:p>
         </p:txBody>
@@ -9651,7 +12926,7 @@
         <p:spPr>
           <a:xfrm>
             <a:off x="1400107" y="1767796"/>
-            <a:ext cx="4442637" cy="4041648"/>
+            <a:ext cx="4442637" cy="4724444"/>
           </a:xfrm>
           <a:prstGeom prst="rect">
             <a:avLst/>
@@ -9689,7 +12964,7 @@
             </a:pPr>
             <a:r>
               <a:rPr lang="en-US" sz="2400" dirty="0"/>
-              <a:t>Data transfer between ESP32 and Python server</a:t>
+              <a:t>Battery: Lithium-Ion battery</a:t>
             </a:r>
           </a:p>
           <a:p>
@@ -9705,7 +12980,100 @@
             </a:pPr>
             <a:r>
               <a:rPr lang="en-US" sz="2400" dirty="0"/>
-              <a:t>Faster connection setup because of static IP =&gt; reduced power consumption</a:t>
+              <a:t>Charger IC</a:t>
+            </a:r>
+          </a:p>
+          <a:p>
+            <a:pPr marL="285750" indent="-228600">
+              <a:lnSpc>
+                <a:spcPct val="90000"/>
+              </a:lnSpc>
+              <a:spcAft>
+                <a:spcPts val="600"/>
+              </a:spcAft>
+              <a:buFont typeface="Arial" panose="020B0604020202020204" pitchFamily="34" charset="0"/>
+              <a:buChar char="•"/>
+            </a:pPr>
+            <a:r>
+              <a:rPr lang="en-US" sz="2400" dirty="0"/>
+              <a:t>Protection IC</a:t>
+            </a:r>
+          </a:p>
+          <a:p>
+            <a:pPr marL="285750" indent="-228600">
+              <a:lnSpc>
+                <a:spcPct val="90000"/>
+              </a:lnSpc>
+              <a:spcAft>
+                <a:spcPts val="600"/>
+              </a:spcAft>
+              <a:buFont typeface="Arial" panose="020B0604020202020204" pitchFamily="34" charset="0"/>
+              <a:buChar char="•"/>
+            </a:pPr>
+            <a:r>
+              <a:rPr lang="en-US" sz="2400" dirty="0"/>
+              <a:t>Reverse polarity protection </a:t>
+            </a:r>
+            <a:r>
+              <a:rPr lang="en-US" sz="2400" dirty="0" err="1"/>
+              <a:t>circtuit</a:t>
+            </a:r>
+            <a:endParaRPr lang="en-US" sz="2400" dirty="0"/>
+          </a:p>
+          <a:p>
+            <a:pPr marL="285750" indent="-228600">
+              <a:lnSpc>
+                <a:spcPct val="90000"/>
+              </a:lnSpc>
+              <a:spcAft>
+                <a:spcPts val="600"/>
+              </a:spcAft>
+              <a:buFont typeface="Arial" panose="020B0604020202020204" pitchFamily="34" charset="0"/>
+              <a:buChar char="•"/>
+            </a:pPr>
+            <a:r>
+              <a:rPr lang="en-US" sz="2400" dirty="0"/>
+              <a:t>LDO: 3,7 V to 3,3 V</a:t>
+            </a:r>
+          </a:p>
+          <a:p>
+            <a:pPr marL="285750" indent="-228600">
+              <a:lnSpc>
+                <a:spcPct val="90000"/>
+              </a:lnSpc>
+              <a:spcAft>
+                <a:spcPts val="600"/>
+              </a:spcAft>
+              <a:buFont typeface="Arial" panose="020B0604020202020204" pitchFamily="34" charset="0"/>
+              <a:buChar char="•"/>
+            </a:pPr>
+            <a:r>
+              <a:rPr lang="en-US" sz="2400" dirty="0"/>
+              <a:t>Load switches to turn on/off the sensors</a:t>
+            </a:r>
+          </a:p>
+          <a:p>
+            <a:pPr marL="285750" indent="-228600">
+              <a:lnSpc>
+                <a:spcPct val="90000"/>
+              </a:lnSpc>
+              <a:spcAft>
+                <a:spcPts val="600"/>
+              </a:spcAft>
+              <a:buFont typeface="Arial" panose="020B0604020202020204" pitchFamily="34" charset="0"/>
+              <a:buChar char="•"/>
+            </a:pPr>
+            <a:r>
+              <a:rPr lang="en-US" sz="2400" dirty="0"/>
+              <a:t>Availability to measure current via wire to put a </a:t>
+            </a:r>
+            <a:r>
+              <a:rPr lang="en-US" sz="2400" dirty="0" err="1"/>
+              <a:t>currentprobe</a:t>
+            </a:r>
+            <a:r>
+              <a:rPr lang="en-US" sz="2400" dirty="0"/>
+              <a:t> on or sense resistor</a:t>
             </a:r>
           </a:p>
           <a:p>
@@ -9764,7 +13132,7 @@
         <p:spPr>
           <a:xfrm>
             <a:off x="6271198" y="1690688"/>
-            <a:ext cx="5256212" cy="3739485"/>
+            <a:ext cx="5256212" cy="2631490"/>
           </a:xfrm>
           <a:prstGeom prst="rect">
             <a:avLst/>
@@ -9794,7 +13162,7 @@
             </a:pPr>
             <a:r>
               <a:rPr lang="en-GB" sz="2400" dirty="0"/>
-              <a:t>Process received data in Python </a:t>
+              <a:t>Soldering</a:t>
             </a:r>
           </a:p>
           <a:p>
@@ -9804,7 +13172,7 @@
             </a:pPr>
             <a:r>
               <a:rPr lang="en-GB" sz="2400" dirty="0"/>
-              <a:t>Measure power consumption </a:t>
+              <a:t>Testing</a:t>
             </a:r>
           </a:p>
           <a:p>
@@ -9814,17 +13182,7 @@
             </a:pPr>
             <a:r>
               <a:rPr lang="en-GB" sz="2400" dirty="0"/>
-              <a:t>Test connection with actual sensor data instead of dummy data</a:t>
-            </a:r>
-          </a:p>
-          <a:p>
-            <a:pPr marL="285750" indent="-285750">
-              <a:buFont typeface="Arial" panose="020B0604020202020204" pitchFamily="34" charset="0"/>
-              <a:buChar char="•"/>
-            </a:pPr>
-            <a:r>
-              <a:rPr lang="en-GB" sz="2400" dirty="0"/>
-              <a:t>Test Python server on Raspberry Pi instead of laptop</a:t>
+              <a:t>Designing revision</a:t>
             </a:r>
           </a:p>
           <a:p>
@@ -9866,7 +13224,7 @@
 </p:sld>
 </file>
 
-<file path=ppt/slides/slide2.xml><?xml version="1.0" encoding="utf-8"?>
+<file path=ppt/slides/slide4.xml><?xml version="1.0" encoding="utf-8"?>
 <p:sld xmlns:a="http://schemas.openxmlformats.org/drawingml/2006/main" xmlns:r="http://schemas.openxmlformats.org/officeDocument/2006/relationships" xmlns:p="http://schemas.openxmlformats.org/presentationml/2006/main">
   <p:cSld>
     <p:spTree>
@@ -9938,7 +13296,7 @@
             <p:ph idx="1"/>
             <p:extLst>
               <p:ext uri="{D42A27DB-BD31-4B8C-83A1-F6EECF244321}">
-                <p14:modId xmlns:p14="http://schemas.microsoft.com/office/powerpoint/2010/main" val="4291562516"/>
+                <p14:modId xmlns:p14="http://schemas.microsoft.com/office/powerpoint/2010/main" val="1485183216"/>
               </p:ext>
             </p:extLst>
           </p:nvPr>
@@ -9966,17 +13324,9 @@
 </p:sld>
 </file>
 
-<file path=ppt/slides/slide3.xml><?xml version="1.0" encoding="utf-8"?>
+<file path=ppt/slides/slide5.xml><?xml version="1.0" encoding="utf-8"?>
 <p:sld xmlns:a="http://schemas.openxmlformats.org/drawingml/2006/main" xmlns:r="http://schemas.openxmlformats.org/officeDocument/2006/relationships" xmlns:p="http://schemas.openxmlformats.org/presentationml/2006/main">
   <p:cSld>
-    <p:bg>
-      <p:bgPr>
-        <a:solidFill>
-          <a:schemeClr val="bg1"/>
-        </a:solidFill>
-        <a:effectLst/>
-      </p:bgPr>
-    </p:bg>
     <p:spTree>
       <p:nvGrpSpPr>
         <p:cNvPr id="1" name=""/>
@@ -10020,7 +13370,7 @@
           <a:lstStyle/>
           <a:p>
             <a:r>
-              <a:rPr lang="en-US" kern="1200">
+              <a:rPr lang="en-US" kern="1200" dirty="0">
                 <a:solidFill>
                   <a:schemeClr val="tx1"/>
                 </a:solidFill>
@@ -10035,603 +13385,216 @@
       </p:sp>
       <p:sp>
         <p:nvSpPr>
-          <p:cNvPr id="72" name="Freeform: Shape 71">
+          <p:cNvPr id="67" name="Tekstvak 7">
             <a:extLst>
               <a:ext uri="{FF2B5EF4-FFF2-40B4-BE49-F238E27FC236}">
-                <a16:creationId xmlns:a16="http://schemas.microsoft.com/office/drawing/2014/main" id="{7CB4857B-ED7C-444D-9F04-2F885114A1C2}"/>
-              </a:ext>
-              <a:ext uri="{C183D7F6-B498-43B3-948B-1728B52AA6E4}">
-                <adec:decorative xmlns:adec="http://schemas.microsoft.com/office/drawing/2017/decorative" val="1"/>
+                <a16:creationId xmlns:a16="http://schemas.microsoft.com/office/drawing/2014/main" id="{D9822CA6-1C48-4257-B29B-42E2509BF240}"/>
               </a:ext>
             </a:extLst>
           </p:cNvPr>
-          <p:cNvSpPr>
-            <a:spLocks noGrp="1" noRot="1" noChangeAspect="1" noMove="1" noResize="1" noEditPoints="1" noAdjustHandles="1" noChangeArrowheads="1" noChangeShapeType="1" noTextEdit="1"/>
-          </p:cNvSpPr>
-          <p:nvPr>
-            <p:extLst>
-              <p:ext uri="{386F3935-93C4-4BCD-93E2-E3B085C9AB24}">
-                <p16:designElem xmlns:p16="http://schemas.microsoft.com/office/powerpoint/2015/main" val="1"/>
-              </p:ext>
-            </p:extLst>
-          </p:nvPr>
+          <p:cNvSpPr txBox="1"/>
+          <p:nvPr/>
         </p:nvSpPr>
         <p:spPr>
           <a:xfrm>
-            <a:off x="1" y="0"/>
-            <a:ext cx="1764099" cy="1558212"/>
+            <a:off x="1400107" y="1767796"/>
+            <a:ext cx="4442637" cy="4041648"/>
           </a:xfrm>
-          <a:custGeom>
+          <a:prstGeom prst="rect">
             <a:avLst/>
-            <a:gdLst>
-              <a:gd name="connsiteX0" fmla="*/ 0 w 1764099"/>
-              <a:gd name="connsiteY0" fmla="*/ 0 h 1558212"/>
-              <a:gd name="connsiteX1" fmla="*/ 1764099 w 1764099"/>
-              <a:gd name="connsiteY1" fmla="*/ 0 h 1558212"/>
-              <a:gd name="connsiteX2" fmla="*/ 1042087 w 1764099"/>
-              <a:gd name="connsiteY2" fmla="*/ 1558212 h 1558212"/>
-              <a:gd name="connsiteX3" fmla="*/ 0 w 1764099"/>
-              <a:gd name="connsiteY3" fmla="*/ 1558212 h 1558212"/>
-            </a:gdLst>
-            <a:ahLst/>
-            <a:cxnLst>
-              <a:cxn ang="0">
-                <a:pos x="connsiteX0" y="connsiteY0"/>
-              </a:cxn>
-              <a:cxn ang="0">
-                <a:pos x="connsiteX1" y="connsiteY1"/>
-              </a:cxn>
-              <a:cxn ang="0">
-                <a:pos x="connsiteX2" y="connsiteY2"/>
-              </a:cxn>
-              <a:cxn ang="0">
-                <a:pos x="connsiteX3" y="connsiteY3"/>
-              </a:cxn>
-            </a:cxnLst>
-            <a:rect l="l" t="t" r="r" b="b"/>
-            <a:pathLst>
-              <a:path w="1764099" h="1558212">
-                <a:moveTo>
-                  <a:pt x="0" y="0"/>
-                </a:moveTo>
-                <a:lnTo>
-                  <a:pt x="1764099" y="0"/>
-                </a:lnTo>
-                <a:lnTo>
-                  <a:pt x="1042087" y="1558212"/>
-                </a:lnTo>
-                <a:lnTo>
-                  <a:pt x="0" y="1558212"/>
-                </a:lnTo>
-                <a:close/>
-              </a:path>
-            </a:pathLst>
-          </a:custGeom>
-          <a:solidFill>
-            <a:schemeClr val="accent1">
-              <a:lumMod val="100000"/>
-              <a:lumOff val="0"/>
-            </a:schemeClr>
-          </a:solidFill>
-          <a:ln>
-            <a:noFill/>
-          </a:ln>
+          </a:prstGeom>
         </p:spPr>
-        <p:style>
-          <a:lnRef idx="2">
-            <a:schemeClr val="accent1">
-              <a:shade val="50000"/>
-            </a:schemeClr>
-          </a:lnRef>
-          <a:fillRef idx="1">
-            <a:schemeClr val="accent1"/>
-          </a:fillRef>
-          <a:effectRef idx="0">
-            <a:schemeClr val="accent1"/>
-          </a:effectRef>
-          <a:fontRef idx="minor">
-            <a:schemeClr val="lt1"/>
-          </a:fontRef>
-        </p:style>
         <p:txBody>
-          <a:bodyPr wrap="square" rtlCol="0" anchor="ctr">
-            <a:noAutofit/>
+          <a:bodyPr vert="horz" lIns="91440" tIns="45720" rIns="91440" bIns="45720" rtlCol="0" anchor="t">
+            <a:normAutofit/>
           </a:bodyPr>
           <a:lstStyle/>
           <a:p>
-            <a:pPr algn="ctr"/>
-            <a:endParaRPr lang="en-US"/>
+            <a:pPr>
+              <a:lnSpc>
+                <a:spcPct val="90000"/>
+              </a:lnSpc>
+              <a:spcAft>
+                <a:spcPts val="600"/>
+              </a:spcAft>
+            </a:pPr>
+            <a:r>
+              <a:rPr lang="en-US" sz="2400" b="1" dirty="0"/>
+              <a:t>Complete:</a:t>
+            </a:r>
+          </a:p>
+          <a:p>
+            <a:pPr marL="285750" indent="-228600">
+              <a:lnSpc>
+                <a:spcPct val="90000"/>
+              </a:lnSpc>
+              <a:spcAft>
+                <a:spcPts val="600"/>
+              </a:spcAft>
+              <a:buFont typeface="Arial" panose="020B0604020202020204" pitchFamily="34" charset="0"/>
+              <a:buChar char="•"/>
+            </a:pPr>
+            <a:r>
+              <a:rPr lang="en-US" sz="2400" dirty="0"/>
+              <a:t>Data transfer between ESP32 and Python server</a:t>
+            </a:r>
+          </a:p>
+          <a:p>
+            <a:pPr marL="285750" indent="-228600">
+              <a:lnSpc>
+                <a:spcPct val="90000"/>
+              </a:lnSpc>
+              <a:spcAft>
+                <a:spcPts val="600"/>
+              </a:spcAft>
+              <a:buFont typeface="Arial" panose="020B0604020202020204" pitchFamily="34" charset="0"/>
+              <a:buChar char="•"/>
+            </a:pPr>
+            <a:r>
+              <a:rPr lang="en-US" sz="2400" dirty="0"/>
+              <a:t>Faster connection setup because of static IP =&gt; reduced power consumption</a:t>
+            </a:r>
+          </a:p>
+          <a:p>
+            <a:pPr indent="-228600">
+              <a:lnSpc>
+                <a:spcPct val="90000"/>
+              </a:lnSpc>
+              <a:spcAft>
+                <a:spcPts val="600"/>
+              </a:spcAft>
+              <a:buFont typeface="Arial" panose="020B0604020202020204" pitchFamily="34" charset="0"/>
+              <a:buChar char="•"/>
+            </a:pPr>
+            <a:endParaRPr lang="en-US" sz="2400" dirty="0"/>
+          </a:p>
+          <a:p>
+            <a:pPr indent="-228600">
+              <a:lnSpc>
+                <a:spcPct val="90000"/>
+              </a:lnSpc>
+              <a:spcAft>
+                <a:spcPts val="600"/>
+              </a:spcAft>
+              <a:buFont typeface="Arial" panose="020B0604020202020204" pitchFamily="34" charset="0"/>
+              <a:buChar char="•"/>
+            </a:pPr>
+            <a:endParaRPr lang="en-US" sz="2400" dirty="0"/>
+          </a:p>
+          <a:p>
+            <a:pPr indent="-228600">
+              <a:lnSpc>
+                <a:spcPct val="90000"/>
+              </a:lnSpc>
+              <a:spcAft>
+                <a:spcPts val="600"/>
+              </a:spcAft>
+              <a:buFont typeface="Arial" panose="020B0604020202020204" pitchFamily="34" charset="0"/>
+              <a:buChar char="•"/>
+            </a:pPr>
+            <a:endParaRPr lang="en-US" sz="2400" dirty="0"/>
           </a:p>
         </p:txBody>
       </p:sp>
       <p:sp>
         <p:nvSpPr>
-          <p:cNvPr id="74" name="Freeform: Shape 73">
+          <p:cNvPr id="9" name="Tekstvak 8">
             <a:extLst>
               <a:ext uri="{FF2B5EF4-FFF2-40B4-BE49-F238E27FC236}">
-                <a16:creationId xmlns:a16="http://schemas.microsoft.com/office/drawing/2014/main" id="{D18046FB-44EA-4FD8-A585-EA09A319B2D0}"/>
-              </a:ext>
-              <a:ext uri="{C183D7F6-B498-43B3-948B-1728B52AA6E4}">
-                <adec:decorative xmlns:adec="http://schemas.microsoft.com/office/drawing/2017/decorative" val="1"/>
+                <a16:creationId xmlns:a16="http://schemas.microsoft.com/office/drawing/2014/main" id="{663D399B-362E-4133-8C27-43F5AD9C5730}"/>
               </a:ext>
             </a:extLst>
           </p:cNvPr>
-          <p:cNvSpPr>
-            <a:spLocks noGrp="1" noRot="1" noChangeAspect="1" noMove="1" noResize="1" noEditPoints="1" noAdjustHandles="1" noChangeArrowheads="1" noChangeShapeType="1" noTextEdit="1"/>
-          </p:cNvSpPr>
-          <p:nvPr>
-            <p:extLst>
-              <p:ext uri="{386F3935-93C4-4BCD-93E2-E3B085C9AB24}">
-                <p16:designElem xmlns:p16="http://schemas.microsoft.com/office/powerpoint/2015/main" val="1"/>
-              </p:ext>
-            </p:extLst>
-          </p:nvPr>
+          <p:cNvSpPr txBox="1"/>
+          <p:nvPr/>
         </p:nvSpPr>
         <p:spPr>
           <a:xfrm>
-            <a:off x="1" y="1691640"/>
-            <a:ext cx="12191999" cy="5166360"/>
+            <a:off x="6271198" y="1690688"/>
+            <a:ext cx="5256212" cy="3739485"/>
           </a:xfrm>
-          <a:custGeom>
+          <a:prstGeom prst="rect">
             <a:avLst/>
-            <a:gdLst>
-              <a:gd name="connsiteX0" fmla="*/ 0 w 12191999"/>
-              <a:gd name="connsiteY0" fmla="*/ 0 h 5166360"/>
-              <a:gd name="connsiteX1" fmla="*/ 1822388 w 12191999"/>
-              <a:gd name="connsiteY1" fmla="*/ 0 h 5166360"/>
-              <a:gd name="connsiteX2" fmla="*/ 6468290 w 12191999"/>
-              <a:gd name="connsiteY2" fmla="*/ 0 h 5166360"/>
-              <a:gd name="connsiteX3" fmla="*/ 7796394 w 12191999"/>
-              <a:gd name="connsiteY3" fmla="*/ 0 h 5166360"/>
-              <a:gd name="connsiteX4" fmla="*/ 8376834 w 12191999"/>
-              <a:gd name="connsiteY4" fmla="*/ 0 h 5166360"/>
-              <a:gd name="connsiteX5" fmla="*/ 9704938 w 12191999"/>
-              <a:gd name="connsiteY5" fmla="*/ 0 h 5166360"/>
-              <a:gd name="connsiteX6" fmla="*/ 9704938 w 12191999"/>
-              <a:gd name="connsiteY6" fmla="*/ 2 h 5166360"/>
-              <a:gd name="connsiteX7" fmla="*/ 10283456 w 12191999"/>
-              <a:gd name="connsiteY7" fmla="*/ 2 h 5166360"/>
-              <a:gd name="connsiteX8" fmla="*/ 10863897 w 12191999"/>
-              <a:gd name="connsiteY8" fmla="*/ 2 h 5166360"/>
-              <a:gd name="connsiteX9" fmla="*/ 12191999 w 12191999"/>
-              <a:gd name="connsiteY9" fmla="*/ 2 h 5166360"/>
-              <a:gd name="connsiteX10" fmla="*/ 12191999 w 12191999"/>
-              <a:gd name="connsiteY10" fmla="*/ 5166360 h 5166360"/>
-              <a:gd name="connsiteX11" fmla="*/ 0 w 12191999"/>
-              <a:gd name="connsiteY11" fmla="*/ 5166360 h 5166360"/>
-              <a:gd name="connsiteX12" fmla="*/ 0 w 12191999"/>
-              <a:gd name="connsiteY12" fmla="*/ 2604436 h 5166360"/>
-              <a:gd name="connsiteX13" fmla="*/ 862341 w 12191999"/>
-              <a:gd name="connsiteY13" fmla="*/ 743371 h 5166360"/>
-              <a:gd name="connsiteX14" fmla="*/ 0 w 12191999"/>
-              <a:gd name="connsiteY14" fmla="*/ 743371 h 5166360"/>
-              <a:gd name="connsiteX15" fmla="*/ 0 w 12191999"/>
-              <a:gd name="connsiteY15" fmla="*/ 742508 h 5166360"/>
-              <a:gd name="connsiteX16" fmla="*/ 92826 w 12191999"/>
-              <a:gd name="connsiteY16" fmla="*/ 742508 h 5166360"/>
-              <a:gd name="connsiteX17" fmla="*/ 406486 w 12191999"/>
-              <a:gd name="connsiteY17" fmla="*/ 742508 h 5166360"/>
-              <a:gd name="connsiteX18" fmla="*/ 406486 w 12191999"/>
-              <a:gd name="connsiteY18" fmla="*/ 742507 h 5166360"/>
-              <a:gd name="connsiteX19" fmla="*/ 862741 w 12191999"/>
-              <a:gd name="connsiteY19" fmla="*/ 742507 h 5166360"/>
-              <a:gd name="connsiteX20" fmla="*/ 1206388 w 12191999"/>
-              <a:gd name="connsiteY20" fmla="*/ 864 h 5166360"/>
-              <a:gd name="connsiteX21" fmla="*/ 748500 w 12191999"/>
-              <a:gd name="connsiteY21" fmla="*/ 864 h 5166360"/>
-              <a:gd name="connsiteX22" fmla="*/ 0 w 12191999"/>
-              <a:gd name="connsiteY22" fmla="*/ 864 h 5166360"/>
-            </a:gdLst>
-            <a:ahLst/>
-            <a:cxnLst>
-              <a:cxn ang="0">
-                <a:pos x="connsiteX0" y="connsiteY0"/>
-              </a:cxn>
-              <a:cxn ang="0">
-                <a:pos x="connsiteX1" y="connsiteY1"/>
-              </a:cxn>
-              <a:cxn ang="0">
-                <a:pos x="connsiteX2" y="connsiteY2"/>
-              </a:cxn>
-              <a:cxn ang="0">
-                <a:pos x="connsiteX3" y="connsiteY3"/>
-              </a:cxn>
-              <a:cxn ang="0">
-                <a:pos x="connsiteX4" y="connsiteY4"/>
-              </a:cxn>
-              <a:cxn ang="0">
-                <a:pos x="connsiteX5" y="connsiteY5"/>
-              </a:cxn>
-              <a:cxn ang="0">
-                <a:pos x="connsiteX6" y="connsiteY6"/>
-              </a:cxn>
-              <a:cxn ang="0">
-                <a:pos x="connsiteX7" y="connsiteY7"/>
-              </a:cxn>
-              <a:cxn ang="0">
-                <a:pos x="connsiteX8" y="connsiteY8"/>
-              </a:cxn>
-              <a:cxn ang="0">
-                <a:pos x="connsiteX9" y="connsiteY9"/>
-              </a:cxn>
-              <a:cxn ang="0">
-                <a:pos x="connsiteX10" y="connsiteY10"/>
-              </a:cxn>
-              <a:cxn ang="0">
-                <a:pos x="connsiteX11" y="connsiteY11"/>
-              </a:cxn>
-              <a:cxn ang="0">
-                <a:pos x="connsiteX12" y="connsiteY12"/>
-              </a:cxn>
-              <a:cxn ang="0">
-                <a:pos x="connsiteX13" y="connsiteY13"/>
-              </a:cxn>
-              <a:cxn ang="0">
-                <a:pos x="connsiteX14" y="connsiteY14"/>
-              </a:cxn>
-              <a:cxn ang="0">
-                <a:pos x="connsiteX15" y="connsiteY15"/>
-              </a:cxn>
-              <a:cxn ang="0">
-                <a:pos x="connsiteX16" y="connsiteY16"/>
-              </a:cxn>
-              <a:cxn ang="0">
-                <a:pos x="connsiteX17" y="connsiteY17"/>
-              </a:cxn>
-              <a:cxn ang="0">
-                <a:pos x="connsiteX18" y="connsiteY18"/>
-              </a:cxn>
-              <a:cxn ang="0">
-                <a:pos x="connsiteX19" y="connsiteY19"/>
-              </a:cxn>
-              <a:cxn ang="0">
-                <a:pos x="connsiteX20" y="connsiteY20"/>
-              </a:cxn>
-              <a:cxn ang="0">
-                <a:pos x="connsiteX21" y="connsiteY21"/>
-              </a:cxn>
-              <a:cxn ang="0">
-                <a:pos x="connsiteX22" y="connsiteY22"/>
-              </a:cxn>
-            </a:cxnLst>
-            <a:rect l="l" t="t" r="r" b="b"/>
-            <a:pathLst>
-              <a:path w="12191999" h="5166360">
-                <a:moveTo>
-                  <a:pt x="0" y="0"/>
-                </a:moveTo>
-                <a:lnTo>
-                  <a:pt x="1822388" y="0"/>
-                </a:lnTo>
-                <a:lnTo>
-                  <a:pt x="6468290" y="0"/>
-                </a:lnTo>
-                <a:lnTo>
-                  <a:pt x="7796394" y="0"/>
-                </a:lnTo>
-                <a:lnTo>
-                  <a:pt x="8376834" y="0"/>
-                </a:lnTo>
-                <a:lnTo>
-                  <a:pt x="9704938" y="0"/>
-                </a:lnTo>
-                <a:lnTo>
-                  <a:pt x="9704938" y="2"/>
-                </a:lnTo>
-                <a:lnTo>
-                  <a:pt x="10283456" y="2"/>
-                </a:lnTo>
-                <a:lnTo>
-                  <a:pt x="10863897" y="2"/>
-                </a:lnTo>
-                <a:lnTo>
-                  <a:pt x="12191999" y="2"/>
-                </a:lnTo>
-                <a:lnTo>
-                  <a:pt x="12191999" y="5166360"/>
-                </a:lnTo>
-                <a:lnTo>
-                  <a:pt x="0" y="5166360"/>
-                </a:lnTo>
-                <a:lnTo>
-                  <a:pt x="0" y="2604436"/>
-                </a:lnTo>
-                <a:lnTo>
-                  <a:pt x="862341" y="743371"/>
-                </a:lnTo>
-                <a:lnTo>
-                  <a:pt x="0" y="743371"/>
-                </a:lnTo>
-                <a:lnTo>
-                  <a:pt x="0" y="742508"/>
-                </a:lnTo>
-                <a:lnTo>
-                  <a:pt x="92826" y="742508"/>
-                </a:lnTo>
-                <a:lnTo>
-                  <a:pt x="406486" y="742508"/>
-                </a:lnTo>
-                <a:lnTo>
-                  <a:pt x="406486" y="742507"/>
-                </a:lnTo>
-                <a:lnTo>
-                  <a:pt x="862741" y="742507"/>
-                </a:lnTo>
-                <a:lnTo>
-                  <a:pt x="1206388" y="864"/>
-                </a:lnTo>
-                <a:lnTo>
-                  <a:pt x="748500" y="864"/>
-                </a:lnTo>
-                <a:lnTo>
-                  <a:pt x="0" y="864"/>
-                </a:lnTo>
-                <a:close/>
-              </a:path>
-            </a:pathLst>
-          </a:custGeom>
-          <a:solidFill>
-            <a:srgbClr val="A6A6A6">
-              <a:alpha val="49804"/>
-            </a:srgbClr>
-          </a:solidFill>
-          <a:ln>
-            <a:noFill/>
-          </a:ln>
+          </a:prstGeom>
+          <a:noFill/>
         </p:spPr>
-        <p:style>
-          <a:lnRef idx="2">
-            <a:schemeClr val="accent1">
-              <a:shade val="50000"/>
-            </a:schemeClr>
-          </a:lnRef>
-          <a:fillRef idx="1">
-            <a:schemeClr val="accent1"/>
-          </a:fillRef>
-          <a:effectRef idx="0">
-            <a:schemeClr val="accent1"/>
-          </a:effectRef>
-          <a:fontRef idx="minor">
-            <a:schemeClr val="lt1"/>
-          </a:fontRef>
-        </p:style>
         <p:txBody>
-          <a:bodyPr wrap="square" rtlCol="0" anchor="ctr">
-            <a:noAutofit/>
+          <a:bodyPr wrap="square" rtlCol="0">
+            <a:spAutoFit/>
           </a:bodyPr>
           <a:lstStyle/>
           <a:p>
-            <a:pPr algn="ctr"/>
-            <a:endParaRPr lang="en-US"/>
-          </a:p>
-        </p:txBody>
-      </p:sp>
-      <p:sp>
-        <p:nvSpPr>
-          <p:cNvPr id="76" name="Freeform: Shape 75">
-            <a:extLst>
-              <a:ext uri="{FF2B5EF4-FFF2-40B4-BE49-F238E27FC236}">
-                <a16:creationId xmlns:a16="http://schemas.microsoft.com/office/drawing/2014/main" id="{479F5F2B-8B58-4140-AE6A-51F6C67B18D9}"/>
-              </a:ext>
-              <a:ext uri="{C183D7F6-B498-43B3-948B-1728B52AA6E4}">
-                <adec:decorative xmlns:adec="http://schemas.microsoft.com/office/drawing/2017/decorative" val="1"/>
-              </a:ext>
-            </a:extLst>
-          </p:cNvPr>
-          <p:cNvSpPr>
-            <a:spLocks noGrp="1" noRot="1" noChangeAspect="1" noMove="1" noResize="1" noEditPoints="1" noAdjustHandles="1" noChangeArrowheads="1" noChangeShapeType="1" noTextEdit="1"/>
-          </p:cNvSpPr>
-          <p:nvPr>
-            <p:extLst>
-              <p:ext uri="{386F3935-93C4-4BCD-93E2-E3B085C9AB24}">
-                <p16:designElem xmlns:p16="http://schemas.microsoft.com/office/powerpoint/2015/main" val="1"/>
-              </p:ext>
-            </p:extLst>
-          </p:nvPr>
-        </p:nvSpPr>
-        <p:spPr>
-          <a:xfrm>
-            <a:off x="0" y="1691641"/>
-            <a:ext cx="971654" cy="2096979"/>
-          </a:xfrm>
-          <a:custGeom>
-            <a:avLst/>
-            <a:gdLst>
-              <a:gd name="connsiteX0" fmla="*/ 0 w 971654"/>
-              <a:gd name="connsiteY0" fmla="*/ 0 h 2096979"/>
-              <a:gd name="connsiteX1" fmla="*/ 971654 w 971654"/>
-              <a:gd name="connsiteY1" fmla="*/ 0 h 2096979"/>
-              <a:gd name="connsiteX2" fmla="*/ 0 w 971654"/>
-              <a:gd name="connsiteY2" fmla="*/ 2096979 h 2096979"/>
-            </a:gdLst>
-            <a:ahLst/>
-            <a:cxnLst>
-              <a:cxn ang="0">
-                <a:pos x="connsiteX0" y="connsiteY0"/>
-              </a:cxn>
-              <a:cxn ang="0">
-                <a:pos x="connsiteX1" y="connsiteY1"/>
-              </a:cxn>
-              <a:cxn ang="0">
-                <a:pos x="connsiteX2" y="connsiteY2"/>
-              </a:cxn>
-            </a:cxnLst>
-            <a:rect l="l" t="t" r="r" b="b"/>
-            <a:pathLst>
-              <a:path w="971654" h="2096979">
-                <a:moveTo>
-                  <a:pt x="0" y="0"/>
-                </a:moveTo>
-                <a:lnTo>
-                  <a:pt x="971654" y="0"/>
-                </a:lnTo>
-                <a:lnTo>
-                  <a:pt x="0" y="2096979"/>
-                </a:lnTo>
-                <a:close/>
-              </a:path>
-            </a:pathLst>
-          </a:custGeom>
-          <a:solidFill>
-            <a:srgbClr val="404040"/>
-          </a:solidFill>
-          <a:ln>
-            <a:noFill/>
-          </a:ln>
-        </p:spPr>
-        <p:style>
-          <a:lnRef idx="2">
-            <a:schemeClr val="accent1">
-              <a:shade val="50000"/>
-            </a:schemeClr>
-          </a:lnRef>
-          <a:fillRef idx="1">
-            <a:schemeClr val="accent1"/>
-          </a:fillRef>
-          <a:effectRef idx="0">
-            <a:schemeClr val="accent1"/>
-          </a:effectRef>
-          <a:fontRef idx="minor">
-            <a:schemeClr val="lt1"/>
-          </a:fontRef>
-        </p:style>
-        <p:txBody>
-          <a:bodyPr wrap="square" rtlCol="0" anchor="ctr">
-            <a:noAutofit/>
-          </a:bodyPr>
-          <a:lstStyle/>
-          <a:p>
-            <a:pPr algn="ctr"/>
-            <a:endParaRPr lang="en-US"/>
-          </a:p>
-        </p:txBody>
-      </p:sp>
-      <p:sp>
-        <p:nvSpPr>
-          <p:cNvPr id="10" name="Tijdelijke aanduiding voor inhoud 3">
-            <a:extLst>
-              <a:ext uri="{FF2B5EF4-FFF2-40B4-BE49-F238E27FC236}">
-                <a16:creationId xmlns:a16="http://schemas.microsoft.com/office/drawing/2014/main" id="{8A10918D-534F-49FB-8461-C6266686CBFB}"/>
-              </a:ext>
-            </a:extLst>
-          </p:cNvPr>
-          <p:cNvSpPr>
-            <a:spLocks noGrp="1"/>
-          </p:cNvSpPr>
-          <p:nvPr>
-            <p:ph sz="half" idx="2"/>
-          </p:nvPr>
-        </p:nvSpPr>
-        <p:spPr>
-          <a:xfrm>
-            <a:off x="1179177" y="1865381"/>
-            <a:ext cx="5157787" cy="3684588"/>
-          </a:xfrm>
-        </p:spPr>
-        <p:txBody>
-          <a:bodyPr>
-            <a:normAutofit/>
-          </a:bodyPr>
-          <a:lstStyle/>
-          <a:p>
-            <a:pPr marL="0" indent="0">
-              <a:buNone/>
+            <a:pPr>
+              <a:spcAft>
+                <a:spcPts val="600"/>
+              </a:spcAft>
             </a:pPr>
             <a:r>
               <a:rPr lang="en-GB" sz="2400" b="1" dirty="0"/>
-              <a:t>Complete</a:t>
+              <a:t>To do:</a:t>
             </a:r>
-            <a:r>
-              <a:rPr lang="de-LI" sz="2400" b="1" dirty="0"/>
-              <a:t>:</a:t>
-            </a:r>
-            <a:endParaRPr lang="en-GB" sz="2400" b="1" dirty="0"/>
-          </a:p>
-          <a:p>
+          </a:p>
+          <a:p>
+            <a:pPr marL="285750" indent="-285750">
+              <a:buFont typeface="Arial" panose="020B0604020202020204" pitchFamily="34" charset="0"/>
+              <a:buChar char="•"/>
+            </a:pPr>
             <a:r>
               <a:rPr lang="en-GB" sz="2400" dirty="0"/>
-              <a:t>Entering and wakeup from deep sleep</a:t>
+              <a:t>Process received data in Python </a:t>
             </a:r>
           </a:p>
           <a:p>
+            <a:pPr marL="285750" indent="-285750">
+              <a:buFont typeface="Arial" panose="020B0604020202020204" pitchFamily="34" charset="0"/>
+              <a:buChar char="•"/>
+            </a:pPr>
             <a:r>
               <a:rPr lang="en-GB" sz="2400" dirty="0"/>
-              <a:t>Save variables in RTC memory so that they are retained after deep sleep</a:t>
+              <a:t>Measure power consumption </a:t>
             </a:r>
           </a:p>
           <a:p>
+            <a:pPr marL="285750" indent="-285750">
+              <a:buFont typeface="Arial" panose="020B0604020202020204" pitchFamily="34" charset="0"/>
+              <a:buChar char="•"/>
+            </a:pPr>
             <a:r>
               <a:rPr lang="en-GB" sz="2400" dirty="0"/>
-              <a:t>NTP synchronisation for time information =&gt; disable sensors at night</a:t>
+              <a:t>Test connection with actual sensor data instead of dummy data</a:t>
             </a:r>
           </a:p>
           <a:p>
-            <a:endParaRPr lang="en-GB" dirty="0"/>
-          </a:p>
-        </p:txBody>
-      </p:sp>
-      <p:sp>
-        <p:nvSpPr>
-          <p:cNvPr id="11" name="Tijdelijke aanduiding voor inhoud 5">
-            <a:extLst>
-              <a:ext uri="{FF2B5EF4-FFF2-40B4-BE49-F238E27FC236}">
-                <a16:creationId xmlns:a16="http://schemas.microsoft.com/office/drawing/2014/main" id="{1E0EDFB4-1772-4354-9C7E-9D2B19ED6E02}"/>
-              </a:ext>
-            </a:extLst>
-          </p:cNvPr>
-          <p:cNvSpPr>
-            <a:spLocks noGrp="1"/>
-          </p:cNvSpPr>
-          <p:nvPr>
-            <p:ph sz="quarter" idx="4"/>
-          </p:nvPr>
-        </p:nvSpPr>
-        <p:spPr>
-          <a:xfrm>
-            <a:off x="6799031" y="1866969"/>
-            <a:ext cx="5183188" cy="3684588"/>
-          </a:xfrm>
-        </p:spPr>
-        <p:txBody>
-          <a:bodyPr>
-            <a:normAutofit/>
-          </a:bodyPr>
-          <a:lstStyle/>
-          <a:p>
-            <a:pPr marL="0" indent="0">
-              <a:buNone/>
+            <a:pPr marL="285750" indent="-285750">
+              <a:buFont typeface="Arial" panose="020B0604020202020204" pitchFamily="34" charset="0"/>
+              <a:buChar char="•"/>
             </a:pPr>
             <a:r>
-              <a:rPr lang="de-LI" sz="2400" b="1" dirty="0" err="1"/>
-              <a:t>To</a:t>
+              <a:rPr lang="en-GB" sz="2400" dirty="0"/>
+              <a:t>Test Python server on Raspberry Pi instead of laptop</a:t>
             </a:r>
-            <a:r>
-              <a:rPr lang="de-LI" sz="2400" b="1" dirty="0"/>
-              <a:t> do:</a:t>
-            </a:r>
-            <a:endParaRPr lang="en-GB" sz="2400" b="1" dirty="0"/>
-          </a:p>
-          <a:p>
-            <a:r>
-              <a:rPr lang="en-GB" sz="2400" dirty="0"/>
-              <a:t>Put the individual pieces of software in one general structure</a:t>
-            </a:r>
-          </a:p>
-          <a:p>
-            <a:r>
-              <a:rPr lang="en-GB" sz="2400" dirty="0"/>
-              <a:t>Test the system</a:t>
-            </a:r>
-          </a:p>
-          <a:p>
-            <a:r>
-              <a:rPr lang="en-GB" sz="2400" dirty="0"/>
-              <a:t>Power measurements</a:t>
-            </a:r>
-          </a:p>
-          <a:p>
-            <a:pPr marL="0" indent="0">
-              <a:buNone/>
+          </a:p>
+          <a:p>
+            <a:pPr>
+              <a:spcAft>
+                <a:spcPts val="600"/>
+              </a:spcAft>
+            </a:pPr>
+            <a:endParaRPr lang="en-GB" dirty="0"/>
+          </a:p>
+          <a:p>
+            <a:pPr>
+              <a:spcAft>
+                <a:spcPts val="600"/>
+              </a:spcAft>
+            </a:pPr>
+            <a:endParaRPr lang="en-GB" dirty="0"/>
+          </a:p>
+          <a:p>
+            <a:pPr>
+              <a:spcAft>
+                <a:spcPts val="600"/>
+              </a:spcAft>
             </a:pPr>
             <a:endParaRPr lang="nl-BE" dirty="0"/>
           </a:p>
@@ -10640,7 +13603,7 @@
     </p:spTree>
     <p:extLst>
       <p:ext uri="{BB962C8B-B14F-4D97-AF65-F5344CB8AC3E}">
-        <p14:creationId xmlns:p14="http://schemas.microsoft.com/office/powerpoint/2010/main" val="4220297519"/>
+        <p14:creationId xmlns:p14="http://schemas.microsoft.com/office/powerpoint/2010/main" val="2882297820"/>
       </p:ext>
     </p:extLst>
   </p:cSld>
@@ -10650,17 +13613,9 @@
 </p:sld>
 </file>
 
-<file path=ppt/slides/slide4.xml><?xml version="1.0" encoding="utf-8"?>
+<file path=ppt/slides/slide6.xml><?xml version="1.0" encoding="utf-8"?>
 <p:sld xmlns:a="http://schemas.openxmlformats.org/drawingml/2006/main" xmlns:r="http://schemas.openxmlformats.org/officeDocument/2006/relationships" xmlns:p="http://schemas.openxmlformats.org/presentationml/2006/main">
   <p:cSld>
-    <p:bg>
-      <p:bgPr>
-        <a:solidFill>
-          <a:schemeClr val="bg1"/>
-        </a:solidFill>
-        <a:effectLst/>
-      </p:bgPr>
-    </p:bg>
     <p:spTree>
       <p:nvGrpSpPr>
         <p:cNvPr id="1" name=""/>
@@ -10728,11 +13683,304 @@
           </p:cNvGraphicFramePr>
           <p:nvPr>
             <p:ph idx="1"/>
-            <p:extLst>
-              <p:ext uri="{D42A27DB-BD31-4B8C-83A1-F6EECF244321}">
-                <p14:modId xmlns:p14="http://schemas.microsoft.com/office/powerpoint/2010/main" val="1943459482"/>
-              </p:ext>
-            </p:extLst>
+          </p:nvPr>
+        </p:nvGraphicFramePr>
+        <p:xfrm>
+          <a:off x="838200" y="1825625"/>
+          <a:ext cx="10515600" cy="4351338"/>
+        </p:xfrm>
+        <a:graphic>
+          <a:graphicData uri="http://schemas.openxmlformats.org/drawingml/2006/diagram">
+            <dgm:relIds xmlns:dgm="http://schemas.openxmlformats.org/drawingml/2006/diagram" xmlns:r="http://schemas.openxmlformats.org/officeDocument/2006/relationships" r:dm="rId2" r:lo="rId3" r:qs="rId4" r:cs="rId5"/>
+          </a:graphicData>
+        </a:graphic>
+      </p:graphicFrame>
+    </p:spTree>
+    <p:extLst>
+      <p:ext uri="{BB962C8B-B14F-4D97-AF65-F5344CB8AC3E}">
+        <p14:creationId xmlns:p14="http://schemas.microsoft.com/office/powerpoint/2010/main" val="1073221465"/>
+      </p:ext>
+    </p:extLst>
+  </p:cSld>
+  <p:clrMapOvr>
+    <a:masterClrMapping/>
+  </p:clrMapOvr>
+</p:sld>
+</file>
+
+<file path=ppt/slides/slide7.xml><?xml version="1.0" encoding="utf-8"?>
+<p:sld xmlns:a="http://schemas.openxmlformats.org/drawingml/2006/main" xmlns:r="http://schemas.openxmlformats.org/officeDocument/2006/relationships" xmlns:p="http://schemas.openxmlformats.org/presentationml/2006/main">
+  <p:cSld>
+    <p:spTree>
+      <p:nvGrpSpPr>
+        <p:cNvPr id="1" name=""/>
+        <p:cNvGrpSpPr/>
+        <p:nvPr/>
+      </p:nvGrpSpPr>
+      <p:grpSpPr>
+        <a:xfrm>
+          <a:off x="0" y="0"/>
+          <a:ext cx="0" cy="0"/>
+          <a:chOff x="0" y="0"/>
+          <a:chExt cx="0" cy="0"/>
+        </a:xfrm>
+      </p:grpSpPr>
+      <p:sp>
+        <p:nvSpPr>
+          <p:cNvPr id="2" name="Titel 1">
+            <a:extLst>
+              <a:ext uri="{FF2B5EF4-FFF2-40B4-BE49-F238E27FC236}">
+                <a16:creationId xmlns:a16="http://schemas.microsoft.com/office/drawing/2014/main" id="{BE4E15A8-AD1C-48B9-985F-80AD4B73E817}"/>
+              </a:ext>
+            </a:extLst>
+          </p:cNvPr>
+          <p:cNvSpPr>
+            <a:spLocks noGrp="1"/>
+          </p:cNvSpPr>
+          <p:nvPr>
+            <p:ph type="title"/>
+          </p:nvPr>
+        </p:nvSpPr>
+        <p:spPr>
+          <a:xfrm>
+            <a:off x="1653363" y="365760"/>
+            <a:ext cx="9367203" cy="1188720"/>
+          </a:xfrm>
+        </p:spPr>
+        <p:txBody>
+          <a:bodyPr vert="horz" lIns="91440" tIns="45720" rIns="91440" bIns="45720" rtlCol="0" anchor="ctr">
+            <a:normAutofit/>
+          </a:bodyPr>
+          <a:lstStyle/>
+          <a:p>
+            <a:r>
+              <a:rPr lang="en-US" kern="1200">
+                <a:solidFill>
+                  <a:schemeClr val="tx1"/>
+                </a:solidFill>
+                <a:latin typeface="+mj-lt"/>
+                <a:ea typeface="+mj-ea"/>
+                <a:cs typeface="+mj-cs"/>
+              </a:rPr>
+              <a:t>Wi-Fi communication </a:t>
+            </a:r>
+          </a:p>
+        </p:txBody>
+      </p:sp>
+      <p:sp>
+        <p:nvSpPr>
+          <p:cNvPr id="10" name="Tijdelijke aanduiding voor inhoud 3">
+            <a:extLst>
+              <a:ext uri="{FF2B5EF4-FFF2-40B4-BE49-F238E27FC236}">
+                <a16:creationId xmlns:a16="http://schemas.microsoft.com/office/drawing/2014/main" id="{8A10918D-534F-49FB-8461-C6266686CBFB}"/>
+              </a:ext>
+            </a:extLst>
+          </p:cNvPr>
+          <p:cNvSpPr>
+            <a:spLocks noGrp="1"/>
+          </p:cNvSpPr>
+          <p:nvPr>
+            <p:ph sz="half" idx="2"/>
+          </p:nvPr>
+        </p:nvSpPr>
+        <p:spPr>
+          <a:xfrm>
+            <a:off x="1179177" y="1865381"/>
+            <a:ext cx="5157787" cy="3684588"/>
+          </a:xfrm>
+        </p:spPr>
+        <p:txBody>
+          <a:bodyPr>
+            <a:normAutofit/>
+          </a:bodyPr>
+          <a:lstStyle/>
+          <a:p>
+            <a:pPr marL="0" indent="0">
+              <a:buNone/>
+            </a:pPr>
+            <a:r>
+              <a:rPr lang="en-GB" sz="2400" b="1" dirty="0"/>
+              <a:t>Complete</a:t>
+            </a:r>
+            <a:r>
+              <a:rPr lang="de-LI" sz="2400" b="1" dirty="0"/>
+              <a:t>:</a:t>
+            </a:r>
+            <a:endParaRPr lang="en-GB" sz="2400" b="1" dirty="0"/>
+          </a:p>
+          <a:p>
+            <a:r>
+              <a:rPr lang="en-GB" sz="2400" dirty="0"/>
+              <a:t>Entering and wakeup from deep sleep</a:t>
+            </a:r>
+          </a:p>
+          <a:p>
+            <a:r>
+              <a:rPr lang="en-GB" sz="2400" dirty="0"/>
+              <a:t>Save variables in RTC memory so that they are retained after deep sleep</a:t>
+            </a:r>
+          </a:p>
+          <a:p>
+            <a:r>
+              <a:rPr lang="en-GB" sz="2400" dirty="0"/>
+              <a:t>NTP synchronisation for time information =&gt; disable sensors at night</a:t>
+            </a:r>
+          </a:p>
+          <a:p>
+            <a:endParaRPr lang="en-GB" dirty="0"/>
+          </a:p>
+        </p:txBody>
+      </p:sp>
+      <p:sp>
+        <p:nvSpPr>
+          <p:cNvPr id="11" name="Tijdelijke aanduiding voor inhoud 5">
+            <a:extLst>
+              <a:ext uri="{FF2B5EF4-FFF2-40B4-BE49-F238E27FC236}">
+                <a16:creationId xmlns:a16="http://schemas.microsoft.com/office/drawing/2014/main" id="{1E0EDFB4-1772-4354-9C7E-9D2B19ED6E02}"/>
+              </a:ext>
+            </a:extLst>
+          </p:cNvPr>
+          <p:cNvSpPr>
+            <a:spLocks noGrp="1"/>
+          </p:cNvSpPr>
+          <p:nvPr>
+            <p:ph sz="quarter" idx="4"/>
+          </p:nvPr>
+        </p:nvSpPr>
+        <p:spPr>
+          <a:xfrm>
+            <a:off x="6799031" y="1866969"/>
+            <a:ext cx="5183188" cy="3684588"/>
+          </a:xfrm>
+        </p:spPr>
+        <p:txBody>
+          <a:bodyPr>
+            <a:normAutofit/>
+          </a:bodyPr>
+          <a:lstStyle/>
+          <a:p>
+            <a:pPr marL="0" indent="0">
+              <a:buNone/>
+            </a:pPr>
+            <a:r>
+              <a:rPr lang="de-LI" sz="2400" b="1" dirty="0" err="1"/>
+              <a:t>To</a:t>
+            </a:r>
+            <a:r>
+              <a:rPr lang="de-LI" sz="2400" b="1" dirty="0"/>
+              <a:t> do:</a:t>
+            </a:r>
+            <a:endParaRPr lang="en-GB" sz="2400" b="1" dirty="0"/>
+          </a:p>
+          <a:p>
+            <a:r>
+              <a:rPr lang="en-GB" sz="2400" dirty="0"/>
+              <a:t>Put the individual pieces of software in one general structure</a:t>
+            </a:r>
+          </a:p>
+          <a:p>
+            <a:r>
+              <a:rPr lang="en-GB" sz="2400" dirty="0"/>
+              <a:t>Test the system</a:t>
+            </a:r>
+          </a:p>
+          <a:p>
+            <a:r>
+              <a:rPr lang="en-GB" sz="2400" dirty="0"/>
+              <a:t>Power measurements</a:t>
+            </a:r>
+          </a:p>
+          <a:p>
+            <a:pPr marL="0" indent="0">
+              <a:buNone/>
+            </a:pPr>
+            <a:endParaRPr lang="nl-BE" dirty="0"/>
+          </a:p>
+        </p:txBody>
+      </p:sp>
+    </p:spTree>
+    <p:extLst>
+      <p:ext uri="{BB962C8B-B14F-4D97-AF65-F5344CB8AC3E}">
+        <p14:creationId xmlns:p14="http://schemas.microsoft.com/office/powerpoint/2010/main" val="4220297519"/>
+      </p:ext>
+    </p:extLst>
+  </p:cSld>
+  <p:clrMapOvr>
+    <a:masterClrMapping/>
+  </p:clrMapOvr>
+</p:sld>
+</file>
+
+<file path=ppt/slides/slide8.xml><?xml version="1.0" encoding="utf-8"?>
+<p:sld xmlns:a="http://schemas.openxmlformats.org/drawingml/2006/main" xmlns:r="http://schemas.openxmlformats.org/officeDocument/2006/relationships" xmlns:p="http://schemas.openxmlformats.org/presentationml/2006/main">
+  <p:cSld>
+    <p:spTree>
+      <p:nvGrpSpPr>
+        <p:cNvPr id="1" name=""/>
+        <p:cNvGrpSpPr/>
+        <p:nvPr/>
+      </p:nvGrpSpPr>
+      <p:grpSpPr>
+        <a:xfrm>
+          <a:off x="0" y="0"/>
+          <a:ext cx="0" cy="0"/>
+          <a:chOff x="0" y="0"/>
+          <a:chExt cx="0" cy="0"/>
+        </a:xfrm>
+      </p:grpSpPr>
+      <p:sp>
+        <p:nvSpPr>
+          <p:cNvPr id="2" name="Titel 1">
+            <a:extLst>
+              <a:ext uri="{FF2B5EF4-FFF2-40B4-BE49-F238E27FC236}">
+                <a16:creationId xmlns:a16="http://schemas.microsoft.com/office/drawing/2014/main" id="{19405F17-7E85-4553-BE84-D13F323A7DDD}"/>
+              </a:ext>
+            </a:extLst>
+          </p:cNvPr>
+          <p:cNvSpPr>
+            <a:spLocks noGrp="1"/>
+          </p:cNvSpPr>
+          <p:nvPr>
+            <p:ph type="title"/>
+          </p:nvPr>
+        </p:nvSpPr>
+        <p:spPr>
+          <a:xfrm>
+            <a:off x="838200" y="365125"/>
+            <a:ext cx="10515600" cy="1325563"/>
+          </a:xfrm>
+        </p:spPr>
+        <p:txBody>
+          <a:bodyPr>
+            <a:normAutofit/>
+          </a:bodyPr>
+          <a:lstStyle/>
+          <a:p>
+            <a:r>
+              <a:rPr lang="de-LI"/>
+              <a:t>Problems/</a:t>
+            </a:r>
+            <a:r>
+              <a:rPr lang="en-GB"/>
+              <a:t>limitations</a:t>
+            </a:r>
+          </a:p>
+        </p:txBody>
+      </p:sp>
+      <p:graphicFrame>
+        <p:nvGraphicFramePr>
+          <p:cNvPr id="5" name="Tijdelijke aanduiding voor inhoud 2">
+            <a:extLst>
+              <a:ext uri="{FF2B5EF4-FFF2-40B4-BE49-F238E27FC236}">
+                <a16:creationId xmlns:a16="http://schemas.microsoft.com/office/drawing/2014/main" id="{FD101E48-73D7-4A04-A109-3B8E70BABC7C}"/>
+              </a:ext>
+            </a:extLst>
+          </p:cNvPr>
+          <p:cNvGraphicFramePr>
+            <a:graphicFrameLocks noGrp="1"/>
+          </p:cNvGraphicFramePr>
+          <p:nvPr>
+            <p:ph idx="1"/>
           </p:nvPr>
         </p:nvGraphicFramePr>
         <p:xfrm>

</xml_diff>

<commit_message>
changed order and added my part
added main pcb, dashboard
</commit_message>
<xml_diff>
--- a/presentatie/tussentijdsepresentatie.pptx
+++ b/presentatie/tussentijdsepresentatie.pptx
@@ -10,13 +10,15 @@
     <p:sldId id="269" r:id="rId4"/>
     <p:sldId id="275" r:id="rId5"/>
     <p:sldId id="273" r:id="rId6"/>
-    <p:sldId id="277" r:id="rId7"/>
-    <p:sldId id="278" r:id="rId8"/>
-    <p:sldId id="272" r:id="rId9"/>
-    <p:sldId id="279" r:id="rId10"/>
-    <p:sldId id="280" r:id="rId11"/>
-    <p:sldId id="281" r:id="rId12"/>
-    <p:sldId id="282" r:id="rId13"/>
+    <p:sldId id="286" r:id="rId7"/>
+    <p:sldId id="279" r:id="rId8"/>
+    <p:sldId id="280" r:id="rId9"/>
+    <p:sldId id="281" r:id="rId10"/>
+    <p:sldId id="282" r:id="rId11"/>
+    <p:sldId id="278" r:id="rId12"/>
+    <p:sldId id="272" r:id="rId13"/>
+    <p:sldId id="277" r:id="rId14"/>
+    <p:sldId id="287" r:id="rId15"/>
   </p:sldIdLst>
   <p:sldSz cx="12192000" cy="6858000"/>
   <p:notesSz cx="6858000" cy="9144000"/>
@@ -625,7 +627,7 @@
           <a:p>
             <a:fld id="{0635C875-30D1-4A16-B5FC-39A3B940C621}" type="datetimeFigureOut">
               <a:rPr lang="nl-BE" smtClean="0"/>
-              <a:t>15/04/2020</a:t>
+              <a:t>16/04/2020</a:t>
             </a:fld>
             <a:endParaRPr lang="nl-BE"/>
           </a:p>
@@ -1067,7 +1069,7 @@
           <a:p>
             <a:fld id="{EA3A7081-D270-4FBF-AE40-A52D674243CC}" type="datetime1">
               <a:rPr lang="nl-BE" smtClean="0"/>
-              <a:t>15/04/2020</a:t>
+              <a:t>16/04/2020</a:t>
             </a:fld>
             <a:endParaRPr lang="nl-NL"/>
           </a:p>
@@ -1350,7 +1352,7 @@
           <a:p>
             <a:fld id="{5C69415A-EEF6-439C-A913-189A8C067023}" type="datetime1">
               <a:rPr lang="nl-BE" smtClean="0"/>
-              <a:t>15/04/2020</a:t>
+              <a:t>16/04/2020</a:t>
             </a:fld>
             <a:endParaRPr lang="nl-NL"/>
           </a:p>
@@ -1680,7 +1682,7 @@
           <a:p>
             <a:fld id="{0635C875-30D1-4A16-B5FC-39A3B940C621}" type="datetimeFigureOut">
               <a:rPr lang="nl-BE" smtClean="0"/>
-              <a:t>15/04/2020</a:t>
+              <a:t>16/04/2020</a:t>
             </a:fld>
             <a:endParaRPr lang="nl-BE"/>
           </a:p>
@@ -2041,7 +2043,7 @@
           <a:p>
             <a:fld id="{0635C875-30D1-4A16-B5FC-39A3B940C621}" type="datetimeFigureOut">
               <a:rPr lang="nl-BE" smtClean="0"/>
-              <a:t>15/04/2020</a:t>
+              <a:t>16/04/2020</a:t>
             </a:fld>
             <a:endParaRPr lang="nl-BE"/>
           </a:p>
@@ -2210,7 +2212,7 @@
           <a:p>
             <a:fld id="{0635C875-30D1-4A16-B5FC-39A3B940C621}" type="datetimeFigureOut">
               <a:rPr lang="nl-BE" smtClean="0"/>
-              <a:t>15/04/2020</a:t>
+              <a:t>16/04/2020</a:t>
             </a:fld>
             <a:endParaRPr lang="nl-BE"/>
           </a:p>
@@ -2526,7 +2528,7 @@
           <a:p>
             <a:fld id="{0635C875-30D1-4A16-B5FC-39A3B940C621}" type="datetimeFigureOut">
               <a:rPr lang="nl-BE" smtClean="0"/>
-              <a:t>15/04/2020</a:t>
+              <a:t>16/04/2020</a:t>
             </a:fld>
             <a:endParaRPr lang="nl-BE"/>
           </a:p>
@@ -2842,7 +2844,7 @@
           <a:p>
             <a:fld id="{0635C875-30D1-4A16-B5FC-39A3B940C621}" type="datetimeFigureOut">
               <a:rPr lang="nl-BE" smtClean="0"/>
-              <a:t>15/04/2020</a:t>
+              <a:t>16/04/2020</a:t>
             </a:fld>
             <a:endParaRPr lang="nl-BE"/>
           </a:p>
@@ -2985,7 +2987,7 @@
           <a:p>
             <a:fld id="{0635C875-30D1-4A16-B5FC-39A3B940C621}" type="datetimeFigureOut">
               <a:rPr lang="nl-BE" smtClean="0"/>
-              <a:t>15/04/2020</a:t>
+              <a:t>16/04/2020</a:t>
             </a:fld>
             <a:endParaRPr lang="nl-BE"/>
           </a:p>
@@ -3465,7 +3467,7 @@
           <a:p>
             <a:fld id="{0635C875-30D1-4A16-B5FC-39A3B940C621}" type="datetimeFigureOut">
               <a:rPr lang="nl-BE" smtClean="0"/>
-              <a:t>15/04/2020</a:t>
+              <a:t>16/04/2020</a:t>
             </a:fld>
             <a:endParaRPr lang="nl-BE"/>
           </a:p>
@@ -3583,7 +3585,7 @@
           <a:p>
             <a:fld id="{0635C875-30D1-4A16-B5FC-39A3B940C621}" type="datetimeFigureOut">
               <a:rPr lang="nl-BE" smtClean="0"/>
-              <a:t>15/04/2020</a:t>
+              <a:t>16/04/2020</a:t>
             </a:fld>
             <a:endParaRPr lang="nl-BE"/>
           </a:p>
@@ -3700,7 +3702,7 @@
           <a:p>
             <a:fld id="{0635C875-30D1-4A16-B5FC-39A3B940C621}" type="datetimeFigureOut">
               <a:rPr lang="nl-BE" smtClean="0"/>
-              <a:t>15/04/2020</a:t>
+              <a:t>16/04/2020</a:t>
             </a:fld>
             <a:endParaRPr lang="nl-BE"/>
           </a:p>
@@ -3879,7 +3881,7 @@
           <a:p>
             <a:fld id="{0635C875-30D1-4A16-B5FC-39A3B940C621}" type="datetimeFigureOut">
               <a:rPr lang="nl-BE" smtClean="0"/>
-              <a:t>15/04/2020</a:t>
+              <a:t>16/04/2020</a:t>
             </a:fld>
             <a:endParaRPr lang="nl-BE"/>
           </a:p>
@@ -4165,7 +4167,7 @@
           <a:p>
             <a:fld id="{0635C875-30D1-4A16-B5FC-39A3B940C621}" type="datetimeFigureOut">
               <a:rPr lang="nl-BE" smtClean="0"/>
-              <a:t>15/04/2020</a:t>
+              <a:t>16/04/2020</a:t>
             </a:fld>
             <a:endParaRPr lang="nl-BE"/>
           </a:p>
@@ -4801,7 +4803,7 @@
           <a:p>
             <a:fld id="{48C250A7-EEA6-4BD5-AB95-D7BF57F3506B}" type="datetime1">
               <a:rPr lang="nl-BE" smtClean="0"/>
-              <a:t>15/04/2020</a:t>
+              <a:t>16/04/2020</a:t>
             </a:fld>
             <a:endParaRPr lang="nl-NL" dirty="0"/>
           </a:p>
@@ -5378,26 +5380,24 @@
         </p:nvSpPr>
         <p:spPr/>
         <p:txBody>
-          <a:bodyPr>
-            <a:normAutofit/>
-          </a:bodyPr>
+          <a:bodyPr/>
           <a:lstStyle/>
           <a:p>
             <a:r>
               <a:rPr lang="en-GB" dirty="0"/>
-              <a:t>Discussing a basic idea of the housing</a:t>
+              <a:t>Entering and wakeup from deep sleep</a:t>
             </a:r>
           </a:p>
           <a:p>
             <a:r>
               <a:rPr lang="en-GB" dirty="0"/>
-              <a:t>Getting the measurements of all available part</a:t>
+              <a:t>Save variables in RTC memory so that they are retained after deep sleep</a:t>
             </a:r>
           </a:p>
           <a:p>
             <a:r>
               <a:rPr lang="en-GB" dirty="0"/>
-              <a:t>A tutorial on 3D-printing design with fusion360</a:t>
+              <a:t>NTP synchronisation for time information =&gt; disable sensors at night</a:t>
             </a:r>
           </a:p>
         </p:txBody>
@@ -5458,7 +5458,19 @@
           <a:p>
             <a:r>
               <a:rPr lang="en-GB" dirty="0"/>
-              <a:t>Design of the housing taken all the individual elements into account</a:t>
+              <a:t>Put the individual pieces of software in one general structure</a:t>
+            </a:r>
+          </a:p>
+          <a:p>
+            <a:r>
+              <a:rPr lang="en-GB" dirty="0"/>
+              <a:t>Test the system</a:t>
+            </a:r>
+          </a:p>
+          <a:p>
+            <a:r>
+              <a:rPr lang="en-GB" dirty="0"/>
+              <a:t>Power measurements</a:t>
             </a:r>
           </a:p>
         </p:txBody>
@@ -5540,7 +5552,7 @@
           <a:p>
             <a:r>
               <a:rPr lang="en-GB" dirty="0"/>
-              <a:t>Housing design</a:t>
+              <a:t>Software design</a:t>
             </a:r>
             <a:endParaRPr lang="nl-BE" dirty="0"/>
           </a:p>
@@ -5549,7 +5561,7 @@
     </p:spTree>
     <p:extLst>
       <p:ext uri="{BB962C8B-B14F-4D97-AF65-F5344CB8AC3E}">
-        <p14:creationId xmlns:p14="http://schemas.microsoft.com/office/powerpoint/2010/main" val="835492808"/>
+        <p14:creationId xmlns:p14="http://schemas.microsoft.com/office/powerpoint/2010/main" val="3823129093"/>
       </p:ext>
     </p:extLst>
   </p:cSld>
@@ -5599,39 +5611,24 @@
           <a:p>
             <a:r>
               <a:rPr lang="en-GB" dirty="0"/>
-              <a:t>Available 3D-printer</a:t>
-            </a:r>
-          </a:p>
-          <a:p>
-            <a:pPr lvl="1"/>
+              <a:t>No ability to fully disable sensors with load switch until the final PCB is ready</a:t>
+            </a:r>
+            <a:endParaRPr lang="en-US" dirty="0"/>
+          </a:p>
+          <a:p>
             <a:r>
               <a:rPr lang="en-GB" dirty="0"/>
-              <a:t>Do not own one</a:t>
-            </a:r>
-          </a:p>
-          <a:p>
-            <a:pPr lvl="1"/>
+              <a:t>No ability to measure power consumption</a:t>
+            </a:r>
+          </a:p>
+          <a:p>
             <a:r>
               <a:rPr lang="en-GB" dirty="0"/>
-              <a:t>3D-printer at work, could be a possibility</a:t>
-            </a:r>
-            <a:br>
-              <a:rPr lang="en-GB" dirty="0"/>
-            </a:br>
-            <a:r>
-              <a:rPr lang="en-GB" dirty="0"/>
-              <a:t>Need to check wit work</a:t>
-            </a:r>
-          </a:p>
-          <a:p>
-            <a:pPr lvl="1"/>
-            <a:endParaRPr lang="en-GB" dirty="0"/>
-          </a:p>
-          <a:p>
-            <a:r>
-              <a:rPr lang="en-GB" dirty="0"/>
-              <a:t>Checking the fitting of the design in the housing</a:t>
-            </a:r>
+              <a:t>Difficult to test full system because sensors, Raspberry Pi and ESP32-SOLO are not all available to one person  </a:t>
+            </a:r>
+            <a:endParaRPr lang="en-US" dirty="0"/>
+          </a:p>
+          <a:p>
             <a:endParaRPr lang="nl-BE" dirty="0"/>
           </a:p>
         </p:txBody>
@@ -5676,7 +5673,674 @@
     </p:spTree>
     <p:extLst>
       <p:ext uri="{BB962C8B-B14F-4D97-AF65-F5344CB8AC3E}">
-        <p14:creationId xmlns:p14="http://schemas.microsoft.com/office/powerpoint/2010/main" val="2953540510"/>
+        <p14:creationId xmlns:p14="http://schemas.microsoft.com/office/powerpoint/2010/main" val="647632950"/>
+      </p:ext>
+    </p:extLst>
+  </p:cSld>
+  <p:clrMapOvr>
+    <a:masterClrMapping/>
+  </p:clrMapOvr>
+</p:sld>
+</file>
+
+<file path=ppt/slides/slide12.xml><?xml version="1.0" encoding="utf-8"?>
+<p:sld xmlns:a="http://schemas.openxmlformats.org/drawingml/2006/main" xmlns:r="http://schemas.openxmlformats.org/officeDocument/2006/relationships" xmlns:p="http://schemas.openxmlformats.org/presentationml/2006/main">
+  <p:cSld>
+    <p:spTree>
+      <p:nvGrpSpPr>
+        <p:cNvPr id="1" name=""/>
+        <p:cNvGrpSpPr/>
+        <p:nvPr/>
+      </p:nvGrpSpPr>
+      <p:grpSpPr>
+        <a:xfrm>
+          <a:off x="0" y="0"/>
+          <a:ext cx="0" cy="0"/>
+          <a:chOff x="0" y="0"/>
+          <a:chExt cx="0" cy="0"/>
+        </a:xfrm>
+      </p:grpSpPr>
+      <p:sp>
+        <p:nvSpPr>
+          <p:cNvPr id="2" name="Tijdelijke aanduiding voor tekst 1">
+            <a:extLst>
+              <a:ext uri="{FF2B5EF4-FFF2-40B4-BE49-F238E27FC236}">
+                <a16:creationId xmlns:a16="http://schemas.microsoft.com/office/drawing/2014/main" id="{F57FCC80-CD9B-4804-9745-D82EF86C6F6A}"/>
+              </a:ext>
+            </a:extLst>
+          </p:cNvPr>
+          <p:cNvSpPr>
+            <a:spLocks noGrp="1"/>
+          </p:cNvSpPr>
+          <p:nvPr>
+            <p:ph type="body" idx="1"/>
+          </p:nvPr>
+        </p:nvSpPr>
+        <p:spPr/>
+        <p:txBody>
+          <a:bodyPr/>
+          <a:lstStyle/>
+          <a:p>
+            <a:r>
+              <a:rPr lang="nl-NL" dirty="0" err="1"/>
+              <a:t>Completed</a:t>
+            </a:r>
+            <a:r>
+              <a:rPr lang="nl-NL" dirty="0"/>
+              <a:t>:</a:t>
+            </a:r>
+            <a:endParaRPr lang="nl-BE" dirty="0"/>
+          </a:p>
+        </p:txBody>
+      </p:sp>
+      <p:sp>
+        <p:nvSpPr>
+          <p:cNvPr id="3" name="Tijdelijke aanduiding voor inhoud 2">
+            <a:extLst>
+              <a:ext uri="{FF2B5EF4-FFF2-40B4-BE49-F238E27FC236}">
+                <a16:creationId xmlns:a16="http://schemas.microsoft.com/office/drawing/2014/main" id="{5C19B196-E30C-43A1-BA0F-A680B1A3D50B}"/>
+              </a:ext>
+            </a:extLst>
+          </p:cNvPr>
+          <p:cNvSpPr>
+            <a:spLocks noGrp="1"/>
+          </p:cNvSpPr>
+          <p:nvPr>
+            <p:ph sz="half" idx="2"/>
+          </p:nvPr>
+        </p:nvSpPr>
+        <p:spPr/>
+        <p:txBody>
+          <a:bodyPr/>
+          <a:lstStyle/>
+          <a:p>
+            <a:pPr marL="285750">
+              <a:lnSpc>
+                <a:spcPct val="90000"/>
+              </a:lnSpc>
+              <a:spcAft>
+                <a:spcPts val="600"/>
+              </a:spcAft>
+              <a:buFont typeface="Arial" panose="020B0604020202020204" pitchFamily="34" charset="0"/>
+              <a:buChar char="•"/>
+            </a:pPr>
+            <a:r>
+              <a:rPr lang="en-US" dirty="0"/>
+              <a:t>Data transfer between ESP32 and Python server</a:t>
+            </a:r>
+          </a:p>
+          <a:p>
+            <a:pPr marL="285750">
+              <a:lnSpc>
+                <a:spcPct val="90000"/>
+              </a:lnSpc>
+              <a:spcAft>
+                <a:spcPts val="600"/>
+              </a:spcAft>
+              <a:buFont typeface="Arial" panose="020B0604020202020204" pitchFamily="34" charset="0"/>
+              <a:buChar char="•"/>
+            </a:pPr>
+            <a:r>
+              <a:rPr lang="en-US" dirty="0"/>
+              <a:t>Faster connection setup because of static IP =&gt; reduced power consumption</a:t>
+            </a:r>
+          </a:p>
+        </p:txBody>
+      </p:sp>
+      <p:sp>
+        <p:nvSpPr>
+          <p:cNvPr id="4" name="Tijdelijke aanduiding voor tekst 3">
+            <a:extLst>
+              <a:ext uri="{FF2B5EF4-FFF2-40B4-BE49-F238E27FC236}">
+                <a16:creationId xmlns:a16="http://schemas.microsoft.com/office/drawing/2014/main" id="{4B6F0952-0F08-43AC-AF4F-0A689D0BE0D0}"/>
+              </a:ext>
+            </a:extLst>
+          </p:cNvPr>
+          <p:cNvSpPr>
+            <a:spLocks noGrp="1"/>
+          </p:cNvSpPr>
+          <p:nvPr>
+            <p:ph type="body" sz="quarter" idx="3"/>
+          </p:nvPr>
+        </p:nvSpPr>
+        <p:spPr/>
+        <p:txBody>
+          <a:bodyPr/>
+          <a:lstStyle/>
+          <a:p>
+            <a:r>
+              <a:rPr lang="nl-NL" dirty="0" err="1"/>
+              <a:t>To</a:t>
+            </a:r>
+            <a:r>
+              <a:rPr lang="nl-NL" dirty="0"/>
+              <a:t> do:</a:t>
+            </a:r>
+            <a:endParaRPr lang="nl-BE" dirty="0"/>
+          </a:p>
+        </p:txBody>
+      </p:sp>
+      <p:sp>
+        <p:nvSpPr>
+          <p:cNvPr id="5" name="Tijdelijke aanduiding voor inhoud 4">
+            <a:extLst>
+              <a:ext uri="{FF2B5EF4-FFF2-40B4-BE49-F238E27FC236}">
+                <a16:creationId xmlns:a16="http://schemas.microsoft.com/office/drawing/2014/main" id="{588F72F1-63B7-4167-83F3-0A0A56E44FAA}"/>
+              </a:ext>
+            </a:extLst>
+          </p:cNvPr>
+          <p:cNvSpPr>
+            <a:spLocks noGrp="1"/>
+          </p:cNvSpPr>
+          <p:nvPr>
+            <p:ph sz="quarter" idx="4"/>
+          </p:nvPr>
+        </p:nvSpPr>
+        <p:spPr/>
+        <p:txBody>
+          <a:bodyPr/>
+          <a:lstStyle/>
+          <a:p>
+            <a:pPr marL="285750" indent="-285750">
+              <a:buFont typeface="Arial" panose="020B0604020202020204" pitchFamily="34" charset="0"/>
+              <a:buChar char="•"/>
+            </a:pPr>
+            <a:r>
+              <a:rPr lang="en-GB" dirty="0"/>
+              <a:t>Process received data in Python </a:t>
+            </a:r>
+          </a:p>
+          <a:p>
+            <a:pPr marL="285750" indent="-285750">
+              <a:buFont typeface="Arial" panose="020B0604020202020204" pitchFamily="34" charset="0"/>
+              <a:buChar char="•"/>
+            </a:pPr>
+            <a:r>
+              <a:rPr lang="en-GB" dirty="0"/>
+              <a:t>Measure power consumption </a:t>
+            </a:r>
+          </a:p>
+          <a:p>
+            <a:pPr marL="285750" indent="-285750">
+              <a:buFont typeface="Arial" panose="020B0604020202020204" pitchFamily="34" charset="0"/>
+              <a:buChar char="•"/>
+            </a:pPr>
+            <a:r>
+              <a:rPr lang="en-GB" dirty="0"/>
+              <a:t>Test connection with actual sensor data instead of dummy data</a:t>
+            </a:r>
+          </a:p>
+          <a:p>
+            <a:pPr marL="285750" indent="-285750">
+              <a:buFont typeface="Arial" panose="020B0604020202020204" pitchFamily="34" charset="0"/>
+              <a:buChar char="•"/>
+            </a:pPr>
+            <a:r>
+              <a:rPr lang="en-GB" dirty="0"/>
+              <a:t>Test Python server on Raspberry Pi instead of laptop</a:t>
+            </a:r>
+          </a:p>
+        </p:txBody>
+      </p:sp>
+      <p:sp>
+        <p:nvSpPr>
+          <p:cNvPr id="6" name="Tijdelijke aanduiding voor voettekst 5">
+            <a:extLst>
+              <a:ext uri="{FF2B5EF4-FFF2-40B4-BE49-F238E27FC236}">
+                <a16:creationId xmlns:a16="http://schemas.microsoft.com/office/drawing/2014/main" id="{A725E219-6DF0-47BF-B866-478BA35B102B}"/>
+              </a:ext>
+            </a:extLst>
+          </p:cNvPr>
+          <p:cNvSpPr>
+            <a:spLocks noGrp="1"/>
+          </p:cNvSpPr>
+          <p:nvPr>
+            <p:ph type="ftr" sz="quarter" idx="11"/>
+          </p:nvPr>
+        </p:nvSpPr>
+        <p:spPr/>
+        <p:txBody>
+          <a:bodyPr/>
+          <a:lstStyle/>
+          <a:p>
+            <a:endParaRPr lang="nl-BE"/>
+          </a:p>
+        </p:txBody>
+      </p:sp>
+      <p:sp>
+        <p:nvSpPr>
+          <p:cNvPr id="7" name="Tijdelijke aanduiding voor dianummer 6">
+            <a:extLst>
+              <a:ext uri="{FF2B5EF4-FFF2-40B4-BE49-F238E27FC236}">
+                <a16:creationId xmlns:a16="http://schemas.microsoft.com/office/drawing/2014/main" id="{FE690A8E-8F6D-4105-A1CC-B2EF75CD484D}"/>
+              </a:ext>
+            </a:extLst>
+          </p:cNvPr>
+          <p:cNvSpPr>
+            <a:spLocks noGrp="1"/>
+          </p:cNvSpPr>
+          <p:nvPr>
+            <p:ph type="sldNum" sz="quarter" idx="12"/>
+          </p:nvPr>
+        </p:nvSpPr>
+        <p:spPr/>
+        <p:txBody>
+          <a:bodyPr/>
+          <a:lstStyle/>
+          <a:p>
+            <a:fld id="{89D4489B-098B-4FD8-BF1A-77B6DF63E8ED}" type="slidenum">
+              <a:rPr lang="nl-BE" smtClean="0"/>
+              <a:t>12</a:t>
+            </a:fld>
+            <a:endParaRPr lang="nl-BE"/>
+          </a:p>
+        </p:txBody>
+      </p:sp>
+      <p:sp>
+        <p:nvSpPr>
+          <p:cNvPr id="8" name="Titel 7">
+            <a:extLst>
+              <a:ext uri="{FF2B5EF4-FFF2-40B4-BE49-F238E27FC236}">
+                <a16:creationId xmlns:a16="http://schemas.microsoft.com/office/drawing/2014/main" id="{D0ABEC39-9D10-4F99-B715-4196A7A5DE7E}"/>
+              </a:ext>
+            </a:extLst>
+          </p:cNvPr>
+          <p:cNvSpPr>
+            <a:spLocks noGrp="1"/>
+          </p:cNvSpPr>
+          <p:nvPr>
+            <p:ph type="title"/>
+          </p:nvPr>
+        </p:nvSpPr>
+        <p:spPr/>
+        <p:txBody>
+          <a:bodyPr/>
+          <a:lstStyle/>
+          <a:p>
+            <a:r>
+              <a:rPr lang="nl-BE" dirty="0"/>
+              <a:t>Wi-Fi </a:t>
+            </a:r>
+            <a:r>
+              <a:rPr lang="nl-BE" dirty="0" err="1"/>
+              <a:t>communication</a:t>
+            </a:r>
+            <a:r>
+              <a:rPr lang="nl-BE" dirty="0"/>
+              <a:t> </a:t>
+            </a:r>
+          </a:p>
+        </p:txBody>
+      </p:sp>
+    </p:spTree>
+    <p:extLst>
+      <p:ext uri="{BB962C8B-B14F-4D97-AF65-F5344CB8AC3E}">
+        <p14:creationId xmlns:p14="http://schemas.microsoft.com/office/powerpoint/2010/main" val="3461325136"/>
+      </p:ext>
+    </p:extLst>
+  </p:cSld>
+  <p:clrMapOvr>
+    <a:masterClrMapping/>
+  </p:clrMapOvr>
+</p:sld>
+</file>
+
+<file path=ppt/slides/slide13.xml><?xml version="1.0" encoding="utf-8"?>
+<p:sld xmlns:a="http://schemas.openxmlformats.org/drawingml/2006/main" xmlns:r="http://schemas.openxmlformats.org/officeDocument/2006/relationships" xmlns:p="http://schemas.openxmlformats.org/presentationml/2006/main">
+  <p:cSld>
+    <p:spTree>
+      <p:nvGrpSpPr>
+        <p:cNvPr id="1" name=""/>
+        <p:cNvGrpSpPr/>
+        <p:nvPr/>
+      </p:nvGrpSpPr>
+      <p:grpSpPr>
+        <a:xfrm>
+          <a:off x="0" y="0"/>
+          <a:ext cx="0" cy="0"/>
+          <a:chOff x="0" y="0"/>
+          <a:chExt cx="0" cy="0"/>
+        </a:xfrm>
+      </p:grpSpPr>
+      <p:sp>
+        <p:nvSpPr>
+          <p:cNvPr id="2" name="Tijdelijke aanduiding voor tekst 1">
+            <a:extLst>
+              <a:ext uri="{FF2B5EF4-FFF2-40B4-BE49-F238E27FC236}">
+                <a16:creationId xmlns:a16="http://schemas.microsoft.com/office/drawing/2014/main" id="{F57FCC80-CD9B-4804-9745-D82EF86C6F6A}"/>
+              </a:ext>
+            </a:extLst>
+          </p:cNvPr>
+          <p:cNvSpPr>
+            <a:spLocks noGrp="1"/>
+          </p:cNvSpPr>
+          <p:nvPr>
+            <p:ph type="body" idx="1"/>
+          </p:nvPr>
+        </p:nvSpPr>
+        <p:spPr/>
+        <p:txBody>
+          <a:bodyPr/>
+          <a:lstStyle/>
+          <a:p>
+            <a:r>
+              <a:rPr lang="nl-NL" dirty="0" err="1"/>
+              <a:t>Completed</a:t>
+            </a:r>
+            <a:r>
+              <a:rPr lang="nl-NL" dirty="0"/>
+              <a:t>:</a:t>
+            </a:r>
+            <a:endParaRPr lang="nl-BE" dirty="0"/>
+          </a:p>
+        </p:txBody>
+      </p:sp>
+      <p:sp>
+        <p:nvSpPr>
+          <p:cNvPr id="3" name="Tijdelijke aanduiding voor inhoud 2">
+            <a:extLst>
+              <a:ext uri="{FF2B5EF4-FFF2-40B4-BE49-F238E27FC236}">
+                <a16:creationId xmlns:a16="http://schemas.microsoft.com/office/drawing/2014/main" id="{5C19B196-E30C-43A1-BA0F-A680B1A3D50B}"/>
+              </a:ext>
+            </a:extLst>
+          </p:cNvPr>
+          <p:cNvSpPr>
+            <a:spLocks noGrp="1"/>
+          </p:cNvSpPr>
+          <p:nvPr>
+            <p:ph sz="half" idx="2"/>
+          </p:nvPr>
+        </p:nvSpPr>
+        <p:spPr/>
+        <p:txBody>
+          <a:bodyPr/>
+          <a:lstStyle/>
+          <a:p>
+            <a:pPr marL="285750">
+              <a:lnSpc>
+                <a:spcPct val="90000"/>
+              </a:lnSpc>
+              <a:spcAft>
+                <a:spcPts val="600"/>
+              </a:spcAft>
+              <a:buFont typeface="Arial" panose="020B0604020202020204" pitchFamily="34" charset="0"/>
+              <a:buChar char="•"/>
+            </a:pPr>
+            <a:r>
+              <a:rPr lang="en-US" dirty="0"/>
+              <a:t>Basic functionality for 1 type</a:t>
+            </a:r>
+          </a:p>
+          <a:p>
+            <a:pPr marL="285750">
+              <a:lnSpc>
+                <a:spcPct val="90000"/>
+              </a:lnSpc>
+              <a:spcAft>
+                <a:spcPts val="600"/>
+              </a:spcAft>
+              <a:buFont typeface="Arial" panose="020B0604020202020204" pitchFamily="34" charset="0"/>
+              <a:buChar char="•"/>
+            </a:pPr>
+            <a:r>
+              <a:rPr lang="en-US" dirty="0"/>
+              <a:t>Data base design</a:t>
+            </a:r>
+          </a:p>
+          <a:p>
+            <a:pPr marL="285750">
+              <a:lnSpc>
+                <a:spcPct val="90000"/>
+              </a:lnSpc>
+              <a:spcAft>
+                <a:spcPts val="600"/>
+              </a:spcAft>
+              <a:buFont typeface="Arial" panose="020B0604020202020204" pitchFamily="34" charset="0"/>
+              <a:buChar char="•"/>
+            </a:pPr>
+            <a:r>
+              <a:rPr lang="en-US" dirty="0"/>
+              <a:t>Data base implementation</a:t>
+            </a:r>
+          </a:p>
+          <a:p>
+            <a:pPr marL="285750">
+              <a:lnSpc>
+                <a:spcPct val="90000"/>
+              </a:lnSpc>
+              <a:spcAft>
+                <a:spcPts val="600"/>
+              </a:spcAft>
+              <a:buFont typeface="Arial" panose="020B0604020202020204" pitchFamily="34" charset="0"/>
+              <a:buChar char="•"/>
+            </a:pPr>
+            <a:r>
+              <a:rPr lang="en-US" dirty="0"/>
+              <a:t>Functional heatmap</a:t>
+            </a:r>
+          </a:p>
+          <a:p>
+            <a:pPr marL="285750">
+              <a:lnSpc>
+                <a:spcPct val="90000"/>
+              </a:lnSpc>
+              <a:spcAft>
+                <a:spcPts val="600"/>
+              </a:spcAft>
+              <a:buFont typeface="Arial" panose="020B0604020202020204" pitchFamily="34" charset="0"/>
+              <a:buChar char="•"/>
+            </a:pPr>
+            <a:endParaRPr lang="en-US" dirty="0"/>
+          </a:p>
+        </p:txBody>
+      </p:sp>
+      <p:sp>
+        <p:nvSpPr>
+          <p:cNvPr id="4" name="Tijdelijke aanduiding voor tekst 3">
+            <a:extLst>
+              <a:ext uri="{FF2B5EF4-FFF2-40B4-BE49-F238E27FC236}">
+                <a16:creationId xmlns:a16="http://schemas.microsoft.com/office/drawing/2014/main" id="{4B6F0952-0F08-43AC-AF4F-0A689D0BE0D0}"/>
+              </a:ext>
+            </a:extLst>
+          </p:cNvPr>
+          <p:cNvSpPr>
+            <a:spLocks noGrp="1"/>
+          </p:cNvSpPr>
+          <p:nvPr>
+            <p:ph type="body" sz="quarter" idx="3"/>
+          </p:nvPr>
+        </p:nvSpPr>
+        <p:spPr/>
+        <p:txBody>
+          <a:bodyPr/>
+          <a:lstStyle/>
+          <a:p>
+            <a:r>
+              <a:rPr lang="nl-NL" dirty="0" err="1"/>
+              <a:t>To</a:t>
+            </a:r>
+            <a:r>
+              <a:rPr lang="nl-NL" dirty="0"/>
+              <a:t> do:</a:t>
+            </a:r>
+            <a:endParaRPr lang="nl-BE" dirty="0"/>
+          </a:p>
+        </p:txBody>
+      </p:sp>
+      <p:sp>
+        <p:nvSpPr>
+          <p:cNvPr id="5" name="Tijdelijke aanduiding voor inhoud 4">
+            <a:extLst>
+              <a:ext uri="{FF2B5EF4-FFF2-40B4-BE49-F238E27FC236}">
+                <a16:creationId xmlns:a16="http://schemas.microsoft.com/office/drawing/2014/main" id="{588F72F1-63B7-4167-83F3-0A0A56E44FAA}"/>
+              </a:ext>
+            </a:extLst>
+          </p:cNvPr>
+          <p:cNvSpPr>
+            <a:spLocks noGrp="1"/>
+          </p:cNvSpPr>
+          <p:nvPr>
+            <p:ph sz="quarter" idx="4"/>
+          </p:nvPr>
+        </p:nvSpPr>
+        <p:spPr/>
+        <p:txBody>
+          <a:bodyPr>
+            <a:scene3d>
+              <a:camera prst="orthographicFront"/>
+              <a:lightRig rig="threePt" dir="t"/>
+            </a:scene3d>
+            <a:sp3d extrusionH="57150">
+              <a:bevelT w="38100" h="38100"/>
+            </a:sp3d>
+          </a:bodyPr>
+          <a:lstStyle/>
+          <a:p>
+            <a:pPr marL="285750" indent="-285750">
+              <a:buFont typeface="Arial" panose="020B0604020202020204" pitchFamily="34" charset="0"/>
+              <a:buChar char="•"/>
+            </a:pPr>
+            <a:r>
+              <a:rPr lang="en-GB" dirty="0"/>
+              <a:t>Test on raspberry pi</a:t>
+            </a:r>
+          </a:p>
+          <a:p>
+            <a:pPr marL="285750" indent="-285750">
+              <a:buFont typeface="Arial" panose="020B0604020202020204" pitchFamily="34" charset="0"/>
+              <a:buChar char="•"/>
+            </a:pPr>
+            <a:r>
+              <a:rPr lang="en-GB" dirty="0"/>
+              <a:t>Use real sensor data</a:t>
+            </a:r>
+          </a:p>
+          <a:p>
+            <a:pPr marL="285750" indent="-285750">
+              <a:buFont typeface="Arial" panose="020B0604020202020204" pitchFamily="34" charset="0"/>
+              <a:buChar char="•"/>
+            </a:pPr>
+            <a:r>
+              <a:rPr lang="en-GB" dirty="0"/>
+              <a:t>Make it look good</a:t>
+            </a:r>
+          </a:p>
+          <a:p>
+            <a:pPr marL="285750" indent="-285750">
+              <a:buFont typeface="Arial" panose="020B0604020202020204" pitchFamily="34" charset="0"/>
+              <a:buChar char="•"/>
+            </a:pPr>
+            <a:r>
+              <a:rPr lang="en-GB" dirty="0"/>
+              <a:t>Add the other sensors</a:t>
+            </a:r>
+          </a:p>
+          <a:p>
+            <a:pPr marL="285750" indent="-285750">
+              <a:buFont typeface="Arial" panose="020B0604020202020204" pitchFamily="34" charset="0"/>
+              <a:buChar char="•"/>
+            </a:pPr>
+            <a:r>
+              <a:rPr lang="en-GB"/>
+              <a:t>Main page </a:t>
+            </a:r>
+            <a:endParaRPr lang="en-GB" dirty="0"/>
+          </a:p>
+          <a:p>
+            <a:pPr marL="285750" indent="-285750">
+              <a:buFont typeface="Arial" panose="020B0604020202020204" pitchFamily="34" charset="0"/>
+              <a:buChar char="•"/>
+            </a:pPr>
+            <a:endParaRPr lang="en-GB" dirty="0"/>
+          </a:p>
+        </p:txBody>
+      </p:sp>
+      <p:sp>
+        <p:nvSpPr>
+          <p:cNvPr id="6" name="Tijdelijke aanduiding voor voettekst 5">
+            <a:extLst>
+              <a:ext uri="{FF2B5EF4-FFF2-40B4-BE49-F238E27FC236}">
+                <a16:creationId xmlns:a16="http://schemas.microsoft.com/office/drawing/2014/main" id="{A725E219-6DF0-47BF-B866-478BA35B102B}"/>
+              </a:ext>
+            </a:extLst>
+          </p:cNvPr>
+          <p:cNvSpPr>
+            <a:spLocks noGrp="1"/>
+          </p:cNvSpPr>
+          <p:nvPr>
+            <p:ph type="ftr" sz="quarter" idx="11"/>
+          </p:nvPr>
+        </p:nvSpPr>
+        <p:spPr/>
+        <p:txBody>
+          <a:bodyPr/>
+          <a:lstStyle/>
+          <a:p>
+            <a:endParaRPr lang="nl-BE"/>
+          </a:p>
+        </p:txBody>
+      </p:sp>
+      <p:sp>
+        <p:nvSpPr>
+          <p:cNvPr id="7" name="Tijdelijke aanduiding voor dianummer 6">
+            <a:extLst>
+              <a:ext uri="{FF2B5EF4-FFF2-40B4-BE49-F238E27FC236}">
+                <a16:creationId xmlns:a16="http://schemas.microsoft.com/office/drawing/2014/main" id="{FE690A8E-8F6D-4105-A1CC-B2EF75CD484D}"/>
+              </a:ext>
+            </a:extLst>
+          </p:cNvPr>
+          <p:cNvSpPr>
+            <a:spLocks noGrp="1"/>
+          </p:cNvSpPr>
+          <p:nvPr>
+            <p:ph type="sldNum" sz="quarter" idx="12"/>
+          </p:nvPr>
+        </p:nvSpPr>
+        <p:spPr/>
+        <p:txBody>
+          <a:bodyPr/>
+          <a:lstStyle/>
+          <a:p>
+            <a:fld id="{89D4489B-098B-4FD8-BF1A-77B6DF63E8ED}" type="slidenum">
+              <a:rPr lang="nl-BE" smtClean="0"/>
+              <a:t>13</a:t>
+            </a:fld>
+            <a:endParaRPr lang="nl-BE"/>
+          </a:p>
+        </p:txBody>
+      </p:sp>
+      <p:sp>
+        <p:nvSpPr>
+          <p:cNvPr id="8" name="Titel 7">
+            <a:extLst>
+              <a:ext uri="{FF2B5EF4-FFF2-40B4-BE49-F238E27FC236}">
+                <a16:creationId xmlns:a16="http://schemas.microsoft.com/office/drawing/2014/main" id="{D0ABEC39-9D10-4F99-B715-4196A7A5DE7E}"/>
+              </a:ext>
+            </a:extLst>
+          </p:cNvPr>
+          <p:cNvSpPr>
+            <a:spLocks noGrp="1"/>
+          </p:cNvSpPr>
+          <p:nvPr>
+            <p:ph type="title"/>
+          </p:nvPr>
+        </p:nvSpPr>
+        <p:spPr/>
+        <p:txBody>
+          <a:bodyPr/>
+          <a:lstStyle/>
+          <a:p>
+            <a:r>
+              <a:rPr lang="nl-BE" dirty="0"/>
+              <a:t>Dashboard</a:t>
+            </a:r>
+          </a:p>
+        </p:txBody>
+      </p:sp>
+    </p:spTree>
+    <p:extLst>
+      <p:ext uri="{BB962C8B-B14F-4D97-AF65-F5344CB8AC3E}">
+        <p14:creationId xmlns:p14="http://schemas.microsoft.com/office/powerpoint/2010/main" val="3382894391"/>
       </p:ext>
     </p:extLst>
   </p:cSld>
@@ -5732,19 +6396,37 @@
           <a:p>
             <a:r>
               <a:rPr lang="nl-NL" dirty="0"/>
-              <a:t>Microcontroller</a:t>
-            </a:r>
-          </a:p>
-          <a:p>
+              <a:t>Microcontroller + </a:t>
+            </a:r>
+            <a:r>
+              <a:rPr lang="nl-NL" dirty="0" err="1"/>
+              <a:t>main</a:t>
+            </a:r>
             <a:r>
               <a:rPr lang="nl-NL" dirty="0"/>
-              <a:t>Sensors</a:t>
+              <a:t> PCB</a:t>
             </a:r>
           </a:p>
           <a:p>
             <a:r>
               <a:rPr lang="nl-NL" dirty="0"/>
-              <a:t>Code</a:t>
+              <a:t>Sensor design</a:t>
+            </a:r>
+          </a:p>
+          <a:p>
+            <a:r>
+              <a:rPr lang="nl-NL" dirty="0" err="1"/>
+              <a:t>Housing</a:t>
+            </a:r>
+            <a:r>
+              <a:rPr lang="nl-NL" dirty="0"/>
+              <a:t> design</a:t>
+            </a:r>
+          </a:p>
+          <a:p>
+            <a:r>
+              <a:rPr lang="nl-NL" dirty="0"/>
+              <a:t>Software design</a:t>
             </a:r>
           </a:p>
           <a:p>
@@ -5761,9 +6443,11 @@
           <a:p>
             <a:r>
               <a:rPr lang="nl-NL" dirty="0"/>
-              <a:t>Software design</a:t>
-            </a:r>
-            <a:endParaRPr lang="nl-BE" dirty="0"/>
+              <a:t>Dashboard</a:t>
+            </a:r>
+          </a:p>
+          <a:p>
+            <a:endParaRPr lang="nl-NL" dirty="0"/>
           </a:p>
         </p:txBody>
       </p:sp>
@@ -6398,7 +7082,7 @@
           <p:cNvPr id="2" name="Tijdelijke aanduiding voor tekst 1">
             <a:extLst>
               <a:ext uri="{FF2B5EF4-FFF2-40B4-BE49-F238E27FC236}">
-                <a16:creationId xmlns:a16="http://schemas.microsoft.com/office/drawing/2014/main" id="{F57FCC80-CD9B-4804-9745-D82EF86C6F6A}"/>
+                <a16:creationId xmlns:a16="http://schemas.microsoft.com/office/drawing/2014/main" id="{20E938EE-E12C-427C-9EF9-C60155582FB1}"/>
               </a:ext>
             </a:extLst>
           </p:cNvPr>
@@ -6431,7 +7115,7 @@
           <p:cNvPr id="3" name="Tijdelijke aanduiding voor inhoud 2">
             <a:extLst>
               <a:ext uri="{FF2B5EF4-FFF2-40B4-BE49-F238E27FC236}">
-                <a16:creationId xmlns:a16="http://schemas.microsoft.com/office/drawing/2014/main" id="{5C19B196-E30C-43A1-BA0F-A680B1A3D50B}"/>
+                <a16:creationId xmlns:a16="http://schemas.microsoft.com/office/drawing/2014/main" id="{202B0B10-844A-4276-88CD-612310ED2774}"/>
               </a:ext>
             </a:extLst>
           </p:cNvPr>
@@ -6444,7 +7128,9 @@
         </p:nvSpPr>
         <p:spPr/>
         <p:txBody>
-          <a:bodyPr/>
+          <a:bodyPr>
+            <a:normAutofit/>
+          </a:bodyPr>
           <a:lstStyle/>
           <a:p>
             <a:pPr marL="285750">
@@ -6459,7 +7145,7 @@
             </a:pPr>
             <a:r>
               <a:rPr lang="en-US" dirty="0"/>
-              <a:t>Data transfer between ESP32 and Python server</a:t>
+              <a:t>ESP32 single core</a:t>
             </a:r>
           </a:p>
           <a:p>
@@ -6475,8 +7161,41 @@
             </a:pPr>
             <a:r>
               <a:rPr lang="en-US" dirty="0"/>
-              <a:t>Faster connection setup because of static IP =&gt; reduced power consumption</a:t>
-            </a:r>
+              <a:t>Design main </a:t>
+            </a:r>
+            <a:r>
+              <a:rPr lang="en-US" dirty="0" err="1"/>
+              <a:t>pcb</a:t>
+            </a:r>
+            <a:endParaRPr lang="en-US" dirty="0"/>
+          </a:p>
+          <a:p>
+            <a:pPr marL="285750">
+              <a:lnSpc>
+                <a:spcPct val="90000"/>
+              </a:lnSpc>
+              <a:spcAft>
+                <a:spcPts val="600"/>
+              </a:spcAft>
+              <a:buFont typeface="Arial" panose="020B0604020202020204" pitchFamily="34" charset="0"/>
+              <a:buChar char="•"/>
+            </a:pPr>
+            <a:r>
+              <a:rPr lang="en-US" dirty="0"/>
+              <a:t>Boot and reset button</a:t>
+            </a:r>
+          </a:p>
+          <a:p>
+            <a:pPr marL="57150" indent="0">
+              <a:lnSpc>
+                <a:spcPct val="90000"/>
+              </a:lnSpc>
+              <a:spcAft>
+                <a:spcPts val="600"/>
+              </a:spcAft>
+              <a:buNone/>
+            </a:pPr>
+            <a:endParaRPr lang="en-US" dirty="0"/>
           </a:p>
         </p:txBody>
       </p:sp>
@@ -6485,7 +7204,7 @@
           <p:cNvPr id="4" name="Tijdelijke aanduiding voor tekst 3">
             <a:extLst>
               <a:ext uri="{FF2B5EF4-FFF2-40B4-BE49-F238E27FC236}">
-                <a16:creationId xmlns:a16="http://schemas.microsoft.com/office/drawing/2014/main" id="{4B6F0952-0F08-43AC-AF4F-0A689D0BE0D0}"/>
+                <a16:creationId xmlns:a16="http://schemas.microsoft.com/office/drawing/2014/main" id="{F46A3F36-7269-480B-B2D0-CC1D3BEECE8F}"/>
               </a:ext>
             </a:extLst>
           </p:cNvPr>
@@ -6518,7 +7237,7 @@
           <p:cNvPr id="5" name="Tijdelijke aanduiding voor inhoud 4">
             <a:extLst>
               <a:ext uri="{FF2B5EF4-FFF2-40B4-BE49-F238E27FC236}">
-                <a16:creationId xmlns:a16="http://schemas.microsoft.com/office/drawing/2014/main" id="{588F72F1-63B7-4167-83F3-0A0A56E44FAA}"/>
+                <a16:creationId xmlns:a16="http://schemas.microsoft.com/office/drawing/2014/main" id="{7CF4B472-42DC-4BBB-B6E0-06214E67AD28}"/>
               </a:ext>
             </a:extLst>
           </p:cNvPr>
@@ -6540,7 +7259,7 @@
             </a:pPr>
             <a:r>
               <a:rPr lang="en-GB" dirty="0"/>
-              <a:t>Process received data in Python </a:t>
+              <a:t>Soldering</a:t>
             </a:r>
           </a:p>
           <a:p>
@@ -6550,7 +7269,7 @@
             </a:pPr>
             <a:r>
               <a:rPr lang="en-GB" dirty="0"/>
-              <a:t>Measure power consumption </a:t>
+              <a:t>Testing</a:t>
             </a:r>
           </a:p>
           <a:p>
@@ -6560,17 +7279,7 @@
             </a:pPr>
             <a:r>
               <a:rPr lang="en-GB" dirty="0"/>
-              <a:t>Test connection with actual sensor data instead of dummy data</a:t>
-            </a:r>
-          </a:p>
-          <a:p>
-            <a:pPr marL="285750" indent="-285750">
-              <a:buFont typeface="Arial" panose="020B0604020202020204" pitchFamily="34" charset="0"/>
-              <a:buChar char="•"/>
-            </a:pPr>
-            <a:r>
-              <a:rPr lang="en-GB" dirty="0"/>
-              <a:t>Test Python server on Raspberry Pi instead of laptop</a:t>
+              <a:t>Designing revision</a:t>
             </a:r>
           </a:p>
         </p:txBody>
@@ -6580,7 +7289,7 @@
           <p:cNvPr id="6" name="Tijdelijke aanduiding voor voettekst 5">
             <a:extLst>
               <a:ext uri="{FF2B5EF4-FFF2-40B4-BE49-F238E27FC236}">
-                <a16:creationId xmlns:a16="http://schemas.microsoft.com/office/drawing/2014/main" id="{A725E219-6DF0-47BF-B866-478BA35B102B}"/>
+                <a16:creationId xmlns:a16="http://schemas.microsoft.com/office/drawing/2014/main" id="{3E361024-F1EE-4211-A6FC-E9C2E9F13AC7}"/>
               </a:ext>
             </a:extLst>
           </p:cNvPr>
@@ -6605,7 +7314,7 @@
           <p:cNvPr id="7" name="Tijdelijke aanduiding voor dianummer 6">
             <a:extLst>
               <a:ext uri="{FF2B5EF4-FFF2-40B4-BE49-F238E27FC236}">
-                <a16:creationId xmlns:a16="http://schemas.microsoft.com/office/drawing/2014/main" id="{FE690A8E-8F6D-4105-A1CC-B2EF75CD484D}"/>
+                <a16:creationId xmlns:a16="http://schemas.microsoft.com/office/drawing/2014/main" id="{32E0C575-CA9E-489E-97B6-87CFC6AC329B}"/>
               </a:ext>
             </a:extLst>
           </p:cNvPr>
@@ -6634,7 +7343,7 @@
           <p:cNvPr id="8" name="Titel 7">
             <a:extLst>
               <a:ext uri="{FF2B5EF4-FFF2-40B4-BE49-F238E27FC236}">
-                <a16:creationId xmlns:a16="http://schemas.microsoft.com/office/drawing/2014/main" id="{D0ABEC39-9D10-4F99-B715-4196A7A5DE7E}"/>
+                <a16:creationId xmlns:a16="http://schemas.microsoft.com/office/drawing/2014/main" id="{F8BD1597-74F2-44C4-B1E0-61B589E53B86}"/>
               </a:ext>
             </a:extLst>
           </p:cNvPr>
@@ -6652,15 +7361,15 @@
           <a:p>
             <a:r>
               <a:rPr lang="nl-BE" dirty="0"/>
-              <a:t>Wi-Fi </a:t>
+              <a:t>Microcontroller + </a:t>
             </a:r>
             <a:r>
               <a:rPr lang="nl-BE" dirty="0" err="1"/>
-              <a:t>communication</a:t>
+              <a:t>main</a:t>
             </a:r>
             <a:r>
               <a:rPr lang="nl-BE" dirty="0"/>
-              <a:t> </a:t>
+              <a:t> PCB</a:t>
             </a:r>
           </a:p>
         </p:txBody>
@@ -6668,7 +7377,7 @@
     </p:spTree>
     <p:extLst>
       <p:ext uri="{BB962C8B-B14F-4D97-AF65-F5344CB8AC3E}">
-        <p14:creationId xmlns:p14="http://schemas.microsoft.com/office/powerpoint/2010/main" val="3461325136"/>
+        <p14:creationId xmlns:p14="http://schemas.microsoft.com/office/powerpoint/2010/main" val="3516638362"/>
       </p:ext>
     </p:extLst>
   </p:cSld>
@@ -6746,24 +7455,41 @@
         </p:nvSpPr>
         <p:spPr/>
         <p:txBody>
-          <a:bodyPr/>
+          <a:bodyPr>
+            <a:normAutofit/>
+          </a:bodyPr>
           <a:lstStyle/>
           <a:p>
             <a:r>
               <a:rPr lang="en-GB" dirty="0"/>
-              <a:t>Entering and wakeup from deep sleep</a:t>
+              <a:t>PCB design of separate sensor board</a:t>
             </a:r>
           </a:p>
           <a:p>
             <a:r>
               <a:rPr lang="en-GB" dirty="0"/>
-              <a:t>Save variables in RTC memory so that they are retained after deep sleep</a:t>
+              <a:t>Investigating response time of sensors</a:t>
             </a:r>
           </a:p>
           <a:p>
             <a:r>
               <a:rPr lang="en-GB" dirty="0"/>
-              <a:t>NTP synchronisation for time information =&gt; disable sensors at night</a:t>
+              <a:t>Bringing sensors</a:t>
+            </a:r>
+          </a:p>
+          <a:p>
+            <a:pPr lvl="1"/>
+            <a:r>
+              <a:rPr lang="en-GB" dirty="0"/>
+              <a:t>Functions: </a:t>
+            </a:r>
+            <a:r>
+              <a:rPr lang="en-GB" dirty="0" err="1"/>
+              <a:t>init</a:t>
+            </a:r>
+            <a:r>
+              <a:rPr lang="en-GB" dirty="0"/>
+              <a:t>, get data, sleep,…</a:t>
             </a:r>
           </a:p>
         </p:txBody>
@@ -6824,19 +7550,21 @@
           <a:p>
             <a:r>
               <a:rPr lang="en-GB" dirty="0"/>
-              <a:t>Put the individual pieces of software in one general structure</a:t>
-            </a:r>
-          </a:p>
-          <a:p>
+              <a:t>Power measurements</a:t>
+            </a:r>
+          </a:p>
+          <a:p>
+            <a:pPr lvl="1"/>
             <a:r>
               <a:rPr lang="en-GB" dirty="0"/>
-              <a:t>Test the system</a:t>
-            </a:r>
-          </a:p>
-          <a:p>
+              <a:t>Checking measure mode is the most efficient</a:t>
+            </a:r>
+          </a:p>
+          <a:p>
+            <a:pPr lvl="1"/>
             <a:r>
               <a:rPr lang="en-GB" dirty="0"/>
-              <a:t>Power measurements</a:t>
+              <a:t>Checking with a Gecko development board</a:t>
             </a:r>
           </a:p>
         </p:txBody>
@@ -6918,7 +7646,7 @@
           <a:p>
             <a:r>
               <a:rPr lang="en-GB" dirty="0"/>
-              <a:t>Software design</a:t>
+              <a:t>Sensor design</a:t>
             </a:r>
             <a:endParaRPr lang="nl-BE" dirty="0"/>
           </a:p>
@@ -6927,7 +7655,7 @@
     </p:spTree>
     <p:extLst>
       <p:ext uri="{BB962C8B-B14F-4D97-AF65-F5344CB8AC3E}">
-        <p14:creationId xmlns:p14="http://schemas.microsoft.com/office/powerpoint/2010/main" val="3823129093"/>
+        <p14:creationId xmlns:p14="http://schemas.microsoft.com/office/powerpoint/2010/main" val="949159422"/>
       </p:ext>
     </p:extLst>
   </p:cSld>
@@ -6977,24 +7705,8 @@
           <a:p>
             <a:r>
               <a:rPr lang="en-GB" dirty="0"/>
-              <a:t>No ability to fully disable sensors with load switch until the final PCB is ready</a:t>
-            </a:r>
-            <a:endParaRPr lang="en-US" dirty="0"/>
-          </a:p>
-          <a:p>
-            <a:r>
-              <a:rPr lang="en-GB" dirty="0"/>
-              <a:t>No ability to measure power consumption</a:t>
-            </a:r>
-          </a:p>
-          <a:p>
-            <a:r>
-              <a:rPr lang="en-GB" dirty="0"/>
-              <a:t>Difficult to test full system because sensors, Raspberry Pi and ESP32-SOLO are not all available to one person  </a:t>
-            </a:r>
-            <a:endParaRPr lang="en-US" dirty="0"/>
-          </a:p>
-          <a:p>
+              <a:t>Correct cooperation of sensor board with the main board.</a:t>
+            </a:r>
             <a:endParaRPr lang="nl-BE" dirty="0"/>
           </a:p>
         </p:txBody>
@@ -7039,7 +7751,7 @@
     </p:spTree>
     <p:extLst>
       <p:ext uri="{BB962C8B-B14F-4D97-AF65-F5344CB8AC3E}">
-        <p14:creationId xmlns:p14="http://schemas.microsoft.com/office/powerpoint/2010/main" val="647632950"/>
+        <p14:creationId xmlns:p14="http://schemas.microsoft.com/office/powerpoint/2010/main" val="1267005276"/>
       </p:ext>
     </p:extLst>
   </p:cSld>
@@ -7124,34 +7836,19 @@
           <a:p>
             <a:r>
               <a:rPr lang="en-GB" dirty="0"/>
-              <a:t>PCB design of separate sensor board</a:t>
+              <a:t>Discussing a basic idea of the housing</a:t>
             </a:r>
           </a:p>
           <a:p>
             <a:r>
               <a:rPr lang="en-GB" dirty="0"/>
-              <a:t>Investigating response time of sensors</a:t>
+              <a:t>Getting the measurements of all available part</a:t>
             </a:r>
           </a:p>
           <a:p>
             <a:r>
               <a:rPr lang="en-GB" dirty="0"/>
-              <a:t>Bringing sensors</a:t>
-            </a:r>
-          </a:p>
-          <a:p>
-            <a:pPr lvl="1"/>
-            <a:r>
-              <a:rPr lang="en-GB" dirty="0"/>
-              <a:t>Functions: </a:t>
-            </a:r>
-            <a:r>
-              <a:rPr lang="en-GB" dirty="0" err="1"/>
-              <a:t>init</a:t>
-            </a:r>
-            <a:r>
-              <a:rPr lang="en-GB" dirty="0"/>
-              <a:t>, get data, sleep,…</a:t>
+              <a:t>A tutorial on 3D-printing design with fusion360</a:t>
             </a:r>
           </a:p>
         </p:txBody>
@@ -7212,21 +7909,7 @@
           <a:p>
             <a:r>
               <a:rPr lang="en-GB" dirty="0"/>
-              <a:t>Power measurements</a:t>
-            </a:r>
-          </a:p>
-          <a:p>
-            <a:pPr lvl="1"/>
-            <a:r>
-              <a:rPr lang="en-GB" dirty="0"/>
-              <a:t>Checking measure mode is the most efficient</a:t>
-            </a:r>
-          </a:p>
-          <a:p>
-            <a:pPr lvl="1"/>
-            <a:r>
-              <a:rPr lang="en-GB" dirty="0"/>
-              <a:t>Checking with a Greco development board</a:t>
+              <a:t>Design of the housing taken all the individual elements into account</a:t>
             </a:r>
           </a:p>
         </p:txBody>
@@ -7308,7 +7991,7 @@
           <a:p>
             <a:r>
               <a:rPr lang="en-GB" dirty="0"/>
-              <a:t>Sensor design</a:t>
+              <a:t>Housing design</a:t>
             </a:r>
             <a:endParaRPr lang="nl-BE" dirty="0"/>
           </a:p>
@@ -7317,7 +8000,7 @@
     </p:spTree>
     <p:extLst>
       <p:ext uri="{BB962C8B-B14F-4D97-AF65-F5344CB8AC3E}">
-        <p14:creationId xmlns:p14="http://schemas.microsoft.com/office/powerpoint/2010/main" val="949159422"/>
+        <p14:creationId xmlns:p14="http://schemas.microsoft.com/office/powerpoint/2010/main" val="835492808"/>
       </p:ext>
     </p:extLst>
   </p:cSld>
@@ -7367,7 +8050,38 @@
           <a:p>
             <a:r>
               <a:rPr lang="en-GB" dirty="0"/>
-              <a:t>Correct cooperation of sensor board with the main board.</a:t>
+              <a:t>Available 3D-printer</a:t>
+            </a:r>
+          </a:p>
+          <a:p>
+            <a:pPr lvl="1"/>
+            <a:r>
+              <a:rPr lang="en-GB" dirty="0"/>
+              <a:t>Do not own one</a:t>
+            </a:r>
+          </a:p>
+          <a:p>
+            <a:pPr lvl="1"/>
+            <a:r>
+              <a:rPr lang="en-GB" dirty="0"/>
+              <a:t>3D-printer at work, could be a possibility</a:t>
+            </a:r>
+            <a:br>
+              <a:rPr lang="en-GB" dirty="0"/>
+            </a:br>
+            <a:r>
+              <a:rPr lang="en-GB" dirty="0"/>
+              <a:t>Need to check with work</a:t>
+            </a:r>
+          </a:p>
+          <a:p>
+            <a:pPr lvl="1"/>
+            <a:endParaRPr lang="en-GB" dirty="0"/>
+          </a:p>
+          <a:p>
+            <a:r>
+              <a:rPr lang="en-GB" dirty="0"/>
+              <a:t>Checking the fitting of the design in the housing</a:t>
             </a:r>
             <a:endParaRPr lang="nl-BE" dirty="0"/>
           </a:p>
@@ -7413,7 +8127,7 @@
     </p:spTree>
     <p:extLst>
       <p:ext uri="{BB962C8B-B14F-4D97-AF65-F5344CB8AC3E}">
-        <p14:creationId xmlns:p14="http://schemas.microsoft.com/office/powerpoint/2010/main" val="1267005276"/>
+        <p14:creationId xmlns:p14="http://schemas.microsoft.com/office/powerpoint/2010/main" val="2953540510"/>
       </p:ext>
     </p:extLst>
   </p:cSld>

</xml_diff>